<commit_message>
workflow documentation - request and item groups
</commit_message>
<xml_diff>
--- a/documents/logistics-workflow.pptx
+++ b/documents/logistics-workflow.pptx
@@ -5144,18 +5144,6 @@
             </a:r>
           </a:p>
           <a:p>
-            <a:pPr marL="285750" indent="-285750">
-              <a:buSzPct val="100000"/>
-              <a:buBlip>
-                <a:blip r:embed="rId4">
-                  <a:extLst>
-                    <a:ext uri="{96DAC541-7B7A-43D3-8B79-37D633B846F1}">
-                      <asvg:svgBlip xmlns:asvg="http://schemas.microsoft.com/office/drawing/2016/SVG/main" r:embed="rId5"/>
-                    </a:ext>
-                  </a:extLst>
-                </a:blip>
-              </a:buBlip>
-            </a:pPr>
             <a:endParaRPr lang="en-US" sz="1600" dirty="0">
               <a:solidFill>
                 <a:schemeClr val="tx1">
@@ -5166,6 +5154,82 @@
               <a:latin typeface="Segoe UI" panose="020B0502040204020203" pitchFamily="34" charset="0"/>
               <a:cs typeface="Segoe UI" panose="020B0502040204020203" pitchFamily="34" charset="0"/>
             </a:endParaRPr>
+          </a:p>
+          <a:p>
+            <a:r>
+              <a:rPr lang="en-US" sz="1200" b="1" i="1" dirty="0">
+                <a:solidFill>
+                  <a:schemeClr val="tx1">
+                    <a:lumMod val="65000"/>
+                    <a:lumOff val="35000"/>
+                  </a:schemeClr>
+                </a:solidFill>
+                <a:latin typeface="Segoe UI" panose="020B0502040204020203" pitchFamily="34" charset="0"/>
+                <a:cs typeface="Segoe UI" panose="020B0502040204020203" pitchFamily="34" charset="0"/>
+              </a:rPr>
+              <a:t>Note: </a:t>
+            </a:r>
+            <a:r>
+              <a:rPr lang="en-US" sz="1200" i="1" dirty="0">
+                <a:solidFill>
+                  <a:schemeClr val="tx1">
+                    <a:lumMod val="65000"/>
+                    <a:lumOff val="35000"/>
+                  </a:schemeClr>
+                </a:solidFill>
+                <a:latin typeface="Segoe UI" panose="020B0502040204020203" pitchFamily="34" charset="0"/>
+                <a:cs typeface="Segoe UI" panose="020B0502040204020203" pitchFamily="34" charset="0"/>
+              </a:rPr>
+              <a:t>This is the most complex scenario possible. Logisticians will be able to perform the actions outlined in the next slide in this step for simple requests that are only relevant to them.</a:t>
+            </a:r>
+            <a:endParaRPr lang="en-US" sz="1200" b="1" i="1" dirty="0">
+              <a:solidFill>
+                <a:schemeClr val="tx1">
+                  <a:lumMod val="65000"/>
+                  <a:lumOff val="35000"/>
+                </a:schemeClr>
+              </a:solidFill>
+              <a:latin typeface="Segoe UI" panose="020B0502040204020203" pitchFamily="34" charset="0"/>
+              <a:cs typeface="Segoe UI" panose="020B0502040204020203" pitchFamily="34" charset="0"/>
+            </a:endParaRPr>
+          </a:p>
+        </p:txBody>
+      </p:sp>
+      <p:sp>
+        <p:nvSpPr>
+          <p:cNvPr id="122" name="TextBox 121">
+            <a:extLst>
+              <a:ext uri="{FF2B5EF4-FFF2-40B4-BE49-F238E27FC236}">
+                <a16:creationId xmlns:a16="http://schemas.microsoft.com/office/drawing/2014/main" id="{00AEB9A2-B192-429C-A1AA-E469E891430E}"/>
+              </a:ext>
+            </a:extLst>
+          </p:cNvPr>
+          <p:cNvSpPr txBox="1"/>
+          <p:nvPr/>
+        </p:nvSpPr>
+        <p:spPr>
+          <a:xfrm>
+            <a:off x="2215778" y="140315"/>
+            <a:ext cx="3628879" cy="461665"/>
+          </a:xfrm>
+          <a:prstGeom prst="rect">
+            <a:avLst/>
+          </a:prstGeom>
+          <a:noFill/>
+        </p:spPr>
+        <p:txBody>
+          <a:bodyPr wrap="none" rtlCol="0">
+            <a:spAutoFit/>
+          </a:bodyPr>
+          <a:lstStyle/>
+          <a:p>
+            <a:r>
+              <a:rPr lang="en-US" sz="2400" dirty="0">
+                <a:latin typeface="Segoe UI" panose="020B0502040204020203" pitchFamily="34" charset="0"/>
+                <a:cs typeface="Segoe UI" panose="020B0502040204020203" pitchFamily="34" charset="0"/>
+              </a:rPr>
+              <a:t>Request and Item Groups</a:t>
+            </a:r>
           </a:p>
         </p:txBody>
       </p:sp>

</xml_diff>

<commit_message>
add inventory log user
</commit_message>
<xml_diff>
--- a/documents/logistics-workflow.pptx
+++ b/documents/logistics-workflow.pptx
@@ -5,7 +5,7 @@
     <p:sldMasterId id="2147483648" r:id="rId1"/>
   </p:sldMasterIdLst>
   <p:notesMasterIdLst>
-    <p:notesMasterId r:id="rId7"/>
+    <p:notesMasterId r:id="rId8"/>
   </p:notesMasterIdLst>
   <p:sldIdLst>
     <p:sldId id="256" r:id="rId2"/>
@@ -13,6 +13,7 @@
     <p:sldId id="258" r:id="rId4"/>
     <p:sldId id="259" r:id="rId5"/>
     <p:sldId id="260" r:id="rId6"/>
+    <p:sldId id="261" r:id="rId7"/>
   </p:sldIdLst>
   <p:sldSz cx="12192000" cy="6858000"/>
   <p:notesSz cx="6858000" cy="9144000"/>
@@ -115,6 +116,9 @@
     <p:ext uri="{EFAFB233-063F-42B5-8137-9DF3F51BA10A}">
       <p15:sldGuideLst xmlns:p15="http://schemas.microsoft.com/office/powerpoint/2012/main"/>
     </p:ext>
+    <p:ext uri="{2D200454-40CA-4A62-9FC3-DE9A4176ACB9}">
+      <p15:notesGuideLst xmlns:p15="http://schemas.microsoft.com/office/powerpoint/2012/main"/>
+    </p:ext>
   </p:extLst>
 </p:presentation>
 </file>
@@ -201,7 +205,7 @@
           <a:p>
             <a:fld id="{43B0E059-6658-4D71-8B6C-28F57D967E6A}" type="datetimeFigureOut">
               <a:rPr lang="en-US" smtClean="0"/>
-              <a:t>6/11/2018</a:t>
+              <a:t>6/15/2018</a:t>
             </a:fld>
             <a:endParaRPr lang="en-US"/>
           </a:p>
@@ -699,7 +703,7 @@
           <a:p>
             <a:fld id="{62DCD513-4A56-4C2D-835C-3CD568EC1873}" type="datetimeFigureOut">
               <a:rPr lang="en-US" smtClean="0"/>
-              <a:t>6/11/2018</a:t>
+              <a:t>6/15/2018</a:t>
             </a:fld>
             <a:endParaRPr lang="en-US"/>
           </a:p>
@@ -897,7 +901,7 @@
           <a:p>
             <a:fld id="{62DCD513-4A56-4C2D-835C-3CD568EC1873}" type="datetimeFigureOut">
               <a:rPr lang="en-US" smtClean="0"/>
-              <a:t>6/11/2018</a:t>
+              <a:t>6/15/2018</a:t>
             </a:fld>
             <a:endParaRPr lang="en-US"/>
           </a:p>
@@ -1105,7 +1109,7 @@
           <a:p>
             <a:fld id="{62DCD513-4A56-4C2D-835C-3CD568EC1873}" type="datetimeFigureOut">
               <a:rPr lang="en-US" smtClean="0"/>
-              <a:t>6/11/2018</a:t>
+              <a:t>6/15/2018</a:t>
             </a:fld>
             <a:endParaRPr lang="en-US"/>
           </a:p>
@@ -1303,7 +1307,7 @@
           <a:p>
             <a:fld id="{62DCD513-4A56-4C2D-835C-3CD568EC1873}" type="datetimeFigureOut">
               <a:rPr lang="en-US" smtClean="0"/>
-              <a:t>6/11/2018</a:t>
+              <a:t>6/15/2018</a:t>
             </a:fld>
             <a:endParaRPr lang="en-US"/>
           </a:p>
@@ -1578,7 +1582,7 @@
           <a:p>
             <a:fld id="{62DCD513-4A56-4C2D-835C-3CD568EC1873}" type="datetimeFigureOut">
               <a:rPr lang="en-US" smtClean="0"/>
-              <a:t>6/11/2018</a:t>
+              <a:t>6/15/2018</a:t>
             </a:fld>
             <a:endParaRPr lang="en-US"/>
           </a:p>
@@ -1843,7 +1847,7 @@
           <a:p>
             <a:fld id="{62DCD513-4A56-4C2D-835C-3CD568EC1873}" type="datetimeFigureOut">
               <a:rPr lang="en-US" smtClean="0"/>
-              <a:t>6/11/2018</a:t>
+              <a:t>6/15/2018</a:t>
             </a:fld>
             <a:endParaRPr lang="en-US"/>
           </a:p>
@@ -2255,7 +2259,7 @@
           <a:p>
             <a:fld id="{62DCD513-4A56-4C2D-835C-3CD568EC1873}" type="datetimeFigureOut">
               <a:rPr lang="en-US" smtClean="0"/>
-              <a:t>6/11/2018</a:t>
+              <a:t>6/15/2018</a:t>
             </a:fld>
             <a:endParaRPr lang="en-US"/>
           </a:p>
@@ -2396,7 +2400,7 @@
           <a:p>
             <a:fld id="{62DCD513-4A56-4C2D-835C-3CD568EC1873}" type="datetimeFigureOut">
               <a:rPr lang="en-US" smtClean="0"/>
-              <a:t>6/11/2018</a:t>
+              <a:t>6/15/2018</a:t>
             </a:fld>
             <a:endParaRPr lang="en-US"/>
           </a:p>
@@ -2509,7 +2513,7 @@
           <a:p>
             <a:fld id="{62DCD513-4A56-4C2D-835C-3CD568EC1873}" type="datetimeFigureOut">
               <a:rPr lang="en-US" smtClean="0"/>
-              <a:t>6/11/2018</a:t>
+              <a:t>6/15/2018</a:t>
             </a:fld>
             <a:endParaRPr lang="en-US"/>
           </a:p>
@@ -2820,7 +2824,7 @@
           <a:p>
             <a:fld id="{62DCD513-4A56-4C2D-835C-3CD568EC1873}" type="datetimeFigureOut">
               <a:rPr lang="en-US" smtClean="0"/>
-              <a:t>6/11/2018</a:t>
+              <a:t>6/15/2018</a:t>
             </a:fld>
             <a:endParaRPr lang="en-US"/>
           </a:p>
@@ -3108,7 +3112,7 @@
           <a:p>
             <a:fld id="{62DCD513-4A56-4C2D-835C-3CD568EC1873}" type="datetimeFigureOut">
               <a:rPr lang="en-US" smtClean="0"/>
-              <a:t>6/11/2018</a:t>
+              <a:t>6/15/2018</a:t>
             </a:fld>
             <a:endParaRPr lang="en-US"/>
           </a:p>
@@ -3349,7 +3353,7 @@
           <a:p>
             <a:fld id="{62DCD513-4A56-4C2D-835C-3CD568EC1873}" type="datetimeFigureOut">
               <a:rPr lang="en-US" smtClean="0"/>
-              <a:t>6/11/2018</a:t>
+              <a:t>6/15/2018</a:t>
             </a:fld>
             <a:endParaRPr lang="en-US"/>
           </a:p>
@@ -5213,7 +5217,7 @@
                 <a:blip r:embed="rId3">
                   <a:extLst>
                     <a:ext uri="{96DAC541-7B7A-43D3-8B79-37D633B846F1}">
-                      <asvg:svgBlip xmlns:asvg="http://schemas.microsoft.com/office/drawing/2016/SVG/main" r:embed="rId4"/>
+                      <asvg:svgBlip xmlns:asvg="http://schemas.microsoft.com/office/drawing/2016/SVG/main" xmlns="" r:embed="rId4"/>
                     </a:ext>
                   </a:extLst>
                 </a:blip>
@@ -5239,7 +5243,7 @@
                 <a:blip r:embed="rId3">
                   <a:extLst>
                     <a:ext uri="{96DAC541-7B7A-43D3-8B79-37D633B846F1}">
-                      <asvg:svgBlip xmlns:asvg="http://schemas.microsoft.com/office/drawing/2016/SVG/main" r:embed="rId4"/>
+                      <asvg:svgBlip xmlns:asvg="http://schemas.microsoft.com/office/drawing/2016/SVG/main" xmlns="" r:embed="rId4"/>
                     </a:ext>
                   </a:extLst>
                 </a:blip>
@@ -5262,7 +5266,7 @@
                 <a:blip r:embed="rId3">
                   <a:extLst>
                     <a:ext uri="{96DAC541-7B7A-43D3-8B79-37D633B846F1}">
-                      <asvg:svgBlip xmlns:asvg="http://schemas.microsoft.com/office/drawing/2016/SVG/main" r:embed="rId4"/>
+                      <asvg:svgBlip xmlns:asvg="http://schemas.microsoft.com/office/drawing/2016/SVG/main" xmlns="" r:embed="rId4"/>
                     </a:ext>
                   </a:extLst>
                 </a:blip>
@@ -5288,7 +5292,7 @@
                 <a:blip r:embed="rId3">
                   <a:extLst>
                     <a:ext uri="{96DAC541-7B7A-43D3-8B79-37D633B846F1}">
-                      <asvg:svgBlip xmlns:asvg="http://schemas.microsoft.com/office/drawing/2016/SVG/main" r:embed="rId4"/>
+                      <asvg:svgBlip xmlns:asvg="http://schemas.microsoft.com/office/drawing/2016/SVG/main" xmlns="" r:embed="rId4"/>
                     </a:ext>
                   </a:extLst>
                 </a:blip>
@@ -5311,7 +5315,7 @@
                 <a:blip r:embed="rId3">
                   <a:extLst>
                     <a:ext uri="{96DAC541-7B7A-43D3-8B79-37D633B846F1}">
-                      <asvg:svgBlip xmlns:asvg="http://schemas.microsoft.com/office/drawing/2016/SVG/main" r:embed="rId4"/>
+                      <asvg:svgBlip xmlns:asvg="http://schemas.microsoft.com/office/drawing/2016/SVG/main" xmlns="" r:embed="rId4"/>
                     </a:ext>
                   </a:extLst>
                 </a:blip>
@@ -5337,7 +5341,7 @@
                 <a:blip r:embed="rId3">
                   <a:extLst>
                     <a:ext uri="{96DAC541-7B7A-43D3-8B79-37D633B846F1}">
-                      <asvg:svgBlip xmlns:asvg="http://schemas.microsoft.com/office/drawing/2016/SVG/main" r:embed="rId4"/>
+                      <asvg:svgBlip xmlns:asvg="http://schemas.microsoft.com/office/drawing/2016/SVG/main" xmlns="" r:embed="rId4"/>
                     </a:ext>
                   </a:extLst>
                 </a:blip>
@@ -5363,7 +5367,7 @@
                 <a:blip r:embed="rId3">
                   <a:extLst>
                     <a:ext uri="{96DAC541-7B7A-43D3-8B79-37D633B846F1}">
-                      <asvg:svgBlip xmlns:asvg="http://schemas.microsoft.com/office/drawing/2016/SVG/main" r:embed="rId4"/>
+                      <asvg:svgBlip xmlns:asvg="http://schemas.microsoft.com/office/drawing/2016/SVG/main" xmlns="" r:embed="rId4"/>
                     </a:ext>
                   </a:extLst>
                 </a:blip>
@@ -5389,7 +5393,7 @@
                 <a:blip r:embed="rId3">
                   <a:extLst>
                     <a:ext uri="{96DAC541-7B7A-43D3-8B79-37D633B846F1}">
-                      <asvg:svgBlip xmlns:asvg="http://schemas.microsoft.com/office/drawing/2016/SVG/main" r:embed="rId4"/>
+                      <asvg:svgBlip xmlns:asvg="http://schemas.microsoft.com/office/drawing/2016/SVG/main" xmlns="" r:embed="rId4"/>
                     </a:ext>
                   </a:extLst>
                 </a:blip>
@@ -5415,7 +5419,7 @@
                 <a:blip r:embed="rId3">
                   <a:extLst>
                     <a:ext uri="{96DAC541-7B7A-43D3-8B79-37D633B846F1}">
-                      <asvg:svgBlip xmlns:asvg="http://schemas.microsoft.com/office/drawing/2016/SVG/main" r:embed="rId4"/>
+                      <asvg:svgBlip xmlns:asvg="http://schemas.microsoft.com/office/drawing/2016/SVG/main" xmlns="" r:embed="rId4"/>
                     </a:ext>
                   </a:extLst>
                 </a:blip>
@@ -5441,7 +5445,7 @@
                 <a:blip r:embed="rId3">
                   <a:extLst>
                     <a:ext uri="{96DAC541-7B7A-43D3-8B79-37D633B846F1}">
-                      <asvg:svgBlip xmlns:asvg="http://schemas.microsoft.com/office/drawing/2016/SVG/main" r:embed="rId4"/>
+                      <asvg:svgBlip xmlns:asvg="http://schemas.microsoft.com/office/drawing/2016/SVG/main" xmlns="" r:embed="rId4"/>
                     </a:ext>
                   </a:extLst>
                 </a:blip>
@@ -5467,7 +5471,7 @@
                 <a:blip r:embed="rId3">
                   <a:extLst>
                     <a:ext uri="{96DAC541-7B7A-43D3-8B79-37D633B846F1}">
-                      <asvg:svgBlip xmlns:asvg="http://schemas.microsoft.com/office/drawing/2016/SVG/main" r:embed="rId4"/>
+                      <asvg:svgBlip xmlns:asvg="http://schemas.microsoft.com/office/drawing/2016/SVG/main" xmlns="" r:embed="rId4"/>
                     </a:ext>
                   </a:extLst>
                 </a:blip>
@@ -5493,7 +5497,7 @@
                 <a:blip r:embed="rId3">
                   <a:extLst>
                     <a:ext uri="{96DAC541-7B7A-43D3-8B79-37D633B846F1}">
-                      <asvg:svgBlip xmlns:asvg="http://schemas.microsoft.com/office/drawing/2016/SVG/main" r:embed="rId4"/>
+                      <asvg:svgBlip xmlns:asvg="http://schemas.microsoft.com/office/drawing/2016/SVG/main" xmlns="" r:embed="rId4"/>
                     </a:ext>
                   </a:extLst>
                 </a:blip>
@@ -5519,7 +5523,7 @@
                 <a:blip r:embed="rId3">
                   <a:extLst>
                     <a:ext uri="{96DAC541-7B7A-43D3-8B79-37D633B846F1}">
-                      <asvg:svgBlip xmlns:asvg="http://schemas.microsoft.com/office/drawing/2016/SVG/main" r:embed="rId4"/>
+                      <asvg:svgBlip xmlns:asvg="http://schemas.microsoft.com/office/drawing/2016/SVG/main" xmlns="" r:embed="rId4"/>
                     </a:ext>
                   </a:extLst>
                 </a:blip>
@@ -5545,7 +5549,7 @@
                 <a:blip r:embed="rId3">
                   <a:extLst>
                     <a:ext uri="{96DAC541-7B7A-43D3-8B79-37D633B846F1}">
-                      <asvg:svgBlip xmlns:asvg="http://schemas.microsoft.com/office/drawing/2016/SVG/main" r:embed="rId4"/>
+                      <asvg:svgBlip xmlns:asvg="http://schemas.microsoft.com/office/drawing/2016/SVG/main" xmlns="" r:embed="rId4"/>
                     </a:ext>
                   </a:extLst>
                 </a:blip>
@@ -5568,7 +5572,7 @@
                 <a:blip r:embed="rId3">
                   <a:extLst>
                     <a:ext uri="{96DAC541-7B7A-43D3-8B79-37D633B846F1}">
-                      <asvg:svgBlip xmlns:asvg="http://schemas.microsoft.com/office/drawing/2016/SVG/main" r:embed="rId4"/>
+                      <asvg:svgBlip xmlns:asvg="http://schemas.microsoft.com/office/drawing/2016/SVG/main" xmlns="" r:embed="rId4"/>
                     </a:ext>
                   </a:extLst>
                 </a:blip>
@@ -5594,7 +5598,7 @@
                 <a:blip r:embed="rId3">
                   <a:extLst>
                     <a:ext uri="{96DAC541-7B7A-43D3-8B79-37D633B846F1}">
-                      <asvg:svgBlip xmlns:asvg="http://schemas.microsoft.com/office/drawing/2016/SVG/main" r:embed="rId4"/>
+                      <asvg:svgBlip xmlns:asvg="http://schemas.microsoft.com/office/drawing/2016/SVG/main" xmlns="" r:embed="rId4"/>
                     </a:ext>
                   </a:extLst>
                 </a:blip>
@@ -5857,7 +5861,7 @@
                 <a:blip r:embed="rId2">
                   <a:extLst>
                     <a:ext uri="{96DAC541-7B7A-43D3-8B79-37D633B846F1}">
-                      <asvg:svgBlip xmlns:asvg="http://schemas.microsoft.com/office/drawing/2016/SVG/main" r:embed="rId3"/>
+                      <asvg:svgBlip xmlns:asvg="http://schemas.microsoft.com/office/drawing/2016/SVG/main" xmlns="" r:embed="rId3"/>
                     </a:ext>
                   </a:extLst>
                 </a:blip>
@@ -5883,7 +5887,7 @@
                 <a:blip r:embed="rId2">
                   <a:extLst>
                     <a:ext uri="{96DAC541-7B7A-43D3-8B79-37D633B846F1}">
-                      <asvg:svgBlip xmlns:asvg="http://schemas.microsoft.com/office/drawing/2016/SVG/main" r:embed="rId3"/>
+                      <asvg:svgBlip xmlns:asvg="http://schemas.microsoft.com/office/drawing/2016/SVG/main" xmlns="" r:embed="rId3"/>
                     </a:ext>
                   </a:extLst>
                 </a:blip>
@@ -5906,7 +5910,7 @@
                 <a:blip r:embed="rId2">
                   <a:extLst>
                     <a:ext uri="{96DAC541-7B7A-43D3-8B79-37D633B846F1}">
-                      <asvg:svgBlip xmlns:asvg="http://schemas.microsoft.com/office/drawing/2016/SVG/main" r:embed="rId3"/>
+                      <asvg:svgBlip xmlns:asvg="http://schemas.microsoft.com/office/drawing/2016/SVG/main" xmlns="" r:embed="rId3"/>
                     </a:ext>
                   </a:extLst>
                 </a:blip>
@@ -5932,7 +5936,7 @@
                 <a:blip r:embed="rId2">
                   <a:extLst>
                     <a:ext uri="{96DAC541-7B7A-43D3-8B79-37D633B846F1}">
-                      <asvg:svgBlip xmlns:asvg="http://schemas.microsoft.com/office/drawing/2016/SVG/main" r:embed="rId3"/>
+                      <asvg:svgBlip xmlns:asvg="http://schemas.microsoft.com/office/drawing/2016/SVG/main" xmlns="" r:embed="rId3"/>
                     </a:ext>
                   </a:extLst>
                 </a:blip>
@@ -5955,7 +5959,7 @@
                 <a:blip r:embed="rId2">
                   <a:extLst>
                     <a:ext uri="{96DAC541-7B7A-43D3-8B79-37D633B846F1}">
-                      <asvg:svgBlip xmlns:asvg="http://schemas.microsoft.com/office/drawing/2016/SVG/main" r:embed="rId3"/>
+                      <asvg:svgBlip xmlns:asvg="http://schemas.microsoft.com/office/drawing/2016/SVG/main" xmlns="" r:embed="rId3"/>
                     </a:ext>
                   </a:extLst>
                 </a:blip>
@@ -5981,7 +5985,7 @@
                 <a:blip r:embed="rId2">
                   <a:extLst>
                     <a:ext uri="{96DAC541-7B7A-43D3-8B79-37D633B846F1}">
-                      <asvg:svgBlip xmlns:asvg="http://schemas.microsoft.com/office/drawing/2016/SVG/main" r:embed="rId3"/>
+                      <asvg:svgBlip xmlns:asvg="http://schemas.microsoft.com/office/drawing/2016/SVG/main" xmlns="" r:embed="rId3"/>
                     </a:ext>
                   </a:extLst>
                 </a:blip>
@@ -6004,7 +6008,7 @@
                 <a:blip r:embed="rId2">
                   <a:extLst>
                     <a:ext uri="{96DAC541-7B7A-43D3-8B79-37D633B846F1}">
-                      <asvg:svgBlip xmlns:asvg="http://schemas.microsoft.com/office/drawing/2016/SVG/main" r:embed="rId3"/>
+                      <asvg:svgBlip xmlns:asvg="http://schemas.microsoft.com/office/drawing/2016/SVG/main" xmlns="" r:embed="rId3"/>
                     </a:ext>
                   </a:extLst>
                 </a:blip>
@@ -6030,7 +6034,7 @@
                 <a:blip r:embed="rId2">
                   <a:extLst>
                     <a:ext uri="{96DAC541-7B7A-43D3-8B79-37D633B846F1}">
-                      <asvg:svgBlip xmlns:asvg="http://schemas.microsoft.com/office/drawing/2016/SVG/main" r:embed="rId3"/>
+                      <asvg:svgBlip xmlns:asvg="http://schemas.microsoft.com/office/drawing/2016/SVG/main" xmlns="" r:embed="rId3"/>
                     </a:ext>
                   </a:extLst>
                 </a:blip>
@@ -6053,7 +6057,7 @@
                 <a:blip r:embed="rId2">
                   <a:extLst>
                     <a:ext uri="{96DAC541-7B7A-43D3-8B79-37D633B846F1}">
-                      <asvg:svgBlip xmlns:asvg="http://schemas.microsoft.com/office/drawing/2016/SVG/main" r:embed="rId3"/>
+                      <asvg:svgBlip xmlns:asvg="http://schemas.microsoft.com/office/drawing/2016/SVG/main" xmlns="" r:embed="rId3"/>
                     </a:ext>
                   </a:extLst>
                 </a:blip>
@@ -8306,7 +8310,7 @@
                 <a:blip r:embed="rId2">
                   <a:extLst>
                     <a:ext uri="{96DAC541-7B7A-43D3-8B79-37D633B846F1}">
-                      <asvg:svgBlip xmlns:asvg="http://schemas.microsoft.com/office/drawing/2016/SVG/main" r:embed="rId3"/>
+                      <asvg:svgBlip xmlns:asvg="http://schemas.microsoft.com/office/drawing/2016/SVG/main" xmlns="" r:embed="rId3"/>
                     </a:ext>
                   </a:extLst>
                 </a:blip>
@@ -8332,7 +8336,7 @@
                 <a:blip r:embed="rId2">
                   <a:extLst>
                     <a:ext uri="{96DAC541-7B7A-43D3-8B79-37D633B846F1}">
-                      <asvg:svgBlip xmlns:asvg="http://schemas.microsoft.com/office/drawing/2016/SVG/main" r:embed="rId3"/>
+                      <asvg:svgBlip xmlns:asvg="http://schemas.microsoft.com/office/drawing/2016/SVG/main" xmlns="" r:embed="rId3"/>
                     </a:ext>
                   </a:extLst>
                 </a:blip>
@@ -8355,7 +8359,7 @@
                 <a:blip r:embed="rId2">
                   <a:extLst>
                     <a:ext uri="{96DAC541-7B7A-43D3-8B79-37D633B846F1}">
-                      <asvg:svgBlip xmlns:asvg="http://schemas.microsoft.com/office/drawing/2016/SVG/main" r:embed="rId3"/>
+                      <asvg:svgBlip xmlns:asvg="http://schemas.microsoft.com/office/drawing/2016/SVG/main" xmlns="" r:embed="rId3"/>
                     </a:ext>
                   </a:extLst>
                 </a:blip>
@@ -8381,7 +8385,7 @@
                 <a:blip r:embed="rId2">
                   <a:extLst>
                     <a:ext uri="{96DAC541-7B7A-43D3-8B79-37D633B846F1}">
-                      <asvg:svgBlip xmlns:asvg="http://schemas.microsoft.com/office/drawing/2016/SVG/main" r:embed="rId3"/>
+                      <asvg:svgBlip xmlns:asvg="http://schemas.microsoft.com/office/drawing/2016/SVG/main" xmlns="" r:embed="rId3"/>
                     </a:ext>
                   </a:extLst>
                 </a:blip>
@@ -8404,7 +8408,7 @@
                 <a:blip r:embed="rId2">
                   <a:extLst>
                     <a:ext uri="{96DAC541-7B7A-43D3-8B79-37D633B846F1}">
-                      <asvg:svgBlip xmlns:asvg="http://schemas.microsoft.com/office/drawing/2016/SVG/main" r:embed="rId3"/>
+                      <asvg:svgBlip xmlns:asvg="http://schemas.microsoft.com/office/drawing/2016/SVG/main" xmlns="" r:embed="rId3"/>
                     </a:ext>
                   </a:extLst>
                 </a:blip>
@@ -10567,7 +10571,7 @@
                 <a:blip r:embed="rId2">
                   <a:extLst>
                     <a:ext uri="{96DAC541-7B7A-43D3-8B79-37D633B846F1}">
-                      <asvg:svgBlip xmlns:asvg="http://schemas.microsoft.com/office/drawing/2016/SVG/main" r:embed="rId3"/>
+                      <asvg:svgBlip xmlns:asvg="http://schemas.microsoft.com/office/drawing/2016/SVG/main" xmlns="" r:embed="rId3"/>
                     </a:ext>
                   </a:extLst>
                 </a:blip>
@@ -10593,7 +10597,7 @@
                 <a:blip r:embed="rId2">
                   <a:extLst>
                     <a:ext uri="{96DAC541-7B7A-43D3-8B79-37D633B846F1}">
-                      <asvg:svgBlip xmlns:asvg="http://schemas.microsoft.com/office/drawing/2016/SVG/main" r:embed="rId3"/>
+                      <asvg:svgBlip xmlns:asvg="http://schemas.microsoft.com/office/drawing/2016/SVG/main" xmlns="" r:embed="rId3"/>
                     </a:ext>
                   </a:extLst>
                 </a:blip>
@@ -10616,7 +10620,7 @@
                 <a:blip r:embed="rId2">
                   <a:extLst>
                     <a:ext uri="{96DAC541-7B7A-43D3-8B79-37D633B846F1}">
-                      <asvg:svgBlip xmlns:asvg="http://schemas.microsoft.com/office/drawing/2016/SVG/main" r:embed="rId3"/>
+                      <asvg:svgBlip xmlns:asvg="http://schemas.microsoft.com/office/drawing/2016/SVG/main" xmlns="" r:embed="rId3"/>
                     </a:ext>
                   </a:extLst>
                 </a:blip>
@@ -10642,7 +10646,7 @@
                 <a:blip r:embed="rId2">
                   <a:extLst>
                     <a:ext uri="{96DAC541-7B7A-43D3-8B79-37D633B846F1}">
-                      <asvg:svgBlip xmlns:asvg="http://schemas.microsoft.com/office/drawing/2016/SVG/main" r:embed="rId3"/>
+                      <asvg:svgBlip xmlns:asvg="http://schemas.microsoft.com/office/drawing/2016/SVG/main" xmlns="" r:embed="rId3"/>
                     </a:ext>
                   </a:extLst>
                 </a:blip>
@@ -10665,7 +10669,7 @@
                 <a:blip r:embed="rId2">
                   <a:extLst>
                     <a:ext uri="{96DAC541-7B7A-43D3-8B79-37D633B846F1}">
-                      <asvg:svgBlip xmlns:asvg="http://schemas.microsoft.com/office/drawing/2016/SVG/main" r:embed="rId3"/>
+                      <asvg:svgBlip xmlns:asvg="http://schemas.microsoft.com/office/drawing/2016/SVG/main" xmlns="" r:embed="rId3"/>
                     </a:ext>
                   </a:extLst>
                 </a:blip>
@@ -12379,7 +12383,7 @@
                 <a:blip r:embed="rId2">
                   <a:extLst>
                     <a:ext uri="{96DAC541-7B7A-43D3-8B79-37D633B846F1}">
-                      <asvg:svgBlip xmlns:asvg="http://schemas.microsoft.com/office/drawing/2016/SVG/main" r:embed="rId3"/>
+                      <asvg:svgBlip xmlns:asvg="http://schemas.microsoft.com/office/drawing/2016/SVG/main" xmlns="" r:embed="rId3"/>
                     </a:ext>
                   </a:extLst>
                 </a:blip>
@@ -12405,7 +12409,7 @@
                 <a:blip r:embed="rId2">
                   <a:extLst>
                     <a:ext uri="{96DAC541-7B7A-43D3-8B79-37D633B846F1}">
-                      <asvg:svgBlip xmlns:asvg="http://schemas.microsoft.com/office/drawing/2016/SVG/main" r:embed="rId3"/>
+                      <asvg:svgBlip xmlns:asvg="http://schemas.microsoft.com/office/drawing/2016/SVG/main" xmlns="" r:embed="rId3"/>
                     </a:ext>
                   </a:extLst>
                 </a:blip>
@@ -12431,7 +12435,7 @@
                 <a:blip r:embed="rId2">
                   <a:extLst>
                     <a:ext uri="{96DAC541-7B7A-43D3-8B79-37D633B846F1}">
-                      <asvg:svgBlip xmlns:asvg="http://schemas.microsoft.com/office/drawing/2016/SVG/main" r:embed="rId3"/>
+                      <asvg:svgBlip xmlns:asvg="http://schemas.microsoft.com/office/drawing/2016/SVG/main" xmlns="" r:embed="rId3"/>
                     </a:ext>
                   </a:extLst>
                 </a:blip>
@@ -12457,7 +12461,7 @@
                 <a:blip r:embed="rId2">
                   <a:extLst>
                     <a:ext uri="{96DAC541-7B7A-43D3-8B79-37D633B846F1}">
-                      <asvg:svgBlip xmlns:asvg="http://schemas.microsoft.com/office/drawing/2016/SVG/main" r:embed="rId3"/>
+                      <asvg:svgBlip xmlns:asvg="http://schemas.microsoft.com/office/drawing/2016/SVG/main" xmlns="" r:embed="rId3"/>
                     </a:ext>
                   </a:extLst>
                 </a:blip>
@@ -12483,7 +12487,7 @@
                 <a:blip r:embed="rId2">
                   <a:extLst>
                     <a:ext uri="{96DAC541-7B7A-43D3-8B79-37D633B846F1}">
-                      <asvg:svgBlip xmlns:asvg="http://schemas.microsoft.com/office/drawing/2016/SVG/main" r:embed="rId3"/>
+                      <asvg:svgBlip xmlns:asvg="http://schemas.microsoft.com/office/drawing/2016/SVG/main" xmlns="" r:embed="rId3"/>
                     </a:ext>
                   </a:extLst>
                 </a:blip>
@@ -12506,7 +12510,7 @@
                 <a:blip r:embed="rId2">
                   <a:extLst>
                     <a:ext uri="{96DAC541-7B7A-43D3-8B79-37D633B846F1}">
-                      <asvg:svgBlip xmlns:asvg="http://schemas.microsoft.com/office/drawing/2016/SVG/main" r:embed="rId3"/>
+                      <asvg:svgBlip xmlns:asvg="http://schemas.microsoft.com/office/drawing/2016/SVG/main" xmlns="" r:embed="rId3"/>
                     </a:ext>
                   </a:extLst>
                 </a:blip>
@@ -12532,7 +12536,7 @@
                 <a:blip r:embed="rId2">
                   <a:extLst>
                     <a:ext uri="{96DAC541-7B7A-43D3-8B79-37D633B846F1}">
-                      <asvg:svgBlip xmlns:asvg="http://schemas.microsoft.com/office/drawing/2016/SVG/main" r:embed="rId3"/>
+                      <asvg:svgBlip xmlns:asvg="http://schemas.microsoft.com/office/drawing/2016/SVG/main" xmlns="" r:embed="rId3"/>
                     </a:ext>
                   </a:extLst>
                 </a:blip>
@@ -12555,7 +12559,7 @@
                 <a:blip r:embed="rId2">
                   <a:extLst>
                     <a:ext uri="{96DAC541-7B7A-43D3-8B79-37D633B846F1}">
-                      <asvg:svgBlip xmlns:asvg="http://schemas.microsoft.com/office/drawing/2016/SVG/main" r:embed="rId3"/>
+                      <asvg:svgBlip xmlns:asvg="http://schemas.microsoft.com/office/drawing/2016/SVG/main" xmlns="" r:embed="rId3"/>
                     </a:ext>
                   </a:extLst>
                 </a:blip>
@@ -12581,7 +12585,7 @@
                 <a:blip r:embed="rId2">
                   <a:extLst>
                     <a:ext uri="{96DAC541-7B7A-43D3-8B79-37D633B846F1}">
-                      <asvg:svgBlip xmlns:asvg="http://schemas.microsoft.com/office/drawing/2016/SVG/main" r:embed="rId3"/>
+                      <asvg:svgBlip xmlns:asvg="http://schemas.microsoft.com/office/drawing/2016/SVG/main" xmlns="" r:embed="rId3"/>
                     </a:ext>
                   </a:extLst>
                 </a:blip>
@@ -12604,7 +12608,7 @@
                 <a:blip r:embed="rId2">
                   <a:extLst>
                     <a:ext uri="{96DAC541-7B7A-43D3-8B79-37D633B846F1}">
-                      <asvg:svgBlip xmlns:asvg="http://schemas.microsoft.com/office/drawing/2016/SVG/main" r:embed="rId3"/>
+                      <asvg:svgBlip xmlns:asvg="http://schemas.microsoft.com/office/drawing/2016/SVG/main" xmlns="" r:embed="rId3"/>
                     </a:ext>
                   </a:extLst>
                 </a:blip>
@@ -12627,7 +12631,7 @@
                 <a:blip r:embed="rId2">
                   <a:extLst>
                     <a:ext uri="{96DAC541-7B7A-43D3-8B79-37D633B846F1}">
-                      <asvg:svgBlip xmlns:asvg="http://schemas.microsoft.com/office/drawing/2016/SVG/main" r:embed="rId3"/>
+                      <asvg:svgBlip xmlns:asvg="http://schemas.microsoft.com/office/drawing/2016/SVG/main" xmlns="" r:embed="rId3"/>
                     </a:ext>
                   </a:extLst>
                 </a:blip>
@@ -12669,8 +12673,20 @@
             </a:endParaRPr>
           </a:p>
           <a:p>
+            <a:endParaRPr lang="en-US" sz="1200" b="1" i="1" dirty="0" smtClean="0">
+              <a:solidFill>
+                <a:schemeClr val="tx1">
+                  <a:lumMod val="65000"/>
+                  <a:lumOff val="35000"/>
+                </a:schemeClr>
+              </a:solidFill>
+              <a:latin typeface="Segoe UI" panose="020B0502040204020203" pitchFamily="34" charset="0"/>
+              <a:cs typeface="Segoe UI" panose="020B0502040204020203" pitchFamily="34" charset="0"/>
+            </a:endParaRPr>
+          </a:p>
+          <a:p>
             <a:r>
-              <a:rPr lang="en-US" sz="1400" b="1" i="1" dirty="0">
+              <a:rPr lang="en-US" sz="1200" b="1" i="1" dirty="0" smtClean="0">
                 <a:solidFill>
                   <a:schemeClr val="tx1">
                     <a:lumMod val="65000"/>
@@ -12680,10 +12696,23 @@
                 <a:latin typeface="Segoe UI" panose="020B0502040204020203" pitchFamily="34" charset="0"/>
                 <a:cs typeface="Segoe UI" panose="020B0502040204020203" pitchFamily="34" charset="0"/>
               </a:rPr>
-              <a:t>Note: </a:t>
+              <a:t>Note</a:t>
             </a:r>
             <a:r>
-              <a:rPr lang="en-US" sz="1400" i="1" dirty="0">
+              <a:rPr lang="en-US" sz="1200" b="1" i="1" dirty="0">
+                <a:solidFill>
+                  <a:schemeClr val="tx1">
+                    <a:lumMod val="65000"/>
+                    <a:lumOff val="35000"/>
+                  </a:schemeClr>
+                </a:solidFill>
+                <a:latin typeface="Segoe UI" panose="020B0502040204020203" pitchFamily="34" charset="0"/>
+                <a:cs typeface="Segoe UI" panose="020B0502040204020203" pitchFamily="34" charset="0"/>
+              </a:rPr>
+              <a:t>: </a:t>
+            </a:r>
+            <a:r>
+              <a:rPr lang="en-US" sz="1200" i="1" dirty="0">
                 <a:solidFill>
                   <a:schemeClr val="tx1">
                     <a:lumMod val="65000"/>
@@ -12695,7 +12724,7 @@
               </a:rPr>
               <a:t>More item group categories are planned, for instance, medical, services / contracts, etc. Just need to figure out how items are managed after receipt.</a:t>
             </a:r>
-            <a:endParaRPr lang="en-US" sz="1400" b="1" i="1" dirty="0">
+            <a:endParaRPr lang="en-US" sz="1200" b="1" i="1" dirty="0">
               <a:solidFill>
                 <a:schemeClr val="tx1">
                   <a:lumMod val="65000"/>
@@ -14293,6 +14322,1979 @@
 </p:sld>
 </file>
 
+<file path=ppt/slides/slide6.xml><?xml version="1.0" encoding="utf-8"?>
+<p:sld xmlns:a="http://schemas.openxmlformats.org/drawingml/2006/main" xmlns:r="http://schemas.openxmlformats.org/officeDocument/2006/relationships" xmlns:p="http://schemas.openxmlformats.org/presentationml/2006/main">
+  <p:cSld>
+    <p:bg>
+      <p:bgPr>
+        <a:solidFill>
+          <a:schemeClr val="bg1">
+            <a:lumMod val="95000"/>
+          </a:schemeClr>
+        </a:solidFill>
+        <a:effectLst/>
+      </p:bgPr>
+    </p:bg>
+    <p:spTree>
+      <p:nvGrpSpPr>
+        <p:cNvPr id="1" name=""/>
+        <p:cNvGrpSpPr/>
+        <p:nvPr/>
+      </p:nvGrpSpPr>
+      <p:grpSpPr>
+        <a:xfrm>
+          <a:off x="0" y="0"/>
+          <a:ext cx="0" cy="0"/>
+          <a:chOff x="0" y="0"/>
+          <a:chExt cx="0" cy="0"/>
+        </a:xfrm>
+      </p:grpSpPr>
+      <p:sp>
+        <p:nvSpPr>
+          <p:cNvPr id="120" name="Rectangle 119">
+            <a:extLst>
+              <a:ext uri="{FF2B5EF4-FFF2-40B4-BE49-F238E27FC236}">
+                <a16:creationId xmlns:a16="http://schemas.microsoft.com/office/drawing/2014/main" id="{5B5CFA4C-32E2-456B-8FA7-1EFB1DD90E1C}"/>
+              </a:ext>
+            </a:extLst>
+          </p:cNvPr>
+          <p:cNvSpPr/>
+          <p:nvPr/>
+        </p:nvSpPr>
+        <p:spPr>
+          <a:xfrm>
+            <a:off x="8069592" y="137160"/>
+            <a:ext cx="4021814" cy="6576060"/>
+          </a:xfrm>
+          <a:prstGeom prst="rect">
+            <a:avLst/>
+          </a:prstGeom>
+          <a:solidFill>
+            <a:schemeClr val="bg1"/>
+          </a:solidFill>
+          <a:ln>
+            <a:noFill/>
+          </a:ln>
+        </p:spPr>
+        <p:style>
+          <a:lnRef idx="2">
+            <a:schemeClr val="accent1">
+              <a:shade val="50000"/>
+            </a:schemeClr>
+          </a:lnRef>
+          <a:fillRef idx="1">
+            <a:schemeClr val="accent1"/>
+          </a:fillRef>
+          <a:effectRef idx="0">
+            <a:schemeClr val="accent1"/>
+          </a:effectRef>
+          <a:fontRef idx="minor">
+            <a:schemeClr val="lt1"/>
+          </a:fontRef>
+        </p:style>
+        <p:txBody>
+          <a:bodyPr tIns="91440" bIns="91440" rtlCol="0" anchor="t" anchorCtr="0"/>
+          <a:lstStyle/>
+          <a:p>
+            <a:pPr marL="285750" indent="-285750">
+              <a:buBlip>
+                <a:blip r:embed="rId2">
+                  <a:extLst>
+                    <a:ext uri="{96DAC541-7B7A-43D3-8B79-37D633B846F1}">
+                      <asvg:svgBlip xmlns:asvg="http://schemas.microsoft.com/office/drawing/2016/SVG/main" xmlns="" r:embed="rId3"/>
+                    </a:ext>
+                  </a:extLst>
+                </a:blip>
+              </a:buBlip>
+            </a:pPr>
+            <a:r>
+              <a:rPr lang="en-US" sz="1400" dirty="0" smtClean="0">
+                <a:solidFill>
+                  <a:schemeClr val="tx1">
+                    <a:lumMod val="65000"/>
+                    <a:lumOff val="35000"/>
+                  </a:schemeClr>
+                </a:solidFill>
+                <a:latin typeface="Segoe UI" panose="020B0502040204020203" pitchFamily="34" charset="0"/>
+                <a:cs typeface="Segoe UI" panose="020B0502040204020203" pitchFamily="34" charset="0"/>
+              </a:rPr>
+              <a:t>Property records consist of either </a:t>
+            </a:r>
+            <a:r>
+              <a:rPr lang="en-US" sz="1400" b="1" dirty="0" smtClean="0">
+                <a:solidFill>
+                  <a:schemeClr val="tx1">
+                    <a:lumMod val="65000"/>
+                    <a:lumOff val="35000"/>
+                  </a:schemeClr>
+                </a:solidFill>
+                <a:latin typeface="Segoe UI" panose="020B0502040204020203" pitchFamily="34" charset="0"/>
+                <a:cs typeface="Segoe UI" panose="020B0502040204020203" pitchFamily="34" charset="0"/>
+              </a:rPr>
+              <a:t>Serialized</a:t>
+            </a:r>
+            <a:r>
+              <a:rPr lang="en-US" sz="1400" dirty="0" smtClean="0">
+                <a:solidFill>
+                  <a:schemeClr val="tx1">
+                    <a:lumMod val="65000"/>
+                    <a:lumOff val="35000"/>
+                  </a:schemeClr>
+                </a:solidFill>
+                <a:latin typeface="Segoe UI" panose="020B0502040204020203" pitchFamily="34" charset="0"/>
+                <a:cs typeface="Segoe UI" panose="020B0502040204020203" pitchFamily="34" charset="0"/>
+              </a:rPr>
+              <a:t> items or </a:t>
+            </a:r>
+            <a:r>
+              <a:rPr lang="en-US" sz="1400" b="1" dirty="0" smtClean="0">
+                <a:solidFill>
+                  <a:schemeClr val="tx1">
+                    <a:lumMod val="65000"/>
+                    <a:lumOff val="35000"/>
+                  </a:schemeClr>
+                </a:solidFill>
+                <a:latin typeface="Segoe UI" panose="020B0502040204020203" pitchFamily="34" charset="0"/>
+                <a:cs typeface="Segoe UI" panose="020B0502040204020203" pitchFamily="34" charset="0"/>
+              </a:rPr>
+              <a:t>Hardware </a:t>
+            </a:r>
+            <a:r>
+              <a:rPr lang="en-US" sz="1400" dirty="0" smtClean="0">
+                <a:solidFill>
+                  <a:schemeClr val="tx1">
+                    <a:lumMod val="65000"/>
+                    <a:lumOff val="35000"/>
+                  </a:schemeClr>
+                </a:solidFill>
+                <a:latin typeface="Segoe UI" panose="020B0502040204020203" pitchFamily="34" charset="0"/>
+                <a:cs typeface="Segoe UI" panose="020B0502040204020203" pitchFamily="34" charset="0"/>
+              </a:rPr>
+              <a:t>items.</a:t>
+            </a:r>
+            <a:endParaRPr lang="en-US" sz="1400" dirty="0">
+              <a:solidFill>
+                <a:schemeClr val="tx1">
+                  <a:lumMod val="65000"/>
+                  <a:lumOff val="35000"/>
+                </a:schemeClr>
+              </a:solidFill>
+              <a:latin typeface="Segoe UI" panose="020B0502040204020203" pitchFamily="34" charset="0"/>
+              <a:cs typeface="Segoe UI" panose="020B0502040204020203" pitchFamily="34" charset="0"/>
+            </a:endParaRPr>
+          </a:p>
+          <a:p>
+            <a:pPr marL="285750" indent="-285750">
+              <a:buBlip>
+                <a:blip r:embed="rId2">
+                  <a:extLst>
+                    <a:ext uri="{96DAC541-7B7A-43D3-8B79-37D633B846F1}">
+                      <asvg:svgBlip xmlns:asvg="http://schemas.microsoft.com/office/drawing/2016/SVG/main" xmlns="" r:embed="rId3"/>
+                    </a:ext>
+                  </a:extLst>
+                </a:blip>
+              </a:buBlip>
+            </a:pPr>
+            <a:endParaRPr lang="en-US" sz="1400" dirty="0">
+              <a:solidFill>
+                <a:schemeClr val="tx1">
+                  <a:lumMod val="65000"/>
+                  <a:lumOff val="35000"/>
+                </a:schemeClr>
+              </a:solidFill>
+              <a:latin typeface="Segoe UI" panose="020B0502040204020203" pitchFamily="34" charset="0"/>
+              <a:cs typeface="Segoe UI" panose="020B0502040204020203" pitchFamily="34" charset="0"/>
+            </a:endParaRPr>
+          </a:p>
+          <a:p>
+            <a:pPr marL="285750" indent="-285750">
+              <a:buBlip>
+                <a:blip r:embed="rId2">
+                  <a:extLst>
+                    <a:ext uri="{96DAC541-7B7A-43D3-8B79-37D633B846F1}">
+                      <asvg:svgBlip xmlns:asvg="http://schemas.microsoft.com/office/drawing/2016/SVG/main" xmlns="" r:embed="rId3"/>
+                    </a:ext>
+                  </a:extLst>
+                </a:blip>
+              </a:buBlip>
+            </a:pPr>
+            <a:r>
+              <a:rPr lang="en-US" sz="1400" dirty="0" smtClean="0">
+                <a:solidFill>
+                  <a:schemeClr val="tx1">
+                    <a:lumMod val="65000"/>
+                    <a:lumOff val="35000"/>
+                  </a:schemeClr>
+                </a:solidFill>
+                <a:latin typeface="Segoe UI" panose="020B0502040204020203" pitchFamily="34" charset="0"/>
+                <a:cs typeface="Segoe UI" panose="020B0502040204020203" pitchFamily="34" charset="0"/>
+              </a:rPr>
+              <a:t>Property records are owned and managed by one or more property custodians.</a:t>
+            </a:r>
+          </a:p>
+          <a:p>
+            <a:pPr marL="285750" indent="-285750">
+              <a:buBlip>
+                <a:blip r:embed="rId2">
+                  <a:extLst>
+                    <a:ext uri="{96DAC541-7B7A-43D3-8B79-37D633B846F1}">
+                      <asvg:svgBlip xmlns:asvg="http://schemas.microsoft.com/office/drawing/2016/SVG/main" xmlns="" r:embed="rId3"/>
+                    </a:ext>
+                  </a:extLst>
+                </a:blip>
+              </a:buBlip>
+            </a:pPr>
+            <a:endParaRPr lang="en-US" sz="1400" dirty="0">
+              <a:solidFill>
+                <a:schemeClr val="tx1">
+                  <a:lumMod val="65000"/>
+                  <a:lumOff val="35000"/>
+                </a:schemeClr>
+              </a:solidFill>
+              <a:latin typeface="Segoe UI" panose="020B0502040204020203" pitchFamily="34" charset="0"/>
+              <a:cs typeface="Segoe UI" panose="020B0502040204020203" pitchFamily="34" charset="0"/>
+            </a:endParaRPr>
+          </a:p>
+          <a:p>
+            <a:pPr marL="285750" indent="-285750">
+              <a:buBlip>
+                <a:blip r:embed="rId2">
+                  <a:extLst>
+                    <a:ext uri="{96DAC541-7B7A-43D3-8B79-37D633B846F1}">
+                      <asvg:svgBlip xmlns:asvg="http://schemas.microsoft.com/office/drawing/2016/SVG/main" xmlns="" r:embed="rId3"/>
+                    </a:ext>
+                  </a:extLst>
+                </a:blip>
+              </a:buBlip>
+            </a:pPr>
+            <a:r>
+              <a:rPr lang="en-US" sz="1400" dirty="0" smtClean="0">
+                <a:solidFill>
+                  <a:schemeClr val="tx1">
+                    <a:lumMod val="65000"/>
+                    <a:lumOff val="35000"/>
+                  </a:schemeClr>
+                </a:solidFill>
+                <a:latin typeface="Segoe UI" panose="020B0502040204020203" pitchFamily="34" charset="0"/>
+                <a:cs typeface="Segoe UI" panose="020B0502040204020203" pitchFamily="34" charset="0"/>
+              </a:rPr>
+              <a:t>Items in an item group categorized as Serialized or Hardware will be added to a specified property record automatically upon item receipt.</a:t>
+            </a:r>
+          </a:p>
+          <a:p>
+            <a:pPr marL="285750" indent="-285750">
+              <a:buBlip>
+                <a:blip r:embed="rId2">
+                  <a:extLst>
+                    <a:ext uri="{96DAC541-7B7A-43D3-8B79-37D633B846F1}">
+                      <asvg:svgBlip xmlns:asvg="http://schemas.microsoft.com/office/drawing/2016/SVG/main" xmlns="" r:embed="rId3"/>
+                    </a:ext>
+                  </a:extLst>
+                </a:blip>
+              </a:buBlip>
+            </a:pPr>
+            <a:endParaRPr lang="en-US" sz="1400" dirty="0">
+              <a:solidFill>
+                <a:schemeClr val="tx1">
+                  <a:lumMod val="65000"/>
+                  <a:lumOff val="35000"/>
+                </a:schemeClr>
+              </a:solidFill>
+              <a:latin typeface="Segoe UI" panose="020B0502040204020203" pitchFamily="34" charset="0"/>
+              <a:cs typeface="Segoe UI" panose="020B0502040204020203" pitchFamily="34" charset="0"/>
+            </a:endParaRPr>
+          </a:p>
+          <a:p>
+            <a:endParaRPr lang="en-US" sz="1400" dirty="0" smtClean="0">
+              <a:solidFill>
+                <a:schemeClr val="tx1">
+                  <a:lumMod val="65000"/>
+                  <a:lumOff val="35000"/>
+                </a:schemeClr>
+              </a:solidFill>
+              <a:latin typeface="Segoe UI" panose="020B0502040204020203" pitchFamily="34" charset="0"/>
+              <a:cs typeface="Segoe UI" panose="020B0502040204020203" pitchFamily="34" charset="0"/>
+            </a:endParaRPr>
+          </a:p>
+          <a:p>
+            <a:endParaRPr lang="en-US" sz="1400" dirty="0">
+              <a:solidFill>
+                <a:schemeClr val="tx1">
+                  <a:lumMod val="65000"/>
+                  <a:lumOff val="35000"/>
+                </a:schemeClr>
+              </a:solidFill>
+              <a:latin typeface="Segoe UI" panose="020B0502040204020203" pitchFamily="34" charset="0"/>
+              <a:cs typeface="Segoe UI" panose="020B0502040204020203" pitchFamily="34" charset="0"/>
+            </a:endParaRPr>
+          </a:p>
+          <a:p>
+            <a:endParaRPr lang="en-US" sz="1400" dirty="0" smtClean="0">
+              <a:solidFill>
+                <a:schemeClr val="tx1">
+                  <a:lumMod val="65000"/>
+                  <a:lumOff val="35000"/>
+                </a:schemeClr>
+              </a:solidFill>
+              <a:latin typeface="Segoe UI" panose="020B0502040204020203" pitchFamily="34" charset="0"/>
+              <a:cs typeface="Segoe UI" panose="020B0502040204020203" pitchFamily="34" charset="0"/>
+            </a:endParaRPr>
+          </a:p>
+          <a:p>
+            <a:endParaRPr lang="en-US" sz="1400" dirty="0">
+              <a:solidFill>
+                <a:schemeClr val="tx1">
+                  <a:lumMod val="65000"/>
+                  <a:lumOff val="35000"/>
+                </a:schemeClr>
+              </a:solidFill>
+              <a:latin typeface="Segoe UI" panose="020B0502040204020203" pitchFamily="34" charset="0"/>
+              <a:cs typeface="Segoe UI" panose="020B0502040204020203" pitchFamily="34" charset="0"/>
+            </a:endParaRPr>
+          </a:p>
+          <a:p>
+            <a:endParaRPr lang="en-US" sz="1400" dirty="0" smtClean="0">
+              <a:solidFill>
+                <a:schemeClr val="tx1">
+                  <a:lumMod val="65000"/>
+                  <a:lumOff val="35000"/>
+                </a:schemeClr>
+              </a:solidFill>
+              <a:latin typeface="Segoe UI" panose="020B0502040204020203" pitchFamily="34" charset="0"/>
+              <a:cs typeface="Segoe UI" panose="020B0502040204020203" pitchFamily="34" charset="0"/>
+            </a:endParaRPr>
+          </a:p>
+          <a:p>
+            <a:endParaRPr lang="en-US" sz="1400" dirty="0">
+              <a:solidFill>
+                <a:schemeClr val="tx1">
+                  <a:lumMod val="65000"/>
+                  <a:lumOff val="35000"/>
+                </a:schemeClr>
+              </a:solidFill>
+              <a:latin typeface="Segoe UI" panose="020B0502040204020203" pitchFamily="34" charset="0"/>
+              <a:cs typeface="Segoe UI" panose="020B0502040204020203" pitchFamily="34" charset="0"/>
+            </a:endParaRPr>
+          </a:p>
+          <a:p>
+            <a:endParaRPr lang="en-US" sz="1400" dirty="0" smtClean="0">
+              <a:solidFill>
+                <a:schemeClr val="tx1">
+                  <a:lumMod val="65000"/>
+                  <a:lumOff val="35000"/>
+                </a:schemeClr>
+              </a:solidFill>
+              <a:latin typeface="Segoe UI" panose="020B0502040204020203" pitchFamily="34" charset="0"/>
+              <a:cs typeface="Segoe UI" panose="020B0502040204020203" pitchFamily="34" charset="0"/>
+            </a:endParaRPr>
+          </a:p>
+          <a:p>
+            <a:endParaRPr lang="en-US" sz="1400" dirty="0">
+              <a:solidFill>
+                <a:schemeClr val="tx1">
+                  <a:lumMod val="65000"/>
+                  <a:lumOff val="35000"/>
+                </a:schemeClr>
+              </a:solidFill>
+              <a:latin typeface="Segoe UI" panose="020B0502040204020203" pitchFamily="34" charset="0"/>
+              <a:cs typeface="Segoe UI" panose="020B0502040204020203" pitchFamily="34" charset="0"/>
+            </a:endParaRPr>
+          </a:p>
+          <a:p>
+            <a:endParaRPr lang="en-US" sz="1400" dirty="0" smtClean="0">
+              <a:solidFill>
+                <a:schemeClr val="tx1">
+                  <a:lumMod val="65000"/>
+                  <a:lumOff val="35000"/>
+                </a:schemeClr>
+              </a:solidFill>
+              <a:latin typeface="Segoe UI" panose="020B0502040204020203" pitchFamily="34" charset="0"/>
+              <a:cs typeface="Segoe UI" panose="020B0502040204020203" pitchFamily="34" charset="0"/>
+            </a:endParaRPr>
+          </a:p>
+          <a:p>
+            <a:endParaRPr lang="en-US" sz="1400" dirty="0">
+              <a:solidFill>
+                <a:schemeClr val="tx1">
+                  <a:lumMod val="65000"/>
+                  <a:lumOff val="35000"/>
+                </a:schemeClr>
+              </a:solidFill>
+              <a:latin typeface="Segoe UI" panose="020B0502040204020203" pitchFamily="34" charset="0"/>
+              <a:cs typeface="Segoe UI" panose="020B0502040204020203" pitchFamily="34" charset="0"/>
+            </a:endParaRPr>
+          </a:p>
+          <a:p>
+            <a:endParaRPr lang="en-US" sz="1400" dirty="0" smtClean="0">
+              <a:solidFill>
+                <a:schemeClr val="tx1">
+                  <a:lumMod val="65000"/>
+                  <a:lumOff val="35000"/>
+                </a:schemeClr>
+              </a:solidFill>
+              <a:latin typeface="Segoe UI" panose="020B0502040204020203" pitchFamily="34" charset="0"/>
+              <a:cs typeface="Segoe UI" panose="020B0502040204020203" pitchFamily="34" charset="0"/>
+            </a:endParaRPr>
+          </a:p>
+          <a:p>
+            <a:endParaRPr lang="en-US" sz="1400" dirty="0">
+              <a:solidFill>
+                <a:schemeClr val="tx1">
+                  <a:lumMod val="65000"/>
+                  <a:lumOff val="35000"/>
+                </a:schemeClr>
+              </a:solidFill>
+              <a:latin typeface="Segoe UI" panose="020B0502040204020203" pitchFamily="34" charset="0"/>
+              <a:cs typeface="Segoe UI" panose="020B0502040204020203" pitchFamily="34" charset="0"/>
+            </a:endParaRPr>
+          </a:p>
+          <a:p>
+            <a:endParaRPr lang="en-US" sz="1400" dirty="0" smtClean="0">
+              <a:solidFill>
+                <a:schemeClr val="tx1">
+                  <a:lumMod val="65000"/>
+                  <a:lumOff val="35000"/>
+                </a:schemeClr>
+              </a:solidFill>
+              <a:latin typeface="Segoe UI" panose="020B0502040204020203" pitchFamily="34" charset="0"/>
+              <a:cs typeface="Segoe UI" panose="020B0502040204020203" pitchFamily="34" charset="0"/>
+            </a:endParaRPr>
+          </a:p>
+          <a:p>
+            <a:endParaRPr lang="en-US" sz="1400" dirty="0">
+              <a:solidFill>
+                <a:schemeClr val="tx1">
+                  <a:lumMod val="65000"/>
+                  <a:lumOff val="35000"/>
+                </a:schemeClr>
+              </a:solidFill>
+              <a:latin typeface="Segoe UI" panose="020B0502040204020203" pitchFamily="34" charset="0"/>
+              <a:cs typeface="Segoe UI" panose="020B0502040204020203" pitchFamily="34" charset="0"/>
+            </a:endParaRPr>
+          </a:p>
+          <a:p>
+            <a:endParaRPr lang="en-US" sz="1400" b="1" i="1" dirty="0" smtClean="0">
+              <a:solidFill>
+                <a:schemeClr val="tx1">
+                  <a:lumMod val="65000"/>
+                  <a:lumOff val="35000"/>
+                </a:schemeClr>
+              </a:solidFill>
+              <a:latin typeface="Segoe UI" panose="020B0502040204020203" pitchFamily="34" charset="0"/>
+              <a:cs typeface="Segoe UI" panose="020B0502040204020203" pitchFamily="34" charset="0"/>
+            </a:endParaRPr>
+          </a:p>
+          <a:p>
+            <a:endParaRPr lang="en-US" sz="1400" b="1" i="1" dirty="0">
+              <a:solidFill>
+                <a:schemeClr val="tx1">
+                  <a:lumMod val="65000"/>
+                  <a:lumOff val="35000"/>
+                </a:schemeClr>
+              </a:solidFill>
+              <a:latin typeface="Segoe UI" panose="020B0502040204020203" pitchFamily="34" charset="0"/>
+              <a:cs typeface="Segoe UI" panose="020B0502040204020203" pitchFamily="34" charset="0"/>
+            </a:endParaRPr>
+          </a:p>
+          <a:p>
+            <a:endParaRPr lang="en-US" sz="1200" b="1" i="1" dirty="0" smtClean="0">
+              <a:solidFill>
+                <a:schemeClr val="tx1">
+                  <a:lumMod val="65000"/>
+                  <a:lumOff val="35000"/>
+                </a:schemeClr>
+              </a:solidFill>
+              <a:latin typeface="Segoe UI" panose="020B0502040204020203" pitchFamily="34" charset="0"/>
+              <a:cs typeface="Segoe UI" panose="020B0502040204020203" pitchFamily="34" charset="0"/>
+            </a:endParaRPr>
+          </a:p>
+          <a:p>
+            <a:r>
+              <a:rPr lang="en-US" sz="1200" b="1" i="1" dirty="0" smtClean="0">
+                <a:solidFill>
+                  <a:schemeClr val="tx1">
+                    <a:lumMod val="65000"/>
+                    <a:lumOff val="35000"/>
+                  </a:schemeClr>
+                </a:solidFill>
+                <a:latin typeface="Segoe UI" panose="020B0502040204020203" pitchFamily="34" charset="0"/>
+                <a:cs typeface="Segoe UI" panose="020B0502040204020203" pitchFamily="34" charset="0"/>
+              </a:rPr>
+              <a:t>Note: </a:t>
+            </a:r>
+            <a:r>
+              <a:rPr lang="en-US" sz="1200" i="1" dirty="0" smtClean="0">
+                <a:solidFill>
+                  <a:schemeClr val="tx1">
+                    <a:lumMod val="65000"/>
+                    <a:lumOff val="35000"/>
+                  </a:schemeClr>
+                </a:solidFill>
+                <a:latin typeface="Segoe UI" panose="020B0502040204020203" pitchFamily="34" charset="0"/>
+                <a:cs typeface="Segoe UI" panose="020B0502040204020203" pitchFamily="34" charset="0"/>
+              </a:rPr>
+              <a:t>Items will be able to be added to a property record outside of the acquisitions process.</a:t>
+            </a:r>
+            <a:endParaRPr lang="en-US" sz="1200" b="1" i="1" dirty="0" smtClean="0">
+              <a:solidFill>
+                <a:schemeClr val="tx1">
+                  <a:lumMod val="65000"/>
+                  <a:lumOff val="35000"/>
+                </a:schemeClr>
+              </a:solidFill>
+              <a:latin typeface="Segoe UI" panose="020B0502040204020203" pitchFamily="34" charset="0"/>
+              <a:cs typeface="Segoe UI" panose="020B0502040204020203" pitchFamily="34" charset="0"/>
+            </a:endParaRPr>
+          </a:p>
+        </p:txBody>
+      </p:sp>
+      <p:sp>
+        <p:nvSpPr>
+          <p:cNvPr id="122" name="TextBox 121">
+            <a:extLst>
+              <a:ext uri="{FF2B5EF4-FFF2-40B4-BE49-F238E27FC236}">
+                <a16:creationId xmlns:a16="http://schemas.microsoft.com/office/drawing/2014/main" id="{00AEB9A2-B192-429C-A1AA-E469E891430E}"/>
+              </a:ext>
+            </a:extLst>
+          </p:cNvPr>
+          <p:cNvSpPr txBox="1"/>
+          <p:nvPr/>
+        </p:nvSpPr>
+        <p:spPr>
+          <a:xfrm>
+            <a:off x="100585" y="140315"/>
+            <a:ext cx="7859260" cy="461665"/>
+          </a:xfrm>
+          <a:prstGeom prst="rect">
+            <a:avLst/>
+          </a:prstGeom>
+          <a:noFill/>
+        </p:spPr>
+        <p:txBody>
+          <a:bodyPr wrap="square" rtlCol="0">
+            <a:spAutoFit/>
+          </a:bodyPr>
+          <a:lstStyle/>
+          <a:p>
+            <a:r>
+              <a:rPr lang="en-US" sz="2400" dirty="0" smtClean="0">
+                <a:latin typeface="Segoe UI" panose="020B0502040204020203" pitchFamily="34" charset="0"/>
+                <a:cs typeface="Segoe UI" panose="020B0502040204020203" pitchFamily="34" charset="0"/>
+              </a:rPr>
+              <a:t>Property Records</a:t>
+            </a:r>
+            <a:endParaRPr lang="en-US" sz="2400" dirty="0">
+              <a:latin typeface="Segoe UI" panose="020B0502040204020203" pitchFamily="34" charset="0"/>
+              <a:cs typeface="Segoe UI" panose="020B0502040204020203" pitchFamily="34" charset="0"/>
+            </a:endParaRPr>
+          </a:p>
+        </p:txBody>
+      </p:sp>
+      <p:sp>
+        <p:nvSpPr>
+          <p:cNvPr id="91" name="Title 90" hidden="1">
+            <a:extLst>
+              <a:ext uri="{FF2B5EF4-FFF2-40B4-BE49-F238E27FC236}">
+                <a16:creationId xmlns:a16="http://schemas.microsoft.com/office/drawing/2014/main" id="{E54F4FD7-2CE1-4EF1-AFD3-49BC5355BE16}"/>
+              </a:ext>
+            </a:extLst>
+          </p:cNvPr>
+          <p:cNvSpPr>
+            <a:spLocks noGrp="1"/>
+          </p:cNvSpPr>
+          <p:nvPr>
+            <p:ph type="ctrTitle"/>
+          </p:nvPr>
+        </p:nvSpPr>
+        <p:spPr/>
+        <p:txBody>
+          <a:bodyPr/>
+          <a:lstStyle/>
+          <a:p>
+            <a:r>
+              <a:rPr lang="en-US" dirty="0"/>
+              <a:t>Funding Accounts</a:t>
+            </a:r>
+          </a:p>
+        </p:txBody>
+      </p:sp>
+      <p:grpSp>
+        <p:nvGrpSpPr>
+          <p:cNvPr id="20" name="Group 19"/>
+          <p:cNvGrpSpPr/>
+          <p:nvPr/>
+        </p:nvGrpSpPr>
+        <p:grpSpPr>
+          <a:xfrm>
+            <a:off x="100579" y="853758"/>
+            <a:ext cx="7859266" cy="5803804"/>
+            <a:chOff x="100579" y="853758"/>
+            <a:chExt cx="7859266" cy="5803804"/>
+          </a:xfrm>
+        </p:grpSpPr>
+        <p:sp>
+          <p:nvSpPr>
+            <p:cNvPr id="57" name="Rectangle 56">
+              <a:extLst>
+                <a:ext uri="{FF2B5EF4-FFF2-40B4-BE49-F238E27FC236}">
+                  <a16:creationId xmlns:a16="http://schemas.microsoft.com/office/drawing/2014/main" id="{4808B174-B9CF-4CAD-8A19-1BC9D885D3B3}"/>
+                </a:ext>
+              </a:extLst>
+            </p:cNvPr>
+            <p:cNvSpPr/>
+            <p:nvPr/>
+          </p:nvSpPr>
+          <p:spPr>
+            <a:xfrm>
+              <a:off x="100584" y="853758"/>
+              <a:ext cx="7859261" cy="274320"/>
+            </a:xfrm>
+            <a:prstGeom prst="rect">
+              <a:avLst/>
+            </a:prstGeom>
+            <a:solidFill>
+              <a:schemeClr val="tx1">
+                <a:lumMod val="75000"/>
+                <a:lumOff val="25000"/>
+              </a:schemeClr>
+            </a:solidFill>
+            <a:ln>
+              <a:noFill/>
+            </a:ln>
+          </p:spPr>
+          <p:style>
+            <a:lnRef idx="2">
+              <a:schemeClr val="accent1">
+                <a:shade val="50000"/>
+              </a:schemeClr>
+            </a:lnRef>
+            <a:fillRef idx="1">
+              <a:schemeClr val="accent1"/>
+            </a:fillRef>
+            <a:effectRef idx="0">
+              <a:schemeClr val="accent1"/>
+            </a:effectRef>
+            <a:fontRef idx="minor">
+              <a:schemeClr val="lt1"/>
+            </a:fontRef>
+          </p:style>
+          <p:txBody>
+            <a:bodyPr rtlCol="0" anchor="ctr"/>
+            <a:lstStyle/>
+            <a:p>
+              <a:pPr algn="ctr"/>
+              <a:r>
+                <a:rPr lang="en-US" sz="1600" dirty="0" smtClean="0">
+                  <a:latin typeface="Segoe UI" panose="020B0502040204020203" pitchFamily="34" charset="0"/>
+                  <a:cs typeface="Segoe UI" panose="020B0502040204020203" pitchFamily="34" charset="0"/>
+                </a:rPr>
+                <a:t>Property Record</a:t>
+              </a:r>
+              <a:endParaRPr lang="en-US" sz="1600" dirty="0">
+                <a:latin typeface="Segoe UI" panose="020B0502040204020203" pitchFamily="34" charset="0"/>
+                <a:cs typeface="Segoe UI" panose="020B0502040204020203" pitchFamily="34" charset="0"/>
+              </a:endParaRPr>
+            </a:p>
+          </p:txBody>
+        </p:sp>
+        <p:grpSp>
+          <p:nvGrpSpPr>
+            <p:cNvPr id="5" name="Group 4"/>
+            <p:cNvGrpSpPr/>
+            <p:nvPr/>
+          </p:nvGrpSpPr>
+          <p:grpSpPr>
+            <a:xfrm>
+              <a:off x="100579" y="2022973"/>
+              <a:ext cx="2286005" cy="2090202"/>
+              <a:chOff x="100579" y="1614397"/>
+              <a:chExt cx="2286005" cy="2090202"/>
+            </a:xfrm>
+          </p:grpSpPr>
+          <p:sp>
+            <p:nvSpPr>
+              <p:cNvPr id="39" name="Rectangle 38">
+                <a:extLst>
+                  <a:ext uri="{FF2B5EF4-FFF2-40B4-BE49-F238E27FC236}">
+                    <a16:creationId xmlns:a16="http://schemas.microsoft.com/office/drawing/2014/main" id="{5626B030-B48B-42C0-9339-F603883EA700}"/>
+                  </a:ext>
+                </a:extLst>
+              </p:cNvPr>
+              <p:cNvSpPr/>
+              <p:nvPr/>
+            </p:nvSpPr>
+            <p:spPr>
+              <a:xfrm>
+                <a:off x="100584" y="1614397"/>
+                <a:ext cx="2286000" cy="274320"/>
+              </a:xfrm>
+              <a:prstGeom prst="rect">
+                <a:avLst/>
+              </a:prstGeom>
+              <a:solidFill>
+                <a:schemeClr val="tx1">
+                  <a:lumMod val="75000"/>
+                  <a:lumOff val="25000"/>
+                </a:schemeClr>
+              </a:solidFill>
+              <a:ln>
+                <a:noFill/>
+              </a:ln>
+            </p:spPr>
+            <p:style>
+              <a:lnRef idx="2">
+                <a:schemeClr val="accent1">
+                  <a:shade val="50000"/>
+                </a:schemeClr>
+              </a:lnRef>
+              <a:fillRef idx="1">
+                <a:schemeClr val="accent1"/>
+              </a:fillRef>
+              <a:effectRef idx="0">
+                <a:schemeClr val="accent1"/>
+              </a:effectRef>
+              <a:fontRef idx="minor">
+                <a:schemeClr val="lt1"/>
+              </a:fontRef>
+            </p:style>
+            <p:txBody>
+              <a:bodyPr rtlCol="0" anchor="ctr"/>
+              <a:lstStyle/>
+              <a:p>
+                <a:pPr algn="ctr"/>
+                <a:r>
+                  <a:rPr lang="en-US" sz="1600" dirty="0" smtClean="0">
+                    <a:latin typeface="Segoe UI" panose="020B0502040204020203" pitchFamily="34" charset="0"/>
+                    <a:cs typeface="Segoe UI" panose="020B0502040204020203" pitchFamily="34" charset="0"/>
+                  </a:rPr>
+                  <a:t>Item - Serialized</a:t>
+                </a:r>
+                <a:endParaRPr lang="en-US" sz="1600" dirty="0">
+                  <a:latin typeface="Segoe UI" panose="020B0502040204020203" pitchFamily="34" charset="0"/>
+                  <a:cs typeface="Segoe UI" panose="020B0502040204020203" pitchFamily="34" charset="0"/>
+                </a:endParaRPr>
+              </a:p>
+            </p:txBody>
+          </p:sp>
+          <p:sp>
+            <p:nvSpPr>
+              <p:cNvPr id="41" name="Rectangle 40">
+                <a:extLst>
+                  <a:ext uri="{FF2B5EF4-FFF2-40B4-BE49-F238E27FC236}">
+                    <a16:creationId xmlns:a16="http://schemas.microsoft.com/office/drawing/2014/main" id="{92F3C2D4-DE2E-4B48-93DA-8F055147368D}"/>
+                  </a:ext>
+                </a:extLst>
+              </p:cNvPr>
+              <p:cNvSpPr/>
+              <p:nvPr/>
+            </p:nvSpPr>
+            <p:spPr>
+              <a:xfrm>
+                <a:off x="100579" y="1888717"/>
+                <a:ext cx="2286000" cy="1815882"/>
+              </a:xfrm>
+              <a:prstGeom prst="rect">
+                <a:avLst/>
+              </a:prstGeom>
+              <a:solidFill>
+                <a:schemeClr val="bg1">
+                  <a:lumMod val="85000"/>
+                </a:schemeClr>
+              </a:solidFill>
+              <a:ln>
+                <a:noFill/>
+              </a:ln>
+            </p:spPr>
+            <p:style>
+              <a:lnRef idx="2">
+                <a:schemeClr val="accent1">
+                  <a:shade val="50000"/>
+                </a:schemeClr>
+              </a:lnRef>
+              <a:fillRef idx="1">
+                <a:schemeClr val="accent1"/>
+              </a:fillRef>
+              <a:effectRef idx="0">
+                <a:schemeClr val="accent1"/>
+              </a:effectRef>
+              <a:fontRef idx="minor">
+                <a:schemeClr val="lt1"/>
+              </a:fontRef>
+            </p:style>
+            <p:txBody>
+              <a:bodyPr rtlCol="0" anchor="ctr" anchorCtr="0">
+                <a:spAutoFit/>
+              </a:bodyPr>
+              <a:lstStyle/>
+              <a:p>
+                <a:pPr algn="ctr"/>
+                <a:r>
+                  <a:rPr lang="en-US" sz="1400" dirty="0" smtClean="0">
+                    <a:solidFill>
+                      <a:schemeClr val="tx1">
+                        <a:lumMod val="65000"/>
+                        <a:lumOff val="35000"/>
+                      </a:schemeClr>
+                    </a:solidFill>
+                    <a:latin typeface="Segoe UI" panose="020B0502040204020203" pitchFamily="34" charset="0"/>
+                    <a:cs typeface="Segoe UI" panose="020B0502040204020203" pitchFamily="34" charset="0"/>
+                  </a:rPr>
+                  <a:t>Category</a:t>
+                </a:r>
+              </a:p>
+              <a:p>
+                <a:pPr algn="ctr"/>
+                <a:r>
+                  <a:rPr lang="en-US" sz="1400" dirty="0" smtClean="0">
+                    <a:solidFill>
+                      <a:schemeClr val="tx1">
+                        <a:lumMod val="65000"/>
+                        <a:lumOff val="35000"/>
+                      </a:schemeClr>
+                    </a:solidFill>
+                    <a:latin typeface="Segoe UI" panose="020B0502040204020203" pitchFamily="34" charset="0"/>
+                    <a:cs typeface="Segoe UI" panose="020B0502040204020203" pitchFamily="34" charset="0"/>
+                  </a:rPr>
+                  <a:t>Order – If Exists</a:t>
+                </a:r>
+              </a:p>
+              <a:p>
+                <a:pPr algn="ctr"/>
+                <a:r>
+                  <a:rPr lang="en-US" sz="1400" dirty="0" smtClean="0">
+                    <a:solidFill>
+                      <a:schemeClr val="tx1">
+                        <a:lumMod val="65000"/>
+                        <a:lumOff val="35000"/>
+                      </a:schemeClr>
+                    </a:solidFill>
+                    <a:latin typeface="Segoe UI" panose="020B0502040204020203" pitchFamily="34" charset="0"/>
+                    <a:cs typeface="Segoe UI" panose="020B0502040204020203" pitchFamily="34" charset="0"/>
+                  </a:rPr>
+                  <a:t>Manufacturer</a:t>
+                </a:r>
+              </a:p>
+              <a:p>
+                <a:pPr algn="ctr"/>
+                <a:r>
+                  <a:rPr lang="en-US" sz="1400" dirty="0" smtClean="0">
+                    <a:solidFill>
+                      <a:schemeClr val="tx1">
+                        <a:lumMod val="65000"/>
+                        <a:lumOff val="35000"/>
+                      </a:schemeClr>
+                    </a:solidFill>
+                    <a:latin typeface="Segoe UI" panose="020B0502040204020203" pitchFamily="34" charset="0"/>
+                    <a:cs typeface="Segoe UI" panose="020B0502040204020203" pitchFamily="34" charset="0"/>
+                  </a:rPr>
+                  <a:t>Model</a:t>
+                </a:r>
+              </a:p>
+              <a:p>
+                <a:pPr algn="ctr"/>
+                <a:r>
+                  <a:rPr lang="en-US" sz="1400" dirty="0" smtClean="0">
+                    <a:solidFill>
+                      <a:schemeClr val="tx1">
+                        <a:lumMod val="65000"/>
+                        <a:lumOff val="35000"/>
+                      </a:schemeClr>
+                    </a:solidFill>
+                    <a:latin typeface="Segoe UI" panose="020B0502040204020203" pitchFamily="34" charset="0"/>
+                    <a:cs typeface="Segoe UI" panose="020B0502040204020203" pitchFamily="34" charset="0"/>
+                  </a:rPr>
+                  <a:t>Nsn</a:t>
+                </a:r>
+              </a:p>
+              <a:p>
+                <a:pPr algn="ctr"/>
+                <a:r>
+                  <a:rPr lang="en-US" sz="1400" dirty="0" smtClean="0">
+                    <a:solidFill>
+                      <a:schemeClr val="tx1">
+                        <a:lumMod val="65000"/>
+                        <a:lumOff val="35000"/>
+                      </a:schemeClr>
+                    </a:solidFill>
+                    <a:latin typeface="Segoe UI" panose="020B0502040204020203" pitchFamily="34" charset="0"/>
+                    <a:cs typeface="Segoe UI" panose="020B0502040204020203" pitchFamily="34" charset="0"/>
+                  </a:rPr>
+                  <a:t>Item Type</a:t>
+                </a:r>
+              </a:p>
+              <a:p>
+                <a:pPr algn="ctr"/>
+                <a:r>
+                  <a:rPr lang="en-US" sz="1400" dirty="0" smtClean="0">
+                    <a:solidFill>
+                      <a:schemeClr val="tx1">
+                        <a:lumMod val="65000"/>
+                        <a:lumOff val="35000"/>
+                      </a:schemeClr>
+                    </a:solidFill>
+                    <a:latin typeface="Segoe UI" panose="020B0502040204020203" pitchFamily="34" charset="0"/>
+                    <a:cs typeface="Segoe UI" panose="020B0502040204020203" pitchFamily="34" charset="0"/>
+                  </a:rPr>
+                  <a:t>Serial Number</a:t>
+                </a:r>
+              </a:p>
+              <a:p>
+                <a:pPr algn="ctr"/>
+                <a:r>
+                  <a:rPr lang="en-US" sz="1400" dirty="0" smtClean="0">
+                    <a:solidFill>
+                      <a:schemeClr val="tx1">
+                        <a:lumMod val="65000"/>
+                        <a:lumOff val="35000"/>
+                      </a:schemeClr>
+                    </a:solidFill>
+                    <a:latin typeface="Segoe UI" panose="020B0502040204020203" pitchFamily="34" charset="0"/>
+                    <a:cs typeface="Segoe UI" panose="020B0502040204020203" pitchFamily="34" charset="0"/>
+                  </a:rPr>
+                  <a:t>Location</a:t>
+                </a:r>
+                <a:endParaRPr lang="en-US" sz="1400" dirty="0">
+                  <a:solidFill>
+                    <a:schemeClr val="tx1">
+                      <a:lumMod val="65000"/>
+                      <a:lumOff val="35000"/>
+                    </a:schemeClr>
+                  </a:solidFill>
+                  <a:latin typeface="Segoe UI" panose="020B0502040204020203" pitchFamily="34" charset="0"/>
+                  <a:cs typeface="Segoe UI" panose="020B0502040204020203" pitchFamily="34" charset="0"/>
+                </a:endParaRPr>
+              </a:p>
+            </p:txBody>
+          </p:sp>
+        </p:grpSp>
+        <p:grpSp>
+          <p:nvGrpSpPr>
+            <p:cNvPr id="34" name="Group 33"/>
+            <p:cNvGrpSpPr/>
+            <p:nvPr/>
+          </p:nvGrpSpPr>
+          <p:grpSpPr>
+            <a:xfrm>
+              <a:off x="5673840" y="2022973"/>
+              <a:ext cx="2286005" cy="582097"/>
+              <a:chOff x="5673840" y="2413521"/>
+              <a:chExt cx="2286005" cy="582097"/>
+            </a:xfrm>
+          </p:grpSpPr>
+          <p:sp>
+            <p:nvSpPr>
+              <p:cNvPr id="35" name="Rectangle 34">
+                <a:extLst>
+                  <a:ext uri="{FF2B5EF4-FFF2-40B4-BE49-F238E27FC236}">
+                    <a16:creationId xmlns:a16="http://schemas.microsoft.com/office/drawing/2014/main" id="{E2297E7F-D88B-439C-91BA-40F70CF26D80}"/>
+                  </a:ext>
+                </a:extLst>
+              </p:cNvPr>
+              <p:cNvSpPr/>
+              <p:nvPr/>
+            </p:nvSpPr>
+            <p:spPr>
+              <a:xfrm>
+                <a:off x="5673845" y="2413521"/>
+                <a:ext cx="2286000" cy="274320"/>
+              </a:xfrm>
+              <a:prstGeom prst="rect">
+                <a:avLst/>
+              </a:prstGeom>
+              <a:solidFill>
+                <a:schemeClr val="tx1">
+                  <a:lumMod val="75000"/>
+                  <a:lumOff val="25000"/>
+                </a:schemeClr>
+              </a:solidFill>
+              <a:ln>
+                <a:noFill/>
+              </a:ln>
+            </p:spPr>
+            <p:style>
+              <a:lnRef idx="2">
+                <a:schemeClr val="accent1">
+                  <a:shade val="50000"/>
+                </a:schemeClr>
+              </a:lnRef>
+              <a:fillRef idx="1">
+                <a:schemeClr val="accent1"/>
+              </a:fillRef>
+              <a:effectRef idx="0">
+                <a:schemeClr val="accent1"/>
+              </a:effectRef>
+              <a:fontRef idx="minor">
+                <a:schemeClr val="lt1"/>
+              </a:fontRef>
+            </p:style>
+            <p:txBody>
+              <a:bodyPr rtlCol="0" anchor="ctr"/>
+              <a:lstStyle/>
+              <a:p>
+                <a:pPr algn="ctr"/>
+                <a:r>
+                  <a:rPr lang="en-US" sz="1600" dirty="0" smtClean="0">
+                    <a:latin typeface="Segoe UI" panose="020B0502040204020203" pitchFamily="34" charset="0"/>
+                    <a:cs typeface="Segoe UI" panose="020B0502040204020203" pitchFamily="34" charset="0"/>
+                  </a:rPr>
+                  <a:t>Property Custodian</a:t>
+                </a:r>
+                <a:endParaRPr lang="en-US" sz="1600" dirty="0">
+                  <a:latin typeface="Segoe UI" panose="020B0502040204020203" pitchFamily="34" charset="0"/>
+                  <a:cs typeface="Segoe UI" panose="020B0502040204020203" pitchFamily="34" charset="0"/>
+                </a:endParaRPr>
+              </a:p>
+            </p:txBody>
+          </p:sp>
+          <p:sp>
+            <p:nvSpPr>
+              <p:cNvPr id="36" name="Rectangle 35">
+                <a:extLst>
+                  <a:ext uri="{FF2B5EF4-FFF2-40B4-BE49-F238E27FC236}">
+                    <a16:creationId xmlns:a16="http://schemas.microsoft.com/office/drawing/2014/main" id="{34EF0660-717C-40BE-8EF0-14F53806A4C8}"/>
+                  </a:ext>
+                </a:extLst>
+              </p:cNvPr>
+              <p:cNvSpPr/>
+              <p:nvPr/>
+            </p:nvSpPr>
+            <p:spPr>
+              <a:xfrm>
+                <a:off x="5673840" y="2687841"/>
+                <a:ext cx="2286000" cy="307777"/>
+              </a:xfrm>
+              <a:prstGeom prst="rect">
+                <a:avLst/>
+              </a:prstGeom>
+              <a:solidFill>
+                <a:schemeClr val="bg1">
+                  <a:lumMod val="85000"/>
+                </a:schemeClr>
+              </a:solidFill>
+              <a:ln>
+                <a:noFill/>
+              </a:ln>
+            </p:spPr>
+            <p:style>
+              <a:lnRef idx="2">
+                <a:schemeClr val="accent1">
+                  <a:shade val="50000"/>
+                </a:schemeClr>
+              </a:lnRef>
+              <a:fillRef idx="1">
+                <a:schemeClr val="accent1"/>
+              </a:fillRef>
+              <a:effectRef idx="0">
+                <a:schemeClr val="accent1"/>
+              </a:effectRef>
+              <a:fontRef idx="minor">
+                <a:schemeClr val="lt1"/>
+              </a:fontRef>
+            </p:style>
+            <p:txBody>
+              <a:bodyPr rtlCol="0" anchor="ctr" anchorCtr="0">
+                <a:spAutoFit/>
+              </a:bodyPr>
+              <a:lstStyle/>
+              <a:p>
+                <a:pPr algn="ctr"/>
+                <a:r>
+                  <a:rPr lang="en-US" sz="1400" dirty="0" smtClean="0">
+                    <a:solidFill>
+                      <a:schemeClr val="tx1">
+                        <a:lumMod val="65000"/>
+                        <a:lumOff val="35000"/>
+                      </a:schemeClr>
+                    </a:solidFill>
+                    <a:latin typeface="Segoe UI" panose="020B0502040204020203" pitchFamily="34" charset="0"/>
+                    <a:cs typeface="Segoe UI" panose="020B0502040204020203" pitchFamily="34" charset="0"/>
+                  </a:rPr>
+                  <a:t>User</a:t>
+                </a:r>
+                <a:endParaRPr lang="en-US" sz="1400" dirty="0">
+                  <a:solidFill>
+                    <a:schemeClr val="tx1">
+                      <a:lumMod val="65000"/>
+                      <a:lumOff val="35000"/>
+                    </a:schemeClr>
+                  </a:solidFill>
+                  <a:latin typeface="Segoe UI" panose="020B0502040204020203" pitchFamily="34" charset="0"/>
+                  <a:cs typeface="Segoe UI" panose="020B0502040204020203" pitchFamily="34" charset="0"/>
+                </a:endParaRPr>
+              </a:p>
+            </p:txBody>
+          </p:sp>
+        </p:grpSp>
+        <p:grpSp>
+          <p:nvGrpSpPr>
+            <p:cNvPr id="37" name="Group 36"/>
+            <p:cNvGrpSpPr/>
+            <p:nvPr/>
+          </p:nvGrpSpPr>
+          <p:grpSpPr>
+            <a:xfrm>
+              <a:off x="5673840" y="2822097"/>
+              <a:ext cx="2286005" cy="582097"/>
+              <a:chOff x="5673840" y="2413521"/>
+              <a:chExt cx="2286005" cy="582097"/>
+            </a:xfrm>
+          </p:grpSpPr>
+          <p:sp>
+            <p:nvSpPr>
+              <p:cNvPr id="40" name="Rectangle 39">
+                <a:extLst>
+                  <a:ext uri="{FF2B5EF4-FFF2-40B4-BE49-F238E27FC236}">
+                    <a16:creationId xmlns:a16="http://schemas.microsoft.com/office/drawing/2014/main" id="{E2297E7F-D88B-439C-91BA-40F70CF26D80}"/>
+                  </a:ext>
+                </a:extLst>
+              </p:cNvPr>
+              <p:cNvSpPr/>
+              <p:nvPr/>
+            </p:nvSpPr>
+            <p:spPr>
+              <a:xfrm>
+                <a:off x="5673845" y="2413521"/>
+                <a:ext cx="2286000" cy="274320"/>
+              </a:xfrm>
+              <a:prstGeom prst="rect">
+                <a:avLst/>
+              </a:prstGeom>
+              <a:solidFill>
+                <a:schemeClr val="tx1">
+                  <a:lumMod val="75000"/>
+                  <a:lumOff val="25000"/>
+                </a:schemeClr>
+              </a:solidFill>
+              <a:ln>
+                <a:noFill/>
+              </a:ln>
+            </p:spPr>
+            <p:style>
+              <a:lnRef idx="2">
+                <a:schemeClr val="accent1">
+                  <a:shade val="50000"/>
+                </a:schemeClr>
+              </a:lnRef>
+              <a:fillRef idx="1">
+                <a:schemeClr val="accent1"/>
+              </a:fillRef>
+              <a:effectRef idx="0">
+                <a:schemeClr val="accent1"/>
+              </a:effectRef>
+              <a:fontRef idx="minor">
+                <a:schemeClr val="lt1"/>
+              </a:fontRef>
+            </p:style>
+            <p:txBody>
+              <a:bodyPr rtlCol="0" anchor="ctr"/>
+              <a:lstStyle/>
+              <a:p>
+                <a:pPr algn="ctr"/>
+                <a:r>
+                  <a:rPr lang="en-US" sz="1600" dirty="0" smtClean="0">
+                    <a:latin typeface="Segoe UI" panose="020B0502040204020203" pitchFamily="34" charset="0"/>
+                    <a:cs typeface="Segoe UI" panose="020B0502040204020203" pitchFamily="34" charset="0"/>
+                  </a:rPr>
+                  <a:t>Property Custodian</a:t>
+                </a:r>
+                <a:endParaRPr lang="en-US" sz="1600" dirty="0">
+                  <a:latin typeface="Segoe UI" panose="020B0502040204020203" pitchFamily="34" charset="0"/>
+                  <a:cs typeface="Segoe UI" panose="020B0502040204020203" pitchFamily="34" charset="0"/>
+                </a:endParaRPr>
+              </a:p>
+            </p:txBody>
+          </p:sp>
+          <p:sp>
+            <p:nvSpPr>
+              <p:cNvPr id="43" name="Rectangle 42">
+                <a:extLst>
+                  <a:ext uri="{FF2B5EF4-FFF2-40B4-BE49-F238E27FC236}">
+                    <a16:creationId xmlns:a16="http://schemas.microsoft.com/office/drawing/2014/main" id="{34EF0660-717C-40BE-8EF0-14F53806A4C8}"/>
+                  </a:ext>
+                </a:extLst>
+              </p:cNvPr>
+              <p:cNvSpPr/>
+              <p:nvPr/>
+            </p:nvSpPr>
+            <p:spPr>
+              <a:xfrm>
+                <a:off x="5673840" y="2687841"/>
+                <a:ext cx="2286000" cy="307777"/>
+              </a:xfrm>
+              <a:prstGeom prst="rect">
+                <a:avLst/>
+              </a:prstGeom>
+              <a:solidFill>
+                <a:schemeClr val="bg1">
+                  <a:lumMod val="85000"/>
+                </a:schemeClr>
+              </a:solidFill>
+              <a:ln>
+                <a:noFill/>
+              </a:ln>
+            </p:spPr>
+            <p:style>
+              <a:lnRef idx="2">
+                <a:schemeClr val="accent1">
+                  <a:shade val="50000"/>
+                </a:schemeClr>
+              </a:lnRef>
+              <a:fillRef idx="1">
+                <a:schemeClr val="accent1"/>
+              </a:fillRef>
+              <a:effectRef idx="0">
+                <a:schemeClr val="accent1"/>
+              </a:effectRef>
+              <a:fontRef idx="minor">
+                <a:schemeClr val="lt1"/>
+              </a:fontRef>
+            </p:style>
+            <p:txBody>
+              <a:bodyPr rtlCol="0" anchor="ctr" anchorCtr="0">
+                <a:spAutoFit/>
+              </a:bodyPr>
+              <a:lstStyle/>
+              <a:p>
+                <a:pPr algn="ctr"/>
+                <a:r>
+                  <a:rPr lang="en-US" sz="1400" dirty="0" smtClean="0">
+                    <a:solidFill>
+                      <a:schemeClr val="tx1">
+                        <a:lumMod val="65000"/>
+                        <a:lumOff val="35000"/>
+                      </a:schemeClr>
+                    </a:solidFill>
+                    <a:latin typeface="Segoe UI" panose="020B0502040204020203" pitchFamily="34" charset="0"/>
+                    <a:cs typeface="Segoe UI" panose="020B0502040204020203" pitchFamily="34" charset="0"/>
+                  </a:rPr>
+                  <a:t>User</a:t>
+                </a:r>
+                <a:endParaRPr lang="en-US" sz="1400" dirty="0">
+                  <a:solidFill>
+                    <a:schemeClr val="tx1">
+                      <a:lumMod val="65000"/>
+                      <a:lumOff val="35000"/>
+                    </a:schemeClr>
+                  </a:solidFill>
+                  <a:latin typeface="Segoe UI" panose="020B0502040204020203" pitchFamily="34" charset="0"/>
+                  <a:cs typeface="Segoe UI" panose="020B0502040204020203" pitchFamily="34" charset="0"/>
+                </a:endParaRPr>
+              </a:p>
+            </p:txBody>
+          </p:sp>
+        </p:grpSp>
+        <p:grpSp>
+          <p:nvGrpSpPr>
+            <p:cNvPr id="53" name="Group 52"/>
+            <p:cNvGrpSpPr/>
+            <p:nvPr/>
+          </p:nvGrpSpPr>
+          <p:grpSpPr>
+            <a:xfrm>
+              <a:off x="5673840" y="3584597"/>
+              <a:ext cx="2286005" cy="582097"/>
+              <a:chOff x="5673840" y="2413521"/>
+              <a:chExt cx="2286005" cy="582097"/>
+            </a:xfrm>
+          </p:grpSpPr>
+          <p:sp>
+            <p:nvSpPr>
+              <p:cNvPr id="58" name="Rectangle 57">
+                <a:extLst>
+                  <a:ext uri="{FF2B5EF4-FFF2-40B4-BE49-F238E27FC236}">
+                    <a16:creationId xmlns:a16="http://schemas.microsoft.com/office/drawing/2014/main" id="{E2297E7F-D88B-439C-91BA-40F70CF26D80}"/>
+                  </a:ext>
+                </a:extLst>
+              </p:cNvPr>
+              <p:cNvSpPr/>
+              <p:nvPr/>
+            </p:nvSpPr>
+            <p:spPr>
+              <a:xfrm>
+                <a:off x="5673845" y="2413521"/>
+                <a:ext cx="2286000" cy="274320"/>
+              </a:xfrm>
+              <a:prstGeom prst="rect">
+                <a:avLst/>
+              </a:prstGeom>
+              <a:solidFill>
+                <a:schemeClr val="tx1">
+                  <a:lumMod val="75000"/>
+                  <a:lumOff val="25000"/>
+                </a:schemeClr>
+              </a:solidFill>
+              <a:ln>
+                <a:noFill/>
+              </a:ln>
+            </p:spPr>
+            <p:style>
+              <a:lnRef idx="2">
+                <a:schemeClr val="accent1">
+                  <a:shade val="50000"/>
+                </a:schemeClr>
+              </a:lnRef>
+              <a:fillRef idx="1">
+                <a:schemeClr val="accent1"/>
+              </a:fillRef>
+              <a:effectRef idx="0">
+                <a:schemeClr val="accent1"/>
+              </a:effectRef>
+              <a:fontRef idx="minor">
+                <a:schemeClr val="lt1"/>
+              </a:fontRef>
+            </p:style>
+            <p:txBody>
+              <a:bodyPr rtlCol="0" anchor="ctr"/>
+              <a:lstStyle/>
+              <a:p>
+                <a:pPr algn="ctr"/>
+                <a:r>
+                  <a:rPr lang="en-US" sz="1600" dirty="0" smtClean="0">
+                    <a:latin typeface="Segoe UI" panose="020B0502040204020203" pitchFamily="34" charset="0"/>
+                    <a:cs typeface="Segoe UI" panose="020B0502040204020203" pitchFamily="34" charset="0"/>
+                  </a:rPr>
+                  <a:t>Property Custodian</a:t>
+                </a:r>
+                <a:endParaRPr lang="en-US" sz="1600" dirty="0">
+                  <a:latin typeface="Segoe UI" panose="020B0502040204020203" pitchFamily="34" charset="0"/>
+                  <a:cs typeface="Segoe UI" panose="020B0502040204020203" pitchFamily="34" charset="0"/>
+                </a:endParaRPr>
+              </a:p>
+            </p:txBody>
+          </p:sp>
+          <p:sp>
+            <p:nvSpPr>
+              <p:cNvPr id="59" name="Rectangle 58">
+                <a:extLst>
+                  <a:ext uri="{FF2B5EF4-FFF2-40B4-BE49-F238E27FC236}">
+                    <a16:creationId xmlns:a16="http://schemas.microsoft.com/office/drawing/2014/main" id="{34EF0660-717C-40BE-8EF0-14F53806A4C8}"/>
+                  </a:ext>
+                </a:extLst>
+              </p:cNvPr>
+              <p:cNvSpPr/>
+              <p:nvPr/>
+            </p:nvSpPr>
+            <p:spPr>
+              <a:xfrm>
+                <a:off x="5673840" y="2687841"/>
+                <a:ext cx="2286000" cy="307777"/>
+              </a:xfrm>
+              <a:prstGeom prst="rect">
+                <a:avLst/>
+              </a:prstGeom>
+              <a:solidFill>
+                <a:schemeClr val="bg1">
+                  <a:lumMod val="85000"/>
+                </a:schemeClr>
+              </a:solidFill>
+              <a:ln>
+                <a:noFill/>
+              </a:ln>
+            </p:spPr>
+            <p:style>
+              <a:lnRef idx="2">
+                <a:schemeClr val="accent1">
+                  <a:shade val="50000"/>
+                </a:schemeClr>
+              </a:lnRef>
+              <a:fillRef idx="1">
+                <a:schemeClr val="accent1"/>
+              </a:fillRef>
+              <a:effectRef idx="0">
+                <a:schemeClr val="accent1"/>
+              </a:effectRef>
+              <a:fontRef idx="minor">
+                <a:schemeClr val="lt1"/>
+              </a:fontRef>
+            </p:style>
+            <p:txBody>
+              <a:bodyPr rtlCol="0" anchor="ctr" anchorCtr="0">
+                <a:spAutoFit/>
+              </a:bodyPr>
+              <a:lstStyle/>
+              <a:p>
+                <a:pPr algn="ctr"/>
+                <a:r>
+                  <a:rPr lang="en-US" sz="1400" dirty="0" smtClean="0">
+                    <a:solidFill>
+                      <a:schemeClr val="tx1">
+                        <a:lumMod val="65000"/>
+                        <a:lumOff val="35000"/>
+                      </a:schemeClr>
+                    </a:solidFill>
+                    <a:latin typeface="Segoe UI" panose="020B0502040204020203" pitchFamily="34" charset="0"/>
+                    <a:cs typeface="Segoe UI" panose="020B0502040204020203" pitchFamily="34" charset="0"/>
+                  </a:rPr>
+                  <a:t>User</a:t>
+                </a:r>
+                <a:endParaRPr lang="en-US" sz="1400" dirty="0">
+                  <a:solidFill>
+                    <a:schemeClr val="tx1">
+                      <a:lumMod val="65000"/>
+                      <a:lumOff val="35000"/>
+                    </a:schemeClr>
+                  </a:solidFill>
+                  <a:latin typeface="Segoe UI" panose="020B0502040204020203" pitchFamily="34" charset="0"/>
+                  <a:cs typeface="Segoe UI" panose="020B0502040204020203" pitchFamily="34" charset="0"/>
+                </a:endParaRPr>
+              </a:p>
+            </p:txBody>
+          </p:sp>
+        </p:grpSp>
+        <p:sp>
+          <p:nvSpPr>
+            <p:cNvPr id="60" name="Rectangle 59">
+              <a:extLst>
+                <a:ext uri="{FF2B5EF4-FFF2-40B4-BE49-F238E27FC236}">
+                  <a16:creationId xmlns:a16="http://schemas.microsoft.com/office/drawing/2014/main" id="{34EF0660-717C-40BE-8EF0-14F53806A4C8}"/>
+                </a:ext>
+              </a:extLst>
+            </p:cNvPr>
+            <p:cNvSpPr/>
+            <p:nvPr/>
+          </p:nvSpPr>
+          <p:spPr>
+            <a:xfrm>
+              <a:off x="100584" y="1127759"/>
+              <a:ext cx="7859256" cy="523220"/>
+            </a:xfrm>
+            <a:prstGeom prst="rect">
+              <a:avLst/>
+            </a:prstGeom>
+            <a:solidFill>
+              <a:schemeClr val="bg1">
+                <a:lumMod val="85000"/>
+              </a:schemeClr>
+            </a:solidFill>
+            <a:ln>
+              <a:noFill/>
+            </a:ln>
+          </p:spPr>
+          <p:style>
+            <a:lnRef idx="2">
+              <a:schemeClr val="accent1">
+                <a:shade val="50000"/>
+              </a:schemeClr>
+            </a:lnRef>
+            <a:fillRef idx="1">
+              <a:schemeClr val="accent1"/>
+            </a:fillRef>
+            <a:effectRef idx="0">
+              <a:schemeClr val="accent1"/>
+            </a:effectRef>
+            <a:fontRef idx="minor">
+              <a:schemeClr val="lt1"/>
+            </a:fontRef>
+          </p:style>
+          <p:txBody>
+            <a:bodyPr wrap="square" rtlCol="0" anchor="ctr" anchorCtr="0">
+              <a:spAutoFit/>
+            </a:bodyPr>
+            <a:lstStyle/>
+            <a:p>
+              <a:pPr algn="ctr"/>
+              <a:r>
+                <a:rPr lang="en-US" sz="1400" dirty="0" smtClean="0">
+                  <a:solidFill>
+                    <a:schemeClr val="tx1">
+                      <a:lumMod val="65000"/>
+                      <a:lumOff val="35000"/>
+                    </a:schemeClr>
+                  </a:solidFill>
+                  <a:latin typeface="Segoe UI" panose="020B0502040204020203" pitchFamily="34" charset="0"/>
+                  <a:cs typeface="Segoe UI" panose="020B0502040204020203" pitchFamily="34" charset="0"/>
+                </a:rPr>
+                <a:t>Site</a:t>
+              </a:r>
+            </a:p>
+            <a:p>
+              <a:pPr algn="ctr"/>
+              <a:r>
+                <a:rPr lang="en-US" sz="1400" dirty="0" smtClean="0">
+                  <a:solidFill>
+                    <a:schemeClr val="tx1">
+                      <a:lumMod val="65000"/>
+                      <a:lumOff val="35000"/>
+                    </a:schemeClr>
+                  </a:solidFill>
+                  <a:latin typeface="Segoe UI" panose="020B0502040204020203" pitchFamily="34" charset="0"/>
+                  <a:cs typeface="Segoe UI" panose="020B0502040204020203" pitchFamily="34" charset="0"/>
+                </a:rPr>
+                <a:t>Name</a:t>
+              </a:r>
+              <a:endParaRPr lang="en-US" sz="1400" dirty="0">
+                <a:solidFill>
+                  <a:schemeClr val="tx1">
+                    <a:lumMod val="65000"/>
+                    <a:lumOff val="35000"/>
+                  </a:schemeClr>
+                </a:solidFill>
+                <a:latin typeface="Segoe UI" panose="020B0502040204020203" pitchFamily="34" charset="0"/>
+                <a:cs typeface="Segoe UI" panose="020B0502040204020203" pitchFamily="34" charset="0"/>
+              </a:endParaRPr>
+            </a:p>
+          </p:txBody>
+        </p:sp>
+        <p:grpSp>
+          <p:nvGrpSpPr>
+            <p:cNvPr id="4" name="Group 3"/>
+            <p:cNvGrpSpPr/>
+            <p:nvPr/>
+          </p:nvGrpSpPr>
+          <p:grpSpPr>
+            <a:xfrm>
+              <a:off x="100579" y="4351917"/>
+              <a:ext cx="2286005" cy="2305645"/>
+              <a:chOff x="100579" y="3943341"/>
+              <a:chExt cx="2286005" cy="2305645"/>
+            </a:xfrm>
+          </p:grpSpPr>
+          <p:sp>
+            <p:nvSpPr>
+              <p:cNvPr id="69" name="Rectangle 68">
+                <a:extLst>
+                  <a:ext uri="{FF2B5EF4-FFF2-40B4-BE49-F238E27FC236}">
+                    <a16:creationId xmlns:a16="http://schemas.microsoft.com/office/drawing/2014/main" id="{5626B030-B48B-42C0-9339-F603883EA700}"/>
+                  </a:ext>
+                </a:extLst>
+              </p:cNvPr>
+              <p:cNvSpPr/>
+              <p:nvPr/>
+            </p:nvSpPr>
+            <p:spPr>
+              <a:xfrm>
+                <a:off x="100584" y="3943341"/>
+                <a:ext cx="2286000" cy="274320"/>
+              </a:xfrm>
+              <a:prstGeom prst="rect">
+                <a:avLst/>
+              </a:prstGeom>
+              <a:solidFill>
+                <a:schemeClr val="tx1">
+                  <a:lumMod val="75000"/>
+                  <a:lumOff val="25000"/>
+                </a:schemeClr>
+              </a:solidFill>
+              <a:ln>
+                <a:noFill/>
+              </a:ln>
+            </p:spPr>
+            <p:style>
+              <a:lnRef idx="2">
+                <a:schemeClr val="accent1">
+                  <a:shade val="50000"/>
+                </a:schemeClr>
+              </a:lnRef>
+              <a:fillRef idx="1">
+                <a:schemeClr val="accent1"/>
+              </a:fillRef>
+              <a:effectRef idx="0">
+                <a:schemeClr val="accent1"/>
+              </a:effectRef>
+              <a:fontRef idx="minor">
+                <a:schemeClr val="lt1"/>
+              </a:fontRef>
+            </p:style>
+            <p:txBody>
+              <a:bodyPr rtlCol="0" anchor="ctr"/>
+              <a:lstStyle/>
+              <a:p>
+                <a:pPr algn="ctr"/>
+                <a:r>
+                  <a:rPr lang="en-US" sz="1600" dirty="0" smtClean="0">
+                    <a:latin typeface="Segoe UI" panose="020B0502040204020203" pitchFamily="34" charset="0"/>
+                    <a:cs typeface="Segoe UI" panose="020B0502040204020203" pitchFamily="34" charset="0"/>
+                  </a:rPr>
+                  <a:t>Item - Hardware</a:t>
+                </a:r>
+                <a:endParaRPr lang="en-US" sz="1600" dirty="0">
+                  <a:latin typeface="Segoe UI" panose="020B0502040204020203" pitchFamily="34" charset="0"/>
+                  <a:cs typeface="Segoe UI" panose="020B0502040204020203" pitchFamily="34" charset="0"/>
+                </a:endParaRPr>
+              </a:p>
+            </p:txBody>
+          </p:sp>
+          <p:sp>
+            <p:nvSpPr>
+              <p:cNvPr id="70" name="Rectangle 69">
+                <a:extLst>
+                  <a:ext uri="{FF2B5EF4-FFF2-40B4-BE49-F238E27FC236}">
+                    <a16:creationId xmlns:a16="http://schemas.microsoft.com/office/drawing/2014/main" id="{92F3C2D4-DE2E-4B48-93DA-8F055147368D}"/>
+                  </a:ext>
+                </a:extLst>
+              </p:cNvPr>
+              <p:cNvSpPr/>
+              <p:nvPr/>
+            </p:nvSpPr>
+            <p:spPr>
+              <a:xfrm>
+                <a:off x="100579" y="4217661"/>
+                <a:ext cx="2286000" cy="2031325"/>
+              </a:xfrm>
+              <a:prstGeom prst="rect">
+                <a:avLst/>
+              </a:prstGeom>
+              <a:solidFill>
+                <a:schemeClr val="bg1">
+                  <a:lumMod val="85000"/>
+                </a:schemeClr>
+              </a:solidFill>
+              <a:ln>
+                <a:noFill/>
+              </a:ln>
+            </p:spPr>
+            <p:style>
+              <a:lnRef idx="2">
+                <a:schemeClr val="accent1">
+                  <a:shade val="50000"/>
+                </a:schemeClr>
+              </a:lnRef>
+              <a:fillRef idx="1">
+                <a:schemeClr val="accent1"/>
+              </a:fillRef>
+              <a:effectRef idx="0">
+                <a:schemeClr val="accent1"/>
+              </a:effectRef>
+              <a:fontRef idx="minor">
+                <a:schemeClr val="lt1"/>
+              </a:fontRef>
+            </p:style>
+            <p:txBody>
+              <a:bodyPr rtlCol="0" anchor="ctr" anchorCtr="0">
+                <a:spAutoFit/>
+              </a:bodyPr>
+              <a:lstStyle/>
+              <a:p>
+                <a:pPr algn="ctr"/>
+                <a:r>
+                  <a:rPr lang="en-US" sz="1400" dirty="0" smtClean="0">
+                    <a:solidFill>
+                      <a:schemeClr val="tx1">
+                        <a:lumMod val="65000"/>
+                        <a:lumOff val="35000"/>
+                      </a:schemeClr>
+                    </a:solidFill>
+                    <a:latin typeface="Segoe UI" panose="020B0502040204020203" pitchFamily="34" charset="0"/>
+                    <a:cs typeface="Segoe UI" panose="020B0502040204020203" pitchFamily="34" charset="0"/>
+                  </a:rPr>
+                  <a:t>Category</a:t>
+                </a:r>
+              </a:p>
+              <a:p>
+                <a:pPr algn="ctr"/>
+                <a:r>
+                  <a:rPr lang="en-US" sz="1400" dirty="0" smtClean="0">
+                    <a:solidFill>
+                      <a:schemeClr val="tx1">
+                        <a:lumMod val="65000"/>
+                        <a:lumOff val="35000"/>
+                      </a:schemeClr>
+                    </a:solidFill>
+                    <a:latin typeface="Segoe UI" panose="020B0502040204020203" pitchFamily="34" charset="0"/>
+                    <a:cs typeface="Segoe UI" panose="020B0502040204020203" pitchFamily="34" charset="0"/>
+                  </a:rPr>
+                  <a:t>Order – If Exists</a:t>
+                </a:r>
+              </a:p>
+              <a:p>
+                <a:pPr algn="ctr"/>
+                <a:r>
+                  <a:rPr lang="en-US" sz="1400" dirty="0" smtClean="0">
+                    <a:solidFill>
+                      <a:schemeClr val="tx1">
+                        <a:lumMod val="65000"/>
+                        <a:lumOff val="35000"/>
+                      </a:schemeClr>
+                    </a:solidFill>
+                    <a:latin typeface="Segoe UI" panose="020B0502040204020203" pitchFamily="34" charset="0"/>
+                    <a:cs typeface="Segoe UI" panose="020B0502040204020203" pitchFamily="34" charset="0"/>
+                  </a:rPr>
+                  <a:t>Manufacturer</a:t>
+                </a:r>
+              </a:p>
+              <a:p>
+                <a:pPr algn="ctr"/>
+                <a:r>
+                  <a:rPr lang="en-US" sz="1400" dirty="0" smtClean="0">
+                    <a:solidFill>
+                      <a:schemeClr val="tx1">
+                        <a:lumMod val="65000"/>
+                        <a:lumOff val="35000"/>
+                      </a:schemeClr>
+                    </a:solidFill>
+                    <a:latin typeface="Segoe UI" panose="020B0502040204020203" pitchFamily="34" charset="0"/>
+                    <a:cs typeface="Segoe UI" panose="020B0502040204020203" pitchFamily="34" charset="0"/>
+                  </a:rPr>
+                  <a:t>Model</a:t>
+                </a:r>
+              </a:p>
+              <a:p>
+                <a:pPr algn="ctr"/>
+                <a:r>
+                  <a:rPr lang="en-US" sz="1400" dirty="0" smtClean="0">
+                    <a:solidFill>
+                      <a:schemeClr val="tx1">
+                        <a:lumMod val="65000"/>
+                        <a:lumOff val="35000"/>
+                      </a:schemeClr>
+                    </a:solidFill>
+                    <a:latin typeface="Segoe UI" panose="020B0502040204020203" pitchFamily="34" charset="0"/>
+                    <a:cs typeface="Segoe UI" panose="020B0502040204020203" pitchFamily="34" charset="0"/>
+                  </a:rPr>
+                  <a:t>Nsn</a:t>
+                </a:r>
+              </a:p>
+              <a:p>
+                <a:pPr algn="ctr"/>
+                <a:r>
+                  <a:rPr lang="en-US" sz="1400" dirty="0" smtClean="0">
+                    <a:solidFill>
+                      <a:schemeClr val="tx1">
+                        <a:lumMod val="65000"/>
+                        <a:lumOff val="35000"/>
+                      </a:schemeClr>
+                    </a:solidFill>
+                    <a:latin typeface="Segoe UI" panose="020B0502040204020203" pitchFamily="34" charset="0"/>
+                    <a:cs typeface="Segoe UI" panose="020B0502040204020203" pitchFamily="34" charset="0"/>
+                  </a:rPr>
+                  <a:t>Item Type</a:t>
+                </a:r>
+              </a:p>
+              <a:p>
+                <a:pPr algn="ctr"/>
+                <a:r>
+                  <a:rPr lang="en-US" sz="1400" dirty="0" smtClean="0">
+                    <a:solidFill>
+                      <a:schemeClr val="tx1">
+                        <a:lumMod val="65000"/>
+                        <a:lumOff val="35000"/>
+                      </a:schemeClr>
+                    </a:solidFill>
+                    <a:latin typeface="Segoe UI" panose="020B0502040204020203" pitchFamily="34" charset="0"/>
+                    <a:cs typeface="Segoe UI" panose="020B0502040204020203" pitchFamily="34" charset="0"/>
+                  </a:rPr>
+                  <a:t>Service Tag</a:t>
+                </a:r>
+              </a:p>
+              <a:p>
+                <a:pPr algn="ctr"/>
+                <a:r>
+                  <a:rPr lang="en-US" sz="1400" dirty="0" smtClean="0">
+                    <a:solidFill>
+                      <a:schemeClr val="tx1">
+                        <a:lumMod val="65000"/>
+                        <a:lumOff val="35000"/>
+                      </a:schemeClr>
+                    </a:solidFill>
+                    <a:latin typeface="Segoe UI" panose="020B0502040204020203" pitchFamily="34" charset="0"/>
+                    <a:cs typeface="Segoe UI" panose="020B0502040204020203" pitchFamily="34" charset="0"/>
+                  </a:rPr>
+                  <a:t>Mac Address</a:t>
+                </a:r>
+              </a:p>
+              <a:p>
+                <a:pPr algn="ctr"/>
+                <a:r>
+                  <a:rPr lang="en-US" sz="1400" dirty="0" smtClean="0">
+                    <a:solidFill>
+                      <a:schemeClr val="tx1">
+                        <a:lumMod val="65000"/>
+                        <a:lumOff val="35000"/>
+                      </a:schemeClr>
+                    </a:solidFill>
+                    <a:latin typeface="Segoe UI" panose="020B0502040204020203" pitchFamily="34" charset="0"/>
+                    <a:cs typeface="Segoe UI" panose="020B0502040204020203" pitchFamily="34" charset="0"/>
+                  </a:rPr>
+                  <a:t>Location</a:t>
+                </a:r>
+              </a:p>
+            </p:txBody>
+          </p:sp>
+        </p:grpSp>
+        <p:cxnSp>
+          <p:nvCxnSpPr>
+            <p:cNvPr id="7" name="Straight Connector 6"/>
+            <p:cNvCxnSpPr>
+              <a:stCxn id="60" idx="2"/>
+              <a:endCxn id="39" idx="0"/>
+            </p:cNvCxnSpPr>
+            <p:nvPr/>
+          </p:nvCxnSpPr>
+          <p:spPr>
+            <a:xfrm flipH="1">
+              <a:off x="1243584" y="1650979"/>
+              <a:ext cx="2786628" cy="371994"/>
+            </a:xfrm>
+            <a:prstGeom prst="line">
+              <a:avLst/>
+            </a:prstGeom>
+            <a:ln w="12700"/>
+          </p:spPr>
+          <p:style>
+            <a:lnRef idx="1">
+              <a:schemeClr val="accent6"/>
+            </a:lnRef>
+            <a:fillRef idx="0">
+              <a:schemeClr val="accent6"/>
+            </a:fillRef>
+            <a:effectRef idx="0">
+              <a:schemeClr val="accent6"/>
+            </a:effectRef>
+            <a:fontRef idx="minor">
+              <a:schemeClr val="tx1"/>
+            </a:fontRef>
+          </p:style>
+        </p:cxnSp>
+        <p:cxnSp>
+          <p:nvCxnSpPr>
+            <p:cNvPr id="10" name="Straight Connector 9"/>
+            <p:cNvCxnSpPr>
+              <a:stCxn id="41" idx="2"/>
+              <a:endCxn id="69" idx="0"/>
+            </p:cNvCxnSpPr>
+            <p:nvPr/>
+          </p:nvCxnSpPr>
+          <p:spPr>
+            <a:xfrm>
+              <a:off x="1243579" y="4113175"/>
+              <a:ext cx="5" cy="238742"/>
+            </a:xfrm>
+            <a:prstGeom prst="line">
+              <a:avLst/>
+            </a:prstGeom>
+            <a:ln w="12700"/>
+          </p:spPr>
+          <p:style>
+            <a:lnRef idx="1">
+              <a:schemeClr val="accent6"/>
+            </a:lnRef>
+            <a:fillRef idx="0">
+              <a:schemeClr val="accent6"/>
+            </a:fillRef>
+            <a:effectRef idx="0">
+              <a:schemeClr val="accent6"/>
+            </a:effectRef>
+            <a:fontRef idx="minor">
+              <a:schemeClr val="tx1"/>
+            </a:fontRef>
+          </p:style>
+        </p:cxnSp>
+        <p:cxnSp>
+          <p:nvCxnSpPr>
+            <p:cNvPr id="12" name="Straight Connector 11"/>
+            <p:cNvCxnSpPr>
+              <a:stCxn id="60" idx="2"/>
+              <a:endCxn id="35" idx="0"/>
+            </p:cNvCxnSpPr>
+            <p:nvPr/>
+          </p:nvCxnSpPr>
+          <p:spPr>
+            <a:xfrm>
+              <a:off x="4030212" y="1650979"/>
+              <a:ext cx="2786633" cy="371994"/>
+            </a:xfrm>
+            <a:prstGeom prst="line">
+              <a:avLst/>
+            </a:prstGeom>
+            <a:ln w="12700"/>
+          </p:spPr>
+          <p:style>
+            <a:lnRef idx="1">
+              <a:schemeClr val="accent6"/>
+            </a:lnRef>
+            <a:fillRef idx="0">
+              <a:schemeClr val="accent6"/>
+            </a:fillRef>
+            <a:effectRef idx="0">
+              <a:schemeClr val="accent6"/>
+            </a:effectRef>
+            <a:fontRef idx="minor">
+              <a:schemeClr val="tx1"/>
+            </a:fontRef>
+          </p:style>
+        </p:cxnSp>
+        <p:cxnSp>
+          <p:nvCxnSpPr>
+            <p:cNvPr id="15" name="Straight Connector 14"/>
+            <p:cNvCxnSpPr>
+              <a:stCxn id="36" idx="2"/>
+              <a:endCxn id="40" idx="0"/>
+            </p:cNvCxnSpPr>
+            <p:nvPr/>
+          </p:nvCxnSpPr>
+          <p:spPr>
+            <a:xfrm>
+              <a:off x="6816840" y="2605070"/>
+              <a:ext cx="5" cy="217027"/>
+            </a:xfrm>
+            <a:prstGeom prst="line">
+              <a:avLst/>
+            </a:prstGeom>
+            <a:ln w="12700"/>
+          </p:spPr>
+          <p:style>
+            <a:lnRef idx="1">
+              <a:schemeClr val="accent6"/>
+            </a:lnRef>
+            <a:fillRef idx="0">
+              <a:schemeClr val="accent6"/>
+            </a:fillRef>
+            <a:effectRef idx="0">
+              <a:schemeClr val="accent6"/>
+            </a:effectRef>
+            <a:fontRef idx="minor">
+              <a:schemeClr val="tx1"/>
+            </a:fontRef>
+          </p:style>
+        </p:cxnSp>
+        <p:cxnSp>
+          <p:nvCxnSpPr>
+            <p:cNvPr id="17" name="Straight Connector 16"/>
+            <p:cNvCxnSpPr>
+              <a:stCxn id="43" idx="2"/>
+              <a:endCxn id="58" idx="0"/>
+            </p:cNvCxnSpPr>
+            <p:nvPr/>
+          </p:nvCxnSpPr>
+          <p:spPr>
+            <a:xfrm>
+              <a:off x="6816840" y="3404194"/>
+              <a:ext cx="5" cy="180403"/>
+            </a:xfrm>
+            <a:prstGeom prst="line">
+              <a:avLst/>
+            </a:prstGeom>
+            <a:ln w="12700"/>
+          </p:spPr>
+          <p:style>
+            <a:lnRef idx="1">
+              <a:schemeClr val="accent6"/>
+            </a:lnRef>
+            <a:fillRef idx="0">
+              <a:schemeClr val="accent6"/>
+            </a:fillRef>
+            <a:effectRef idx="0">
+              <a:schemeClr val="accent6"/>
+            </a:effectRef>
+            <a:fontRef idx="minor">
+              <a:schemeClr val="tx1"/>
+            </a:fontRef>
+          </p:style>
+        </p:cxnSp>
+      </p:grpSp>
+    </p:spTree>
+    <p:extLst>
+      <p:ext uri="{BB962C8B-B14F-4D97-AF65-F5344CB8AC3E}">
+        <p14:creationId xmlns:p14="http://schemas.microsoft.com/office/powerpoint/2010/main" val="1611663487"/>
+      </p:ext>
+    </p:extLst>
+  </p:cSld>
+  <p:clrMapOvr>
+    <a:masterClrMapping/>
+  </p:clrMapOvr>
+</p:sld>
+</file>
+
 <file path=ppt/theme/theme1.xml><?xml version="1.0" encoding="utf-8"?>
 <a:theme xmlns:a="http://schemas.openxmlformats.org/drawingml/2006/main" name="Office Theme">
   <a:themeElements>

</xml_diff>

<commit_message>
finalize database layout and update reference materials
</commit_message>
<xml_diff>
--- a/documents/logistics-workflow.pptx
+++ b/documents/logistics-workflow.pptx
@@ -5,7 +5,7 @@
     <p:sldMasterId id="2147483648" r:id="rId1"/>
   </p:sldMasterIdLst>
   <p:notesMasterIdLst>
-    <p:notesMasterId r:id="rId10"/>
+    <p:notesMasterId r:id="rId11"/>
   </p:notesMasterIdLst>
   <p:sldIdLst>
     <p:sldId id="256" r:id="rId2"/>
@@ -16,6 +16,7 @@
     <p:sldId id="261" r:id="rId7"/>
     <p:sldId id="262" r:id="rId8"/>
     <p:sldId id="263" r:id="rId9"/>
+    <p:sldId id="264" r:id="rId10"/>
   </p:sldIdLst>
   <p:sldSz cx="12192000" cy="6858000"/>
   <p:notesSz cx="6858000" cy="9144000"/>
@@ -207,7 +208,7 @@
           <a:p>
             <a:fld id="{43B0E059-6658-4D71-8B6C-28F57D967E6A}" type="datetimeFigureOut">
               <a:rPr lang="en-US" smtClean="0"/>
-              <a:t>6/15/2018</a:t>
+              <a:t>6/18/2018</a:t>
             </a:fld>
             <a:endParaRPr lang="en-US"/>
           </a:p>
@@ -705,7 +706,7 @@
           <a:p>
             <a:fld id="{62DCD513-4A56-4C2D-835C-3CD568EC1873}" type="datetimeFigureOut">
               <a:rPr lang="en-US" smtClean="0"/>
-              <a:t>6/15/2018</a:t>
+              <a:t>6/18/2018</a:t>
             </a:fld>
             <a:endParaRPr lang="en-US"/>
           </a:p>
@@ -903,7 +904,7 @@
           <a:p>
             <a:fld id="{62DCD513-4A56-4C2D-835C-3CD568EC1873}" type="datetimeFigureOut">
               <a:rPr lang="en-US" smtClean="0"/>
-              <a:t>6/15/2018</a:t>
+              <a:t>6/18/2018</a:t>
             </a:fld>
             <a:endParaRPr lang="en-US"/>
           </a:p>
@@ -1111,7 +1112,7 @@
           <a:p>
             <a:fld id="{62DCD513-4A56-4C2D-835C-3CD568EC1873}" type="datetimeFigureOut">
               <a:rPr lang="en-US" smtClean="0"/>
-              <a:t>6/15/2018</a:t>
+              <a:t>6/18/2018</a:t>
             </a:fld>
             <a:endParaRPr lang="en-US"/>
           </a:p>
@@ -1309,7 +1310,7 @@
           <a:p>
             <a:fld id="{62DCD513-4A56-4C2D-835C-3CD568EC1873}" type="datetimeFigureOut">
               <a:rPr lang="en-US" smtClean="0"/>
-              <a:t>6/15/2018</a:t>
+              <a:t>6/18/2018</a:t>
             </a:fld>
             <a:endParaRPr lang="en-US"/>
           </a:p>
@@ -1584,7 +1585,7 @@
           <a:p>
             <a:fld id="{62DCD513-4A56-4C2D-835C-3CD568EC1873}" type="datetimeFigureOut">
               <a:rPr lang="en-US" smtClean="0"/>
-              <a:t>6/15/2018</a:t>
+              <a:t>6/18/2018</a:t>
             </a:fld>
             <a:endParaRPr lang="en-US"/>
           </a:p>
@@ -1849,7 +1850,7 @@
           <a:p>
             <a:fld id="{62DCD513-4A56-4C2D-835C-3CD568EC1873}" type="datetimeFigureOut">
               <a:rPr lang="en-US" smtClean="0"/>
-              <a:t>6/15/2018</a:t>
+              <a:t>6/18/2018</a:t>
             </a:fld>
             <a:endParaRPr lang="en-US"/>
           </a:p>
@@ -2261,7 +2262,7 @@
           <a:p>
             <a:fld id="{62DCD513-4A56-4C2D-835C-3CD568EC1873}" type="datetimeFigureOut">
               <a:rPr lang="en-US" smtClean="0"/>
-              <a:t>6/15/2018</a:t>
+              <a:t>6/18/2018</a:t>
             </a:fld>
             <a:endParaRPr lang="en-US"/>
           </a:p>
@@ -2402,7 +2403,7 @@
           <a:p>
             <a:fld id="{62DCD513-4A56-4C2D-835C-3CD568EC1873}" type="datetimeFigureOut">
               <a:rPr lang="en-US" smtClean="0"/>
-              <a:t>6/15/2018</a:t>
+              <a:t>6/18/2018</a:t>
             </a:fld>
             <a:endParaRPr lang="en-US"/>
           </a:p>
@@ -2515,7 +2516,7 @@
           <a:p>
             <a:fld id="{62DCD513-4A56-4C2D-835C-3CD568EC1873}" type="datetimeFigureOut">
               <a:rPr lang="en-US" smtClean="0"/>
-              <a:t>6/15/2018</a:t>
+              <a:t>6/18/2018</a:t>
             </a:fld>
             <a:endParaRPr lang="en-US"/>
           </a:p>
@@ -2826,7 +2827,7 @@
           <a:p>
             <a:fld id="{62DCD513-4A56-4C2D-835C-3CD568EC1873}" type="datetimeFigureOut">
               <a:rPr lang="en-US" smtClean="0"/>
-              <a:t>6/15/2018</a:t>
+              <a:t>6/18/2018</a:t>
             </a:fld>
             <a:endParaRPr lang="en-US"/>
           </a:p>
@@ -3114,7 +3115,7 @@
           <a:p>
             <a:fld id="{62DCD513-4A56-4C2D-835C-3CD568EC1873}" type="datetimeFigureOut">
               <a:rPr lang="en-US" smtClean="0"/>
-              <a:t>6/15/2018</a:t>
+              <a:t>6/18/2018</a:t>
             </a:fld>
             <a:endParaRPr lang="en-US"/>
           </a:p>
@@ -3355,7 +3356,7 @@
           <a:p>
             <a:fld id="{62DCD513-4A56-4C2D-835C-3CD568EC1873}" type="datetimeFigureOut">
               <a:rPr lang="en-US" smtClean="0"/>
-              <a:t>6/15/2018</a:t>
+              <a:t>6/18/2018</a:t>
             </a:fld>
             <a:endParaRPr lang="en-US"/>
           </a:p>
@@ -5219,7 +5220,7 @@
                 <a:blip r:embed="rId3">
                   <a:extLst>
                     <a:ext uri="{96DAC541-7B7A-43D3-8B79-37D633B846F1}">
-                      <asvg:svgBlip xmlns:asvg="http://schemas.microsoft.com/office/drawing/2016/SVG/main" xmlns="" r:embed="rId4"/>
+                      <asvg:svgBlip xmlns="" xmlns:asvg="http://schemas.microsoft.com/office/drawing/2016/SVG/main" r:embed="rId4"/>
                     </a:ext>
                   </a:extLst>
                 </a:blip>
@@ -5245,7 +5246,7 @@
                 <a:blip r:embed="rId3">
                   <a:extLst>
                     <a:ext uri="{96DAC541-7B7A-43D3-8B79-37D633B846F1}">
-                      <asvg:svgBlip xmlns:asvg="http://schemas.microsoft.com/office/drawing/2016/SVG/main" xmlns="" r:embed="rId4"/>
+                      <asvg:svgBlip xmlns="" xmlns:asvg="http://schemas.microsoft.com/office/drawing/2016/SVG/main" r:embed="rId4"/>
                     </a:ext>
                   </a:extLst>
                 </a:blip>
@@ -5268,7 +5269,7 @@
                 <a:blip r:embed="rId3">
                   <a:extLst>
                     <a:ext uri="{96DAC541-7B7A-43D3-8B79-37D633B846F1}">
-                      <asvg:svgBlip xmlns:asvg="http://schemas.microsoft.com/office/drawing/2016/SVG/main" xmlns="" r:embed="rId4"/>
+                      <asvg:svgBlip xmlns="" xmlns:asvg="http://schemas.microsoft.com/office/drawing/2016/SVG/main" r:embed="rId4"/>
                     </a:ext>
                   </a:extLst>
                 </a:blip>
@@ -5294,7 +5295,7 @@
                 <a:blip r:embed="rId3">
                   <a:extLst>
                     <a:ext uri="{96DAC541-7B7A-43D3-8B79-37D633B846F1}">
-                      <asvg:svgBlip xmlns:asvg="http://schemas.microsoft.com/office/drawing/2016/SVG/main" xmlns="" r:embed="rId4"/>
+                      <asvg:svgBlip xmlns="" xmlns:asvg="http://schemas.microsoft.com/office/drawing/2016/SVG/main" r:embed="rId4"/>
                     </a:ext>
                   </a:extLst>
                 </a:blip>
@@ -5317,7 +5318,7 @@
                 <a:blip r:embed="rId3">
                   <a:extLst>
                     <a:ext uri="{96DAC541-7B7A-43D3-8B79-37D633B846F1}">
-                      <asvg:svgBlip xmlns:asvg="http://schemas.microsoft.com/office/drawing/2016/SVG/main" xmlns="" r:embed="rId4"/>
+                      <asvg:svgBlip xmlns="" xmlns:asvg="http://schemas.microsoft.com/office/drawing/2016/SVG/main" r:embed="rId4"/>
                     </a:ext>
                   </a:extLst>
                 </a:blip>
@@ -5343,7 +5344,7 @@
                 <a:blip r:embed="rId3">
                   <a:extLst>
                     <a:ext uri="{96DAC541-7B7A-43D3-8B79-37D633B846F1}">
-                      <asvg:svgBlip xmlns:asvg="http://schemas.microsoft.com/office/drawing/2016/SVG/main" xmlns="" r:embed="rId4"/>
+                      <asvg:svgBlip xmlns="" xmlns:asvg="http://schemas.microsoft.com/office/drawing/2016/SVG/main" r:embed="rId4"/>
                     </a:ext>
                   </a:extLst>
                 </a:blip>
@@ -5369,7 +5370,7 @@
                 <a:blip r:embed="rId3">
                   <a:extLst>
                     <a:ext uri="{96DAC541-7B7A-43D3-8B79-37D633B846F1}">
-                      <asvg:svgBlip xmlns:asvg="http://schemas.microsoft.com/office/drawing/2016/SVG/main" xmlns="" r:embed="rId4"/>
+                      <asvg:svgBlip xmlns="" xmlns:asvg="http://schemas.microsoft.com/office/drawing/2016/SVG/main" r:embed="rId4"/>
                     </a:ext>
                   </a:extLst>
                 </a:blip>
@@ -5395,7 +5396,7 @@
                 <a:blip r:embed="rId3">
                   <a:extLst>
                     <a:ext uri="{96DAC541-7B7A-43D3-8B79-37D633B846F1}">
-                      <asvg:svgBlip xmlns:asvg="http://schemas.microsoft.com/office/drawing/2016/SVG/main" xmlns="" r:embed="rId4"/>
+                      <asvg:svgBlip xmlns="" xmlns:asvg="http://schemas.microsoft.com/office/drawing/2016/SVG/main" r:embed="rId4"/>
                     </a:ext>
                   </a:extLst>
                 </a:blip>
@@ -5421,7 +5422,7 @@
                 <a:blip r:embed="rId3">
                   <a:extLst>
                     <a:ext uri="{96DAC541-7B7A-43D3-8B79-37D633B846F1}">
-                      <asvg:svgBlip xmlns:asvg="http://schemas.microsoft.com/office/drawing/2016/SVG/main" xmlns="" r:embed="rId4"/>
+                      <asvg:svgBlip xmlns="" xmlns:asvg="http://schemas.microsoft.com/office/drawing/2016/SVG/main" r:embed="rId4"/>
                     </a:ext>
                   </a:extLst>
                 </a:blip>
@@ -5447,7 +5448,7 @@
                 <a:blip r:embed="rId3">
                   <a:extLst>
                     <a:ext uri="{96DAC541-7B7A-43D3-8B79-37D633B846F1}">
-                      <asvg:svgBlip xmlns:asvg="http://schemas.microsoft.com/office/drawing/2016/SVG/main" xmlns="" r:embed="rId4"/>
+                      <asvg:svgBlip xmlns="" xmlns:asvg="http://schemas.microsoft.com/office/drawing/2016/SVG/main" r:embed="rId4"/>
                     </a:ext>
                   </a:extLst>
                 </a:blip>
@@ -5473,7 +5474,7 @@
                 <a:blip r:embed="rId3">
                   <a:extLst>
                     <a:ext uri="{96DAC541-7B7A-43D3-8B79-37D633B846F1}">
-                      <asvg:svgBlip xmlns:asvg="http://schemas.microsoft.com/office/drawing/2016/SVG/main" xmlns="" r:embed="rId4"/>
+                      <asvg:svgBlip xmlns="" xmlns:asvg="http://schemas.microsoft.com/office/drawing/2016/SVG/main" r:embed="rId4"/>
                     </a:ext>
                   </a:extLst>
                 </a:blip>
@@ -5499,7 +5500,7 @@
                 <a:blip r:embed="rId3">
                   <a:extLst>
                     <a:ext uri="{96DAC541-7B7A-43D3-8B79-37D633B846F1}">
-                      <asvg:svgBlip xmlns:asvg="http://schemas.microsoft.com/office/drawing/2016/SVG/main" xmlns="" r:embed="rId4"/>
+                      <asvg:svgBlip xmlns="" xmlns:asvg="http://schemas.microsoft.com/office/drawing/2016/SVG/main" r:embed="rId4"/>
                     </a:ext>
                   </a:extLst>
                 </a:blip>
@@ -5525,7 +5526,7 @@
                 <a:blip r:embed="rId3">
                   <a:extLst>
                     <a:ext uri="{96DAC541-7B7A-43D3-8B79-37D633B846F1}">
-                      <asvg:svgBlip xmlns:asvg="http://schemas.microsoft.com/office/drawing/2016/SVG/main" xmlns="" r:embed="rId4"/>
+                      <asvg:svgBlip xmlns="" xmlns:asvg="http://schemas.microsoft.com/office/drawing/2016/SVG/main" r:embed="rId4"/>
                     </a:ext>
                   </a:extLst>
                 </a:blip>
@@ -5551,7 +5552,7 @@
                 <a:blip r:embed="rId3">
                   <a:extLst>
                     <a:ext uri="{96DAC541-7B7A-43D3-8B79-37D633B846F1}">
-                      <asvg:svgBlip xmlns:asvg="http://schemas.microsoft.com/office/drawing/2016/SVG/main" xmlns="" r:embed="rId4"/>
+                      <asvg:svgBlip xmlns="" xmlns:asvg="http://schemas.microsoft.com/office/drawing/2016/SVG/main" r:embed="rId4"/>
                     </a:ext>
                   </a:extLst>
                 </a:blip>
@@ -5574,7 +5575,7 @@
                 <a:blip r:embed="rId3">
                   <a:extLst>
                     <a:ext uri="{96DAC541-7B7A-43D3-8B79-37D633B846F1}">
-                      <asvg:svgBlip xmlns:asvg="http://schemas.microsoft.com/office/drawing/2016/SVG/main" xmlns="" r:embed="rId4"/>
+                      <asvg:svgBlip xmlns="" xmlns:asvg="http://schemas.microsoft.com/office/drawing/2016/SVG/main" r:embed="rId4"/>
                     </a:ext>
                   </a:extLst>
                 </a:blip>
@@ -5600,7 +5601,7 @@
                 <a:blip r:embed="rId3">
                   <a:extLst>
                     <a:ext uri="{96DAC541-7B7A-43D3-8B79-37D633B846F1}">
-                      <asvg:svgBlip xmlns:asvg="http://schemas.microsoft.com/office/drawing/2016/SVG/main" xmlns="" r:embed="rId4"/>
+                      <asvg:svgBlip xmlns="" xmlns:asvg="http://schemas.microsoft.com/office/drawing/2016/SVG/main" r:embed="rId4"/>
                     </a:ext>
                   </a:extLst>
                 </a:blip>
@@ -5870,7 +5871,7 @@
                 <a:blip r:embed="rId2">
                   <a:extLst>
                     <a:ext uri="{96DAC541-7B7A-43D3-8B79-37D633B846F1}">
-                      <asvg:svgBlip xmlns:asvg="http://schemas.microsoft.com/office/drawing/2016/SVG/main" xmlns="" r:embed="rId3"/>
+                      <asvg:svgBlip xmlns="" xmlns:asvg="http://schemas.microsoft.com/office/drawing/2016/SVG/main" r:embed="rId3"/>
                     </a:ext>
                   </a:extLst>
                 </a:blip>
@@ -5896,7 +5897,7 @@
                 <a:blip r:embed="rId2">
                   <a:extLst>
                     <a:ext uri="{96DAC541-7B7A-43D3-8B79-37D633B846F1}">
-                      <asvg:svgBlip xmlns:asvg="http://schemas.microsoft.com/office/drawing/2016/SVG/main" xmlns="" r:embed="rId3"/>
+                      <asvg:svgBlip xmlns="" xmlns:asvg="http://schemas.microsoft.com/office/drawing/2016/SVG/main" r:embed="rId3"/>
                     </a:ext>
                   </a:extLst>
                 </a:blip>
@@ -5919,7 +5920,7 @@
                 <a:blip r:embed="rId2">
                   <a:extLst>
                     <a:ext uri="{96DAC541-7B7A-43D3-8B79-37D633B846F1}">
-                      <asvg:svgBlip xmlns:asvg="http://schemas.microsoft.com/office/drawing/2016/SVG/main" xmlns="" r:embed="rId3"/>
+                      <asvg:svgBlip xmlns="" xmlns:asvg="http://schemas.microsoft.com/office/drawing/2016/SVG/main" r:embed="rId3"/>
                     </a:ext>
                   </a:extLst>
                 </a:blip>
@@ -5945,7 +5946,7 @@
                 <a:blip r:embed="rId2">
                   <a:extLst>
                     <a:ext uri="{96DAC541-7B7A-43D3-8B79-37D633B846F1}">
-                      <asvg:svgBlip xmlns:asvg="http://schemas.microsoft.com/office/drawing/2016/SVG/main" xmlns="" r:embed="rId3"/>
+                      <asvg:svgBlip xmlns="" xmlns:asvg="http://schemas.microsoft.com/office/drawing/2016/SVG/main" r:embed="rId3"/>
                     </a:ext>
                   </a:extLst>
                 </a:blip>
@@ -5968,7 +5969,7 @@
                 <a:blip r:embed="rId2">
                   <a:extLst>
                     <a:ext uri="{96DAC541-7B7A-43D3-8B79-37D633B846F1}">
-                      <asvg:svgBlip xmlns:asvg="http://schemas.microsoft.com/office/drawing/2016/SVG/main" xmlns="" r:embed="rId3"/>
+                      <asvg:svgBlip xmlns="" xmlns:asvg="http://schemas.microsoft.com/office/drawing/2016/SVG/main" r:embed="rId3"/>
                     </a:ext>
                   </a:extLst>
                 </a:blip>
@@ -5994,7 +5995,7 @@
                 <a:blip r:embed="rId2">
                   <a:extLst>
                     <a:ext uri="{96DAC541-7B7A-43D3-8B79-37D633B846F1}">
-                      <asvg:svgBlip xmlns:asvg="http://schemas.microsoft.com/office/drawing/2016/SVG/main" xmlns="" r:embed="rId3"/>
+                      <asvg:svgBlip xmlns="" xmlns:asvg="http://schemas.microsoft.com/office/drawing/2016/SVG/main" r:embed="rId3"/>
                     </a:ext>
                   </a:extLst>
                 </a:blip>
@@ -6017,7 +6018,7 @@
                 <a:blip r:embed="rId2">
                   <a:extLst>
                     <a:ext uri="{96DAC541-7B7A-43D3-8B79-37D633B846F1}">
-                      <asvg:svgBlip xmlns:asvg="http://schemas.microsoft.com/office/drawing/2016/SVG/main" xmlns="" r:embed="rId3"/>
+                      <asvg:svgBlip xmlns="" xmlns:asvg="http://schemas.microsoft.com/office/drawing/2016/SVG/main" r:embed="rId3"/>
                     </a:ext>
                   </a:extLst>
                 </a:blip>
@@ -6043,7 +6044,7 @@
                 <a:blip r:embed="rId2">
                   <a:extLst>
                     <a:ext uri="{96DAC541-7B7A-43D3-8B79-37D633B846F1}">
-                      <asvg:svgBlip xmlns:asvg="http://schemas.microsoft.com/office/drawing/2016/SVG/main" xmlns="" r:embed="rId3"/>
+                      <asvg:svgBlip xmlns="" xmlns:asvg="http://schemas.microsoft.com/office/drawing/2016/SVG/main" r:embed="rId3"/>
                     </a:ext>
                   </a:extLst>
                 </a:blip>
@@ -6066,7 +6067,7 @@
                 <a:blip r:embed="rId2">
                   <a:extLst>
                     <a:ext uri="{96DAC541-7B7A-43D3-8B79-37D633B846F1}">
-                      <asvg:svgBlip xmlns:asvg="http://schemas.microsoft.com/office/drawing/2016/SVG/main" xmlns="" r:embed="rId3"/>
+                      <asvg:svgBlip xmlns="" xmlns:asvg="http://schemas.microsoft.com/office/drawing/2016/SVG/main" r:embed="rId3"/>
                     </a:ext>
                   </a:extLst>
                 </a:blip>
@@ -8134,7 +8135,7 @@
                 <a:blip r:embed="rId2">
                   <a:extLst>
                     <a:ext uri="{96DAC541-7B7A-43D3-8B79-37D633B846F1}">
-                      <asvg:svgBlip xmlns:asvg="http://schemas.microsoft.com/office/drawing/2016/SVG/main" xmlns="" r:embed="rId3"/>
+                      <asvg:svgBlip xmlns="" xmlns:asvg="http://schemas.microsoft.com/office/drawing/2016/SVG/main" r:embed="rId3"/>
                     </a:ext>
                   </a:extLst>
                 </a:blip>
@@ -8160,7 +8161,7 @@
                 <a:blip r:embed="rId2">
                   <a:extLst>
                     <a:ext uri="{96DAC541-7B7A-43D3-8B79-37D633B846F1}">
-                      <asvg:svgBlip xmlns:asvg="http://schemas.microsoft.com/office/drawing/2016/SVG/main" xmlns="" r:embed="rId3"/>
+                      <asvg:svgBlip xmlns="" xmlns:asvg="http://schemas.microsoft.com/office/drawing/2016/SVG/main" r:embed="rId3"/>
                     </a:ext>
                   </a:extLst>
                 </a:blip>
@@ -8183,7 +8184,7 @@
                 <a:blip r:embed="rId2">
                   <a:extLst>
                     <a:ext uri="{96DAC541-7B7A-43D3-8B79-37D633B846F1}">
-                      <asvg:svgBlip xmlns:asvg="http://schemas.microsoft.com/office/drawing/2016/SVG/main" xmlns="" r:embed="rId3"/>
+                      <asvg:svgBlip xmlns="" xmlns:asvg="http://schemas.microsoft.com/office/drawing/2016/SVG/main" r:embed="rId3"/>
                     </a:ext>
                   </a:extLst>
                 </a:blip>
@@ -8209,7 +8210,7 @@
                 <a:blip r:embed="rId2">
                   <a:extLst>
                     <a:ext uri="{96DAC541-7B7A-43D3-8B79-37D633B846F1}">
-                      <asvg:svgBlip xmlns:asvg="http://schemas.microsoft.com/office/drawing/2016/SVG/main" xmlns="" r:embed="rId3"/>
+                      <asvg:svgBlip xmlns="" xmlns:asvg="http://schemas.microsoft.com/office/drawing/2016/SVG/main" r:embed="rId3"/>
                     </a:ext>
                   </a:extLst>
                 </a:blip>
@@ -8232,7 +8233,7 @@
                 <a:blip r:embed="rId2">
                   <a:extLst>
                     <a:ext uri="{96DAC541-7B7A-43D3-8B79-37D633B846F1}">
-                      <asvg:svgBlip xmlns:asvg="http://schemas.microsoft.com/office/drawing/2016/SVG/main" xmlns="" r:embed="rId3"/>
+                      <asvg:svgBlip xmlns="" xmlns:asvg="http://schemas.microsoft.com/office/drawing/2016/SVG/main" r:embed="rId3"/>
                     </a:ext>
                   </a:extLst>
                 </a:blip>
@@ -10501,7 +10502,7 @@
                 <a:blip r:embed="rId2">
                   <a:extLst>
                     <a:ext uri="{96DAC541-7B7A-43D3-8B79-37D633B846F1}">
-                      <asvg:svgBlip xmlns:asvg="http://schemas.microsoft.com/office/drawing/2016/SVG/main" xmlns="" r:embed="rId3"/>
+                      <asvg:svgBlip xmlns="" xmlns:asvg="http://schemas.microsoft.com/office/drawing/2016/SVG/main" r:embed="rId3"/>
                     </a:ext>
                   </a:extLst>
                 </a:blip>
@@ -10527,7 +10528,7 @@
                 <a:blip r:embed="rId2">
                   <a:extLst>
                     <a:ext uri="{96DAC541-7B7A-43D3-8B79-37D633B846F1}">
-                      <asvg:svgBlip xmlns:asvg="http://schemas.microsoft.com/office/drawing/2016/SVG/main" xmlns="" r:embed="rId3"/>
+                      <asvg:svgBlip xmlns="" xmlns:asvg="http://schemas.microsoft.com/office/drawing/2016/SVG/main" r:embed="rId3"/>
                     </a:ext>
                   </a:extLst>
                 </a:blip>
@@ -10550,7 +10551,7 @@
                 <a:blip r:embed="rId2">
                   <a:extLst>
                     <a:ext uri="{96DAC541-7B7A-43D3-8B79-37D633B846F1}">
-                      <asvg:svgBlip xmlns:asvg="http://schemas.microsoft.com/office/drawing/2016/SVG/main" xmlns="" r:embed="rId3"/>
+                      <asvg:svgBlip xmlns="" xmlns:asvg="http://schemas.microsoft.com/office/drawing/2016/SVG/main" r:embed="rId3"/>
                     </a:ext>
                   </a:extLst>
                 </a:blip>
@@ -10576,7 +10577,7 @@
                 <a:blip r:embed="rId2">
                   <a:extLst>
                     <a:ext uri="{96DAC541-7B7A-43D3-8B79-37D633B846F1}">
-                      <asvg:svgBlip xmlns:asvg="http://schemas.microsoft.com/office/drawing/2016/SVG/main" xmlns="" r:embed="rId3"/>
+                      <asvg:svgBlip xmlns="" xmlns:asvg="http://schemas.microsoft.com/office/drawing/2016/SVG/main" r:embed="rId3"/>
                     </a:ext>
                   </a:extLst>
                 </a:blip>
@@ -10599,7 +10600,7 @@
                 <a:blip r:embed="rId2">
                   <a:extLst>
                     <a:ext uri="{96DAC541-7B7A-43D3-8B79-37D633B846F1}">
-                      <asvg:svgBlip xmlns:asvg="http://schemas.microsoft.com/office/drawing/2016/SVG/main" xmlns="" r:embed="rId3"/>
+                      <asvg:svgBlip xmlns="" xmlns:asvg="http://schemas.microsoft.com/office/drawing/2016/SVG/main" r:embed="rId3"/>
                     </a:ext>
                   </a:extLst>
                 </a:blip>
@@ -12322,7 +12323,7 @@
                 <a:blip r:embed="rId2">
                   <a:extLst>
                     <a:ext uri="{96DAC541-7B7A-43D3-8B79-37D633B846F1}">
-                      <asvg:svgBlip xmlns:asvg="http://schemas.microsoft.com/office/drawing/2016/SVG/main" xmlns="" r:embed="rId3"/>
+                      <asvg:svgBlip xmlns="" xmlns:asvg="http://schemas.microsoft.com/office/drawing/2016/SVG/main" r:embed="rId3"/>
                     </a:ext>
                   </a:extLst>
                 </a:blip>
@@ -12348,7 +12349,7 @@
                 <a:blip r:embed="rId2">
                   <a:extLst>
                     <a:ext uri="{96DAC541-7B7A-43D3-8B79-37D633B846F1}">
-                      <asvg:svgBlip xmlns:asvg="http://schemas.microsoft.com/office/drawing/2016/SVG/main" xmlns="" r:embed="rId3"/>
+                      <asvg:svgBlip xmlns="" xmlns:asvg="http://schemas.microsoft.com/office/drawing/2016/SVG/main" r:embed="rId3"/>
                     </a:ext>
                   </a:extLst>
                 </a:blip>
@@ -12374,7 +12375,7 @@
                 <a:blip r:embed="rId2">
                   <a:extLst>
                     <a:ext uri="{96DAC541-7B7A-43D3-8B79-37D633B846F1}">
-                      <asvg:svgBlip xmlns:asvg="http://schemas.microsoft.com/office/drawing/2016/SVG/main" xmlns="" r:embed="rId3"/>
+                      <asvg:svgBlip xmlns="" xmlns:asvg="http://schemas.microsoft.com/office/drawing/2016/SVG/main" r:embed="rId3"/>
                     </a:ext>
                   </a:extLst>
                 </a:blip>
@@ -12400,7 +12401,7 @@
                 <a:blip r:embed="rId2">
                   <a:extLst>
                     <a:ext uri="{96DAC541-7B7A-43D3-8B79-37D633B846F1}">
-                      <asvg:svgBlip xmlns:asvg="http://schemas.microsoft.com/office/drawing/2016/SVG/main" xmlns="" r:embed="rId3"/>
+                      <asvg:svgBlip xmlns="" xmlns:asvg="http://schemas.microsoft.com/office/drawing/2016/SVG/main" r:embed="rId3"/>
                     </a:ext>
                   </a:extLst>
                 </a:blip>
@@ -12426,7 +12427,7 @@
                 <a:blip r:embed="rId2">
                   <a:extLst>
                     <a:ext uri="{96DAC541-7B7A-43D3-8B79-37D633B846F1}">
-                      <asvg:svgBlip xmlns:asvg="http://schemas.microsoft.com/office/drawing/2016/SVG/main" xmlns="" r:embed="rId3"/>
+                      <asvg:svgBlip xmlns="" xmlns:asvg="http://schemas.microsoft.com/office/drawing/2016/SVG/main" r:embed="rId3"/>
                     </a:ext>
                   </a:extLst>
                 </a:blip>
@@ -12449,7 +12450,7 @@
                 <a:blip r:embed="rId2">
                   <a:extLst>
                     <a:ext uri="{96DAC541-7B7A-43D3-8B79-37D633B846F1}">
-                      <asvg:svgBlip xmlns:asvg="http://schemas.microsoft.com/office/drawing/2016/SVG/main" xmlns="" r:embed="rId3"/>
+                      <asvg:svgBlip xmlns="" xmlns:asvg="http://schemas.microsoft.com/office/drawing/2016/SVG/main" r:embed="rId3"/>
                     </a:ext>
                   </a:extLst>
                 </a:blip>
@@ -12475,7 +12476,7 @@
                 <a:blip r:embed="rId2">
                   <a:extLst>
                     <a:ext uri="{96DAC541-7B7A-43D3-8B79-37D633B846F1}">
-                      <asvg:svgBlip xmlns:asvg="http://schemas.microsoft.com/office/drawing/2016/SVG/main" xmlns="" r:embed="rId3"/>
+                      <asvg:svgBlip xmlns="" xmlns:asvg="http://schemas.microsoft.com/office/drawing/2016/SVG/main" r:embed="rId3"/>
                     </a:ext>
                   </a:extLst>
                 </a:blip>
@@ -12498,7 +12499,7 @@
                 <a:blip r:embed="rId2">
                   <a:extLst>
                     <a:ext uri="{96DAC541-7B7A-43D3-8B79-37D633B846F1}">
-                      <asvg:svgBlip xmlns:asvg="http://schemas.microsoft.com/office/drawing/2016/SVG/main" xmlns="" r:embed="rId3"/>
+                      <asvg:svgBlip xmlns="" xmlns:asvg="http://schemas.microsoft.com/office/drawing/2016/SVG/main" r:embed="rId3"/>
                     </a:ext>
                   </a:extLst>
                 </a:blip>
@@ -12524,7 +12525,7 @@
                 <a:blip r:embed="rId2">
                   <a:extLst>
                     <a:ext uri="{96DAC541-7B7A-43D3-8B79-37D633B846F1}">
-                      <asvg:svgBlip xmlns:asvg="http://schemas.microsoft.com/office/drawing/2016/SVG/main" xmlns="" r:embed="rId3"/>
+                      <asvg:svgBlip xmlns="" xmlns:asvg="http://schemas.microsoft.com/office/drawing/2016/SVG/main" r:embed="rId3"/>
                     </a:ext>
                   </a:extLst>
                 </a:blip>
@@ -12547,7 +12548,7 @@
                 <a:blip r:embed="rId2">
                   <a:extLst>
                     <a:ext uri="{96DAC541-7B7A-43D3-8B79-37D633B846F1}">
-                      <asvg:svgBlip xmlns:asvg="http://schemas.microsoft.com/office/drawing/2016/SVG/main" xmlns="" r:embed="rId3"/>
+                      <asvg:svgBlip xmlns="" xmlns:asvg="http://schemas.microsoft.com/office/drawing/2016/SVG/main" r:embed="rId3"/>
                     </a:ext>
                   </a:extLst>
                 </a:blip>
@@ -12570,7 +12571,7 @@
                 <a:blip r:embed="rId2">
                   <a:extLst>
                     <a:ext uri="{96DAC541-7B7A-43D3-8B79-37D633B846F1}">
-                      <asvg:svgBlip xmlns:asvg="http://schemas.microsoft.com/office/drawing/2016/SVG/main" xmlns="" r:embed="rId3"/>
+                      <asvg:svgBlip xmlns="" xmlns:asvg="http://schemas.microsoft.com/office/drawing/2016/SVG/main" r:embed="rId3"/>
                     </a:ext>
                   </a:extLst>
                 </a:blip>
@@ -14411,7 +14412,7 @@
                 <a:blip r:embed="rId2">
                   <a:extLst>
                     <a:ext uri="{96DAC541-7B7A-43D3-8B79-37D633B846F1}">
-                      <asvg:svgBlip xmlns:asvg="http://schemas.microsoft.com/office/drawing/2016/SVG/main" xmlns="" r:embed="rId3"/>
+                      <asvg:svgBlip xmlns="" xmlns:asvg="http://schemas.microsoft.com/office/drawing/2016/SVG/main" r:embed="rId3"/>
                     </a:ext>
                   </a:extLst>
                 </a:blip>
@@ -14499,7 +14500,7 @@
                 <a:blip r:embed="rId2">
                   <a:extLst>
                     <a:ext uri="{96DAC541-7B7A-43D3-8B79-37D633B846F1}">
-                      <asvg:svgBlip xmlns:asvg="http://schemas.microsoft.com/office/drawing/2016/SVG/main" xmlns="" r:embed="rId3"/>
+                      <asvg:svgBlip xmlns="" xmlns:asvg="http://schemas.microsoft.com/office/drawing/2016/SVG/main" r:embed="rId3"/>
                     </a:ext>
                   </a:extLst>
                 </a:blip>
@@ -14522,7 +14523,7 @@
                 <a:blip r:embed="rId2">
                   <a:extLst>
                     <a:ext uri="{96DAC541-7B7A-43D3-8B79-37D633B846F1}">
-                      <asvg:svgBlip xmlns:asvg="http://schemas.microsoft.com/office/drawing/2016/SVG/main" xmlns="" r:embed="rId3"/>
+                      <asvg:svgBlip xmlns="" xmlns:asvg="http://schemas.microsoft.com/office/drawing/2016/SVG/main" r:embed="rId3"/>
                     </a:ext>
                   </a:extLst>
                 </a:blip>
@@ -14548,7 +14549,7 @@
                 <a:blip r:embed="rId2">
                   <a:extLst>
                     <a:ext uri="{96DAC541-7B7A-43D3-8B79-37D633B846F1}">
-                      <asvg:svgBlip xmlns:asvg="http://schemas.microsoft.com/office/drawing/2016/SVG/main" xmlns="" r:embed="rId3"/>
+                      <asvg:svgBlip xmlns="" xmlns:asvg="http://schemas.microsoft.com/office/drawing/2016/SVG/main" r:embed="rId3"/>
                     </a:ext>
                   </a:extLst>
                 </a:blip>
@@ -14571,7 +14572,7 @@
                 <a:blip r:embed="rId2">
                   <a:extLst>
                     <a:ext uri="{96DAC541-7B7A-43D3-8B79-37D633B846F1}">
-                      <asvg:svgBlip xmlns:asvg="http://schemas.microsoft.com/office/drawing/2016/SVG/main" xmlns="" r:embed="rId3"/>
+                      <asvg:svgBlip xmlns="" xmlns:asvg="http://schemas.microsoft.com/office/drawing/2016/SVG/main" r:embed="rId3"/>
                     </a:ext>
                   </a:extLst>
                 </a:blip>
@@ -14597,7 +14598,7 @@
                 <a:blip r:embed="rId2">
                   <a:extLst>
                     <a:ext uri="{96DAC541-7B7A-43D3-8B79-37D633B846F1}">
-                      <asvg:svgBlip xmlns:asvg="http://schemas.microsoft.com/office/drawing/2016/SVG/main" xmlns="" r:embed="rId3"/>
+                      <asvg:svgBlip xmlns="" xmlns:asvg="http://schemas.microsoft.com/office/drawing/2016/SVG/main" r:embed="rId3"/>
                     </a:ext>
                   </a:extLst>
                 </a:blip>
@@ -16395,7 +16396,7 @@
                 <a:blip r:embed="rId2">
                   <a:extLst>
                     <a:ext uri="{96DAC541-7B7A-43D3-8B79-37D633B846F1}">
-                      <asvg:svgBlip xmlns:asvg="http://schemas.microsoft.com/office/drawing/2016/SVG/main" xmlns="" r:embed="rId3"/>
+                      <asvg:svgBlip xmlns="" xmlns:asvg="http://schemas.microsoft.com/office/drawing/2016/SVG/main" r:embed="rId3"/>
                     </a:ext>
                   </a:extLst>
                 </a:blip>
@@ -16421,7 +16422,7 @@
                 <a:blip r:embed="rId2">
                   <a:extLst>
                     <a:ext uri="{96DAC541-7B7A-43D3-8B79-37D633B846F1}">
-                      <asvg:svgBlip xmlns:asvg="http://schemas.microsoft.com/office/drawing/2016/SVG/main" xmlns="" r:embed="rId3"/>
+                      <asvg:svgBlip xmlns="" xmlns:asvg="http://schemas.microsoft.com/office/drawing/2016/SVG/main" r:embed="rId3"/>
                     </a:ext>
                   </a:extLst>
                 </a:blip>
@@ -16444,7 +16445,7 @@
                 <a:blip r:embed="rId2">
                   <a:extLst>
                     <a:ext uri="{96DAC541-7B7A-43D3-8B79-37D633B846F1}">
-                      <asvg:svgBlip xmlns:asvg="http://schemas.microsoft.com/office/drawing/2016/SVG/main" xmlns="" r:embed="rId3"/>
+                      <asvg:svgBlip xmlns="" xmlns:asvg="http://schemas.microsoft.com/office/drawing/2016/SVG/main" r:embed="rId3"/>
                     </a:ext>
                   </a:extLst>
                 </a:blip>
@@ -16461,7 +16462,33 @@
                 <a:latin typeface="Segoe UI" panose="020B0502040204020203" pitchFamily="34" charset="0"/>
                 <a:cs typeface="Segoe UI" panose="020B0502040204020203" pitchFamily="34" charset="0"/>
               </a:rPr>
-              <a:t>Once an inventory is complete, the verifying logistician will closeout the inventory by signing and marking the date completed, along with any remarks regarding the overall inventory. </a:t>
+              <a:t>Once an inventory is complete, the verifying logistician will closeout the inventory by signing </a:t>
+            </a:r>
+            <a:r>
+              <a:rPr lang="en-US" sz="1400" dirty="0" smtClean="0">
+                <a:solidFill>
+                  <a:schemeClr val="tx1">
+                    <a:lumMod val="65000"/>
+                    <a:lumOff val="35000"/>
+                  </a:schemeClr>
+                </a:solidFill>
+                <a:latin typeface="Segoe UI" panose="020B0502040204020203" pitchFamily="34" charset="0"/>
+                <a:cs typeface="Segoe UI" panose="020B0502040204020203" pitchFamily="34" charset="0"/>
+              </a:rPr>
+              <a:t>an inventory verification, </a:t>
+            </a:r>
+            <a:r>
+              <a:rPr lang="en-US" sz="1400" dirty="0" smtClean="0">
+                <a:solidFill>
+                  <a:schemeClr val="tx1">
+                    <a:lumMod val="65000"/>
+                    <a:lumOff val="35000"/>
+                  </a:schemeClr>
+                </a:solidFill>
+                <a:latin typeface="Segoe UI" panose="020B0502040204020203" pitchFamily="34" charset="0"/>
+                <a:cs typeface="Segoe UI" panose="020B0502040204020203" pitchFamily="34" charset="0"/>
+              </a:rPr>
+              <a:t>along with any remarks regarding the overall inventory. </a:t>
             </a:r>
             <a:endParaRPr lang="en-US" sz="1400" dirty="0">
               <a:solidFill>
@@ -16546,23 +16573,1323 @@
           </a:p>
         </p:txBody>
       </p:sp>
+      <p:sp>
+        <p:nvSpPr>
+          <p:cNvPr id="57" name="Rectangle 56">
+            <a:extLst>
+              <a:ext uri="{FF2B5EF4-FFF2-40B4-BE49-F238E27FC236}">
+                <a16:creationId xmlns:a16="http://schemas.microsoft.com/office/drawing/2014/main" id="{4808B174-B9CF-4CAD-8A19-1BC9D885D3B3}"/>
+              </a:ext>
+            </a:extLst>
+          </p:cNvPr>
+          <p:cNvSpPr/>
+          <p:nvPr/>
+        </p:nvSpPr>
+        <p:spPr>
+          <a:xfrm>
+            <a:off x="100584" y="684795"/>
+            <a:ext cx="7859261" cy="274320"/>
+          </a:xfrm>
+          <a:prstGeom prst="rect">
+            <a:avLst/>
+          </a:prstGeom>
+          <a:solidFill>
+            <a:schemeClr val="tx1">
+              <a:lumMod val="75000"/>
+              <a:lumOff val="25000"/>
+            </a:schemeClr>
+          </a:solidFill>
+          <a:ln>
+            <a:noFill/>
+          </a:ln>
+        </p:spPr>
+        <p:style>
+          <a:lnRef idx="2">
+            <a:schemeClr val="accent1">
+              <a:shade val="50000"/>
+            </a:schemeClr>
+          </a:lnRef>
+          <a:fillRef idx="1">
+            <a:schemeClr val="accent1"/>
+          </a:fillRef>
+          <a:effectRef idx="0">
+            <a:schemeClr val="accent1"/>
+          </a:effectRef>
+          <a:fontRef idx="minor">
+            <a:schemeClr val="lt1"/>
+          </a:fontRef>
+        </p:style>
+        <p:txBody>
+          <a:bodyPr rtlCol="0" anchor="ctr"/>
+          <a:lstStyle/>
+          <a:p>
+            <a:pPr algn="ctr"/>
+            <a:r>
+              <a:rPr lang="en-US" sz="1600" dirty="0" smtClean="0">
+                <a:latin typeface="Segoe UI" panose="020B0502040204020203" pitchFamily="34" charset="0"/>
+                <a:cs typeface="Segoe UI" panose="020B0502040204020203" pitchFamily="34" charset="0"/>
+              </a:rPr>
+              <a:t>Inventory</a:t>
+            </a:r>
+            <a:endParaRPr lang="en-US" sz="1600" dirty="0">
+              <a:latin typeface="Segoe UI" panose="020B0502040204020203" pitchFamily="34" charset="0"/>
+              <a:cs typeface="Segoe UI" panose="020B0502040204020203" pitchFamily="34" charset="0"/>
+            </a:endParaRPr>
+          </a:p>
+        </p:txBody>
+      </p:sp>
       <p:grpSp>
         <p:nvGrpSpPr>
-          <p:cNvPr id="24" name="Group 23"/>
+          <p:cNvPr id="5" name="Group 4"/>
           <p:cNvGrpSpPr/>
           <p:nvPr/>
         </p:nvGrpSpPr>
         <p:grpSpPr>
           <a:xfrm>
-            <a:off x="100559" y="684795"/>
-            <a:ext cx="7859286" cy="5702497"/>
-            <a:chOff x="100559" y="853758"/>
-            <a:chExt cx="7859286" cy="5702497"/>
+            <a:off x="100579" y="4140905"/>
+            <a:ext cx="2286005" cy="2090202"/>
+            <a:chOff x="100579" y="1614397"/>
+            <a:chExt cx="2286005" cy="2090202"/>
           </a:xfrm>
         </p:grpSpPr>
         <p:sp>
           <p:nvSpPr>
-            <p:cNvPr id="57" name="Rectangle 56">
+            <p:cNvPr id="39" name="Rectangle 38">
+              <a:extLst>
+                <a:ext uri="{FF2B5EF4-FFF2-40B4-BE49-F238E27FC236}">
+                  <a16:creationId xmlns:a16="http://schemas.microsoft.com/office/drawing/2014/main" id="{5626B030-B48B-42C0-9339-F603883EA700}"/>
+                </a:ext>
+              </a:extLst>
+            </p:cNvPr>
+            <p:cNvSpPr/>
+            <p:nvPr/>
+          </p:nvSpPr>
+          <p:spPr>
+            <a:xfrm>
+              <a:off x="100584" y="1614397"/>
+              <a:ext cx="2286000" cy="274320"/>
+            </a:xfrm>
+            <a:prstGeom prst="rect">
+              <a:avLst/>
+            </a:prstGeom>
+            <a:solidFill>
+              <a:schemeClr val="tx1">
+                <a:lumMod val="75000"/>
+                <a:lumOff val="25000"/>
+              </a:schemeClr>
+            </a:solidFill>
+            <a:ln>
+              <a:noFill/>
+            </a:ln>
+          </p:spPr>
+          <p:style>
+            <a:lnRef idx="2">
+              <a:schemeClr val="accent1">
+                <a:shade val="50000"/>
+              </a:schemeClr>
+            </a:lnRef>
+            <a:fillRef idx="1">
+              <a:schemeClr val="accent1"/>
+            </a:fillRef>
+            <a:effectRef idx="0">
+              <a:schemeClr val="accent1"/>
+            </a:effectRef>
+            <a:fontRef idx="minor">
+              <a:schemeClr val="lt1"/>
+            </a:fontRef>
+          </p:style>
+          <p:txBody>
+            <a:bodyPr rtlCol="0" anchor="ctr"/>
+            <a:lstStyle/>
+            <a:p>
+              <a:pPr algn="ctr"/>
+              <a:r>
+                <a:rPr lang="en-US" sz="1600" dirty="0" smtClean="0">
+                  <a:latin typeface="Segoe UI" panose="020B0502040204020203" pitchFamily="34" charset="0"/>
+                  <a:cs typeface="Segoe UI" panose="020B0502040204020203" pitchFamily="34" charset="0"/>
+                </a:rPr>
+                <a:t>Item - Serialized</a:t>
+              </a:r>
+              <a:endParaRPr lang="en-US" sz="1600" dirty="0">
+                <a:latin typeface="Segoe UI" panose="020B0502040204020203" pitchFamily="34" charset="0"/>
+                <a:cs typeface="Segoe UI" panose="020B0502040204020203" pitchFamily="34" charset="0"/>
+              </a:endParaRPr>
+            </a:p>
+          </p:txBody>
+        </p:sp>
+        <p:sp>
+          <p:nvSpPr>
+            <p:cNvPr id="41" name="Rectangle 40">
+              <a:extLst>
+                <a:ext uri="{FF2B5EF4-FFF2-40B4-BE49-F238E27FC236}">
+                  <a16:creationId xmlns:a16="http://schemas.microsoft.com/office/drawing/2014/main" id="{92F3C2D4-DE2E-4B48-93DA-8F055147368D}"/>
+                </a:ext>
+              </a:extLst>
+            </p:cNvPr>
+            <p:cNvSpPr/>
+            <p:nvPr/>
+          </p:nvSpPr>
+          <p:spPr>
+            <a:xfrm>
+              <a:off x="100579" y="1888717"/>
+              <a:ext cx="2286000" cy="1815882"/>
+            </a:xfrm>
+            <a:prstGeom prst="rect">
+              <a:avLst/>
+            </a:prstGeom>
+            <a:solidFill>
+              <a:schemeClr val="bg1">
+                <a:lumMod val="85000"/>
+              </a:schemeClr>
+            </a:solidFill>
+            <a:ln>
+              <a:noFill/>
+            </a:ln>
+          </p:spPr>
+          <p:style>
+            <a:lnRef idx="2">
+              <a:schemeClr val="accent1">
+                <a:shade val="50000"/>
+              </a:schemeClr>
+            </a:lnRef>
+            <a:fillRef idx="1">
+              <a:schemeClr val="accent1"/>
+            </a:fillRef>
+            <a:effectRef idx="0">
+              <a:schemeClr val="accent1"/>
+            </a:effectRef>
+            <a:fontRef idx="minor">
+              <a:schemeClr val="lt1"/>
+            </a:fontRef>
+          </p:style>
+          <p:txBody>
+            <a:bodyPr rtlCol="0" anchor="ctr" anchorCtr="0">
+              <a:spAutoFit/>
+            </a:bodyPr>
+            <a:lstStyle/>
+            <a:p>
+              <a:pPr algn="ctr"/>
+              <a:r>
+                <a:rPr lang="en-US" sz="1400" dirty="0" smtClean="0">
+                  <a:solidFill>
+                    <a:schemeClr val="tx1">
+                      <a:lumMod val="65000"/>
+                      <a:lumOff val="35000"/>
+                    </a:schemeClr>
+                  </a:solidFill>
+                  <a:latin typeface="Segoe UI" panose="020B0502040204020203" pitchFamily="34" charset="0"/>
+                  <a:cs typeface="Segoe UI" panose="020B0502040204020203" pitchFamily="34" charset="0"/>
+                </a:rPr>
+                <a:t>Category</a:t>
+              </a:r>
+            </a:p>
+            <a:p>
+              <a:pPr algn="ctr"/>
+              <a:r>
+                <a:rPr lang="en-US" sz="1400" dirty="0" smtClean="0">
+                  <a:solidFill>
+                    <a:schemeClr val="tx1">
+                      <a:lumMod val="65000"/>
+                      <a:lumOff val="35000"/>
+                    </a:schemeClr>
+                  </a:solidFill>
+                  <a:latin typeface="Segoe UI" panose="020B0502040204020203" pitchFamily="34" charset="0"/>
+                  <a:cs typeface="Segoe UI" panose="020B0502040204020203" pitchFamily="34" charset="0"/>
+                </a:rPr>
+                <a:t>Order – If Exists</a:t>
+              </a:r>
+            </a:p>
+            <a:p>
+              <a:pPr algn="ctr"/>
+              <a:r>
+                <a:rPr lang="en-US" sz="1400" dirty="0" smtClean="0">
+                  <a:solidFill>
+                    <a:schemeClr val="tx1">
+                      <a:lumMod val="65000"/>
+                      <a:lumOff val="35000"/>
+                    </a:schemeClr>
+                  </a:solidFill>
+                  <a:latin typeface="Segoe UI" panose="020B0502040204020203" pitchFamily="34" charset="0"/>
+                  <a:cs typeface="Segoe UI" panose="020B0502040204020203" pitchFamily="34" charset="0"/>
+                </a:rPr>
+                <a:t>Manufacturer</a:t>
+              </a:r>
+            </a:p>
+            <a:p>
+              <a:pPr algn="ctr"/>
+              <a:r>
+                <a:rPr lang="en-US" sz="1400" dirty="0" smtClean="0">
+                  <a:solidFill>
+                    <a:schemeClr val="tx1">
+                      <a:lumMod val="65000"/>
+                      <a:lumOff val="35000"/>
+                    </a:schemeClr>
+                  </a:solidFill>
+                  <a:latin typeface="Segoe UI" panose="020B0502040204020203" pitchFamily="34" charset="0"/>
+                  <a:cs typeface="Segoe UI" panose="020B0502040204020203" pitchFamily="34" charset="0"/>
+                </a:rPr>
+                <a:t>Model</a:t>
+              </a:r>
+            </a:p>
+            <a:p>
+              <a:pPr algn="ctr"/>
+              <a:r>
+                <a:rPr lang="en-US" sz="1400" dirty="0" smtClean="0">
+                  <a:solidFill>
+                    <a:schemeClr val="tx1">
+                      <a:lumMod val="65000"/>
+                      <a:lumOff val="35000"/>
+                    </a:schemeClr>
+                  </a:solidFill>
+                  <a:latin typeface="Segoe UI" panose="020B0502040204020203" pitchFamily="34" charset="0"/>
+                  <a:cs typeface="Segoe UI" panose="020B0502040204020203" pitchFamily="34" charset="0"/>
+                </a:rPr>
+                <a:t>Nsn</a:t>
+              </a:r>
+            </a:p>
+            <a:p>
+              <a:pPr algn="ctr"/>
+              <a:r>
+                <a:rPr lang="en-US" sz="1400" dirty="0" smtClean="0">
+                  <a:solidFill>
+                    <a:schemeClr val="tx1">
+                      <a:lumMod val="65000"/>
+                      <a:lumOff val="35000"/>
+                    </a:schemeClr>
+                  </a:solidFill>
+                  <a:latin typeface="Segoe UI" panose="020B0502040204020203" pitchFamily="34" charset="0"/>
+                  <a:cs typeface="Segoe UI" panose="020B0502040204020203" pitchFamily="34" charset="0"/>
+                </a:rPr>
+                <a:t>Item Type</a:t>
+              </a:r>
+            </a:p>
+            <a:p>
+              <a:pPr algn="ctr"/>
+              <a:r>
+                <a:rPr lang="en-US" sz="1400" dirty="0" smtClean="0">
+                  <a:solidFill>
+                    <a:schemeClr val="tx1">
+                      <a:lumMod val="65000"/>
+                      <a:lumOff val="35000"/>
+                    </a:schemeClr>
+                  </a:solidFill>
+                  <a:latin typeface="Segoe UI" panose="020B0502040204020203" pitchFamily="34" charset="0"/>
+                  <a:cs typeface="Segoe UI" panose="020B0502040204020203" pitchFamily="34" charset="0"/>
+                </a:rPr>
+                <a:t>Serial Number</a:t>
+              </a:r>
+            </a:p>
+            <a:p>
+              <a:pPr algn="ctr"/>
+              <a:r>
+                <a:rPr lang="en-US" sz="1400" dirty="0" smtClean="0">
+                  <a:solidFill>
+                    <a:schemeClr val="tx1">
+                      <a:lumMod val="65000"/>
+                      <a:lumOff val="35000"/>
+                    </a:schemeClr>
+                  </a:solidFill>
+                  <a:latin typeface="Segoe UI" panose="020B0502040204020203" pitchFamily="34" charset="0"/>
+                  <a:cs typeface="Segoe UI" panose="020B0502040204020203" pitchFamily="34" charset="0"/>
+                </a:rPr>
+                <a:t>Location</a:t>
+              </a:r>
+              <a:endParaRPr lang="en-US" sz="1400" dirty="0">
+                <a:solidFill>
+                  <a:schemeClr val="tx1">
+                    <a:lumMod val="65000"/>
+                    <a:lumOff val="35000"/>
+                  </a:schemeClr>
+                </a:solidFill>
+                <a:latin typeface="Segoe UI" panose="020B0502040204020203" pitchFamily="34" charset="0"/>
+                <a:cs typeface="Segoe UI" panose="020B0502040204020203" pitchFamily="34" charset="0"/>
+              </a:endParaRPr>
+            </a:p>
+          </p:txBody>
+        </p:sp>
+      </p:grpSp>
+      <p:sp>
+        <p:nvSpPr>
+          <p:cNvPr id="60" name="Rectangle 59">
+            <a:extLst>
+              <a:ext uri="{FF2B5EF4-FFF2-40B4-BE49-F238E27FC236}">
+                <a16:creationId xmlns:a16="http://schemas.microsoft.com/office/drawing/2014/main" id="{34EF0660-717C-40BE-8EF0-14F53806A4C8}"/>
+              </a:ext>
+            </a:extLst>
+          </p:cNvPr>
+          <p:cNvSpPr/>
+          <p:nvPr/>
+        </p:nvSpPr>
+        <p:spPr>
+          <a:xfrm>
+            <a:off x="100579" y="959115"/>
+            <a:ext cx="7859256" cy="1169551"/>
+          </a:xfrm>
+          <a:prstGeom prst="rect">
+            <a:avLst/>
+          </a:prstGeom>
+          <a:solidFill>
+            <a:schemeClr val="bg1">
+              <a:lumMod val="85000"/>
+            </a:schemeClr>
+          </a:solidFill>
+          <a:ln>
+            <a:noFill/>
+          </a:ln>
+        </p:spPr>
+        <p:style>
+          <a:lnRef idx="2">
+            <a:schemeClr val="accent1">
+              <a:shade val="50000"/>
+            </a:schemeClr>
+          </a:lnRef>
+          <a:fillRef idx="1">
+            <a:schemeClr val="accent1"/>
+          </a:fillRef>
+          <a:effectRef idx="0">
+            <a:schemeClr val="accent1"/>
+          </a:effectRef>
+          <a:fontRef idx="minor">
+            <a:schemeClr val="lt1"/>
+          </a:fontRef>
+        </p:style>
+        <p:txBody>
+          <a:bodyPr wrap="square" rtlCol="0" anchor="ctr" anchorCtr="0">
+            <a:spAutoFit/>
+          </a:bodyPr>
+          <a:lstStyle/>
+          <a:p>
+            <a:pPr algn="ctr"/>
+            <a:r>
+              <a:rPr lang="en-US" sz="1400" dirty="0" smtClean="0">
+                <a:solidFill>
+                  <a:schemeClr val="tx1">
+                    <a:lumMod val="65000"/>
+                    <a:lumOff val="35000"/>
+                  </a:schemeClr>
+                </a:solidFill>
+                <a:latin typeface="Segoe UI" panose="020B0502040204020203" pitchFamily="34" charset="0"/>
+                <a:cs typeface="Segoe UI" panose="020B0502040204020203" pitchFamily="34" charset="0"/>
+              </a:rPr>
+              <a:t>Property Record</a:t>
+            </a:r>
+          </a:p>
+          <a:p>
+            <a:pPr algn="ctr"/>
+            <a:r>
+              <a:rPr lang="en-US" sz="1400" dirty="0" smtClean="0">
+                <a:solidFill>
+                  <a:schemeClr val="tx1">
+                    <a:lumMod val="65000"/>
+                    <a:lumOff val="35000"/>
+                  </a:schemeClr>
+                </a:solidFill>
+                <a:latin typeface="Segoe UI" panose="020B0502040204020203" pitchFamily="34" charset="0"/>
+                <a:cs typeface="Segoe UI" panose="020B0502040204020203" pitchFamily="34" charset="0"/>
+              </a:rPr>
+              <a:t>Record User</a:t>
+            </a:r>
+          </a:p>
+          <a:p>
+            <a:pPr algn="ctr"/>
+            <a:r>
+              <a:rPr lang="en-US" sz="1400" dirty="0" smtClean="0">
+                <a:solidFill>
+                  <a:schemeClr val="tx1">
+                    <a:lumMod val="65000"/>
+                    <a:lumOff val="35000"/>
+                  </a:schemeClr>
+                </a:solidFill>
+                <a:latin typeface="Segoe UI" panose="020B0502040204020203" pitchFamily="34" charset="0"/>
+                <a:cs typeface="Segoe UI" panose="020B0502040204020203" pitchFamily="34" charset="0"/>
+              </a:rPr>
+              <a:t>Log User</a:t>
+            </a:r>
+          </a:p>
+          <a:p>
+            <a:pPr algn="ctr"/>
+            <a:r>
+              <a:rPr lang="en-US" sz="1400" dirty="0" smtClean="0">
+                <a:solidFill>
+                  <a:schemeClr val="tx1">
+                    <a:lumMod val="65000"/>
+                    <a:lumOff val="35000"/>
+                  </a:schemeClr>
+                </a:solidFill>
+                <a:latin typeface="Segoe UI" panose="020B0502040204020203" pitchFamily="34" charset="0"/>
+                <a:cs typeface="Segoe UI" panose="020B0502040204020203" pitchFamily="34" charset="0"/>
+              </a:rPr>
+              <a:t>Date </a:t>
+            </a:r>
+            <a:r>
+              <a:rPr lang="en-US" sz="1400" dirty="0" smtClean="0">
+                <a:solidFill>
+                  <a:schemeClr val="tx1">
+                    <a:lumMod val="65000"/>
+                    <a:lumOff val="35000"/>
+                  </a:schemeClr>
+                </a:solidFill>
+                <a:latin typeface="Segoe UI" panose="020B0502040204020203" pitchFamily="34" charset="0"/>
+                <a:cs typeface="Segoe UI" panose="020B0502040204020203" pitchFamily="34" charset="0"/>
+              </a:rPr>
+              <a:t>Started</a:t>
+            </a:r>
+            <a:endParaRPr lang="en-US" sz="1400" dirty="0" smtClean="0">
+              <a:solidFill>
+                <a:schemeClr val="tx1">
+                  <a:lumMod val="65000"/>
+                  <a:lumOff val="35000"/>
+                </a:schemeClr>
+              </a:solidFill>
+              <a:latin typeface="Segoe UI" panose="020B0502040204020203" pitchFamily="34" charset="0"/>
+              <a:cs typeface="Segoe UI" panose="020B0502040204020203" pitchFamily="34" charset="0"/>
+            </a:endParaRPr>
+          </a:p>
+          <a:p>
+            <a:pPr algn="ctr"/>
+            <a:r>
+              <a:rPr lang="en-US" sz="1400" dirty="0" smtClean="0">
+                <a:solidFill>
+                  <a:schemeClr val="tx1">
+                    <a:lumMod val="65000"/>
+                    <a:lumOff val="35000"/>
+                  </a:schemeClr>
+                </a:solidFill>
+                <a:latin typeface="Segoe UI" panose="020B0502040204020203" pitchFamily="34" charset="0"/>
+                <a:cs typeface="Segoe UI" panose="020B0502040204020203" pitchFamily="34" charset="0"/>
+              </a:rPr>
+              <a:t>Remarks</a:t>
+            </a:r>
+            <a:endParaRPr lang="en-US" sz="1400" dirty="0">
+              <a:solidFill>
+                <a:schemeClr val="tx1">
+                  <a:lumMod val="65000"/>
+                  <a:lumOff val="35000"/>
+                </a:schemeClr>
+              </a:solidFill>
+              <a:latin typeface="Segoe UI" panose="020B0502040204020203" pitchFamily="34" charset="0"/>
+              <a:cs typeface="Segoe UI" panose="020B0502040204020203" pitchFamily="34" charset="0"/>
+            </a:endParaRPr>
+          </a:p>
+        </p:txBody>
+      </p:sp>
+      <p:grpSp>
+        <p:nvGrpSpPr>
+          <p:cNvPr id="4" name="Group 3"/>
+          <p:cNvGrpSpPr/>
+          <p:nvPr/>
+        </p:nvGrpSpPr>
+        <p:grpSpPr>
+          <a:xfrm>
+            <a:off x="5673815" y="4140905"/>
+            <a:ext cx="2286005" cy="2305645"/>
+            <a:chOff x="100579" y="3943341"/>
+            <a:chExt cx="2286005" cy="2305645"/>
+          </a:xfrm>
+        </p:grpSpPr>
+        <p:sp>
+          <p:nvSpPr>
+            <p:cNvPr id="69" name="Rectangle 68">
+              <a:extLst>
+                <a:ext uri="{FF2B5EF4-FFF2-40B4-BE49-F238E27FC236}">
+                  <a16:creationId xmlns:a16="http://schemas.microsoft.com/office/drawing/2014/main" id="{5626B030-B48B-42C0-9339-F603883EA700}"/>
+                </a:ext>
+              </a:extLst>
+            </p:cNvPr>
+            <p:cNvSpPr/>
+            <p:nvPr/>
+          </p:nvSpPr>
+          <p:spPr>
+            <a:xfrm>
+              <a:off x="100584" y="3943341"/>
+              <a:ext cx="2286000" cy="274320"/>
+            </a:xfrm>
+            <a:prstGeom prst="rect">
+              <a:avLst/>
+            </a:prstGeom>
+            <a:solidFill>
+              <a:schemeClr val="tx1">
+                <a:lumMod val="75000"/>
+                <a:lumOff val="25000"/>
+              </a:schemeClr>
+            </a:solidFill>
+            <a:ln>
+              <a:noFill/>
+            </a:ln>
+          </p:spPr>
+          <p:style>
+            <a:lnRef idx="2">
+              <a:schemeClr val="accent1">
+                <a:shade val="50000"/>
+              </a:schemeClr>
+            </a:lnRef>
+            <a:fillRef idx="1">
+              <a:schemeClr val="accent1"/>
+            </a:fillRef>
+            <a:effectRef idx="0">
+              <a:schemeClr val="accent1"/>
+            </a:effectRef>
+            <a:fontRef idx="minor">
+              <a:schemeClr val="lt1"/>
+            </a:fontRef>
+          </p:style>
+          <p:txBody>
+            <a:bodyPr rtlCol="0" anchor="ctr"/>
+            <a:lstStyle/>
+            <a:p>
+              <a:pPr algn="ctr"/>
+              <a:r>
+                <a:rPr lang="en-US" sz="1600" dirty="0" smtClean="0">
+                  <a:latin typeface="Segoe UI" panose="020B0502040204020203" pitchFamily="34" charset="0"/>
+                  <a:cs typeface="Segoe UI" panose="020B0502040204020203" pitchFamily="34" charset="0"/>
+                </a:rPr>
+                <a:t>Item - Hardware</a:t>
+              </a:r>
+              <a:endParaRPr lang="en-US" sz="1600" dirty="0">
+                <a:latin typeface="Segoe UI" panose="020B0502040204020203" pitchFamily="34" charset="0"/>
+                <a:cs typeface="Segoe UI" panose="020B0502040204020203" pitchFamily="34" charset="0"/>
+              </a:endParaRPr>
+            </a:p>
+          </p:txBody>
+        </p:sp>
+        <p:sp>
+          <p:nvSpPr>
+            <p:cNvPr id="70" name="Rectangle 69">
+              <a:extLst>
+                <a:ext uri="{FF2B5EF4-FFF2-40B4-BE49-F238E27FC236}">
+                  <a16:creationId xmlns:a16="http://schemas.microsoft.com/office/drawing/2014/main" id="{92F3C2D4-DE2E-4B48-93DA-8F055147368D}"/>
+                </a:ext>
+              </a:extLst>
+            </p:cNvPr>
+            <p:cNvSpPr/>
+            <p:nvPr/>
+          </p:nvSpPr>
+          <p:spPr>
+            <a:xfrm>
+              <a:off x="100579" y="4217661"/>
+              <a:ext cx="2286000" cy="2031325"/>
+            </a:xfrm>
+            <a:prstGeom prst="rect">
+              <a:avLst/>
+            </a:prstGeom>
+            <a:solidFill>
+              <a:schemeClr val="bg1">
+                <a:lumMod val="85000"/>
+              </a:schemeClr>
+            </a:solidFill>
+            <a:ln>
+              <a:noFill/>
+            </a:ln>
+          </p:spPr>
+          <p:style>
+            <a:lnRef idx="2">
+              <a:schemeClr val="accent1">
+                <a:shade val="50000"/>
+              </a:schemeClr>
+            </a:lnRef>
+            <a:fillRef idx="1">
+              <a:schemeClr val="accent1"/>
+            </a:fillRef>
+            <a:effectRef idx="0">
+              <a:schemeClr val="accent1"/>
+            </a:effectRef>
+            <a:fontRef idx="minor">
+              <a:schemeClr val="lt1"/>
+            </a:fontRef>
+          </p:style>
+          <p:txBody>
+            <a:bodyPr rtlCol="0" anchor="ctr" anchorCtr="0">
+              <a:spAutoFit/>
+            </a:bodyPr>
+            <a:lstStyle/>
+            <a:p>
+              <a:pPr algn="ctr"/>
+              <a:r>
+                <a:rPr lang="en-US" sz="1400" dirty="0" smtClean="0">
+                  <a:solidFill>
+                    <a:schemeClr val="tx1">
+                      <a:lumMod val="65000"/>
+                      <a:lumOff val="35000"/>
+                    </a:schemeClr>
+                  </a:solidFill>
+                  <a:latin typeface="Segoe UI" panose="020B0502040204020203" pitchFamily="34" charset="0"/>
+                  <a:cs typeface="Segoe UI" panose="020B0502040204020203" pitchFamily="34" charset="0"/>
+                </a:rPr>
+                <a:t>Category</a:t>
+              </a:r>
+            </a:p>
+            <a:p>
+              <a:pPr algn="ctr"/>
+              <a:r>
+                <a:rPr lang="en-US" sz="1400" dirty="0" smtClean="0">
+                  <a:solidFill>
+                    <a:schemeClr val="tx1">
+                      <a:lumMod val="65000"/>
+                      <a:lumOff val="35000"/>
+                    </a:schemeClr>
+                  </a:solidFill>
+                  <a:latin typeface="Segoe UI" panose="020B0502040204020203" pitchFamily="34" charset="0"/>
+                  <a:cs typeface="Segoe UI" panose="020B0502040204020203" pitchFamily="34" charset="0"/>
+                </a:rPr>
+                <a:t>Order – If Exists</a:t>
+              </a:r>
+            </a:p>
+            <a:p>
+              <a:pPr algn="ctr"/>
+              <a:r>
+                <a:rPr lang="en-US" sz="1400" dirty="0" smtClean="0">
+                  <a:solidFill>
+                    <a:schemeClr val="tx1">
+                      <a:lumMod val="65000"/>
+                      <a:lumOff val="35000"/>
+                    </a:schemeClr>
+                  </a:solidFill>
+                  <a:latin typeface="Segoe UI" panose="020B0502040204020203" pitchFamily="34" charset="0"/>
+                  <a:cs typeface="Segoe UI" panose="020B0502040204020203" pitchFamily="34" charset="0"/>
+                </a:rPr>
+                <a:t>Manufacturer</a:t>
+              </a:r>
+            </a:p>
+            <a:p>
+              <a:pPr algn="ctr"/>
+              <a:r>
+                <a:rPr lang="en-US" sz="1400" dirty="0" smtClean="0">
+                  <a:solidFill>
+                    <a:schemeClr val="tx1">
+                      <a:lumMod val="65000"/>
+                      <a:lumOff val="35000"/>
+                    </a:schemeClr>
+                  </a:solidFill>
+                  <a:latin typeface="Segoe UI" panose="020B0502040204020203" pitchFamily="34" charset="0"/>
+                  <a:cs typeface="Segoe UI" panose="020B0502040204020203" pitchFamily="34" charset="0"/>
+                </a:rPr>
+                <a:t>Model</a:t>
+              </a:r>
+            </a:p>
+            <a:p>
+              <a:pPr algn="ctr"/>
+              <a:r>
+                <a:rPr lang="en-US" sz="1400" dirty="0" smtClean="0">
+                  <a:solidFill>
+                    <a:schemeClr val="tx1">
+                      <a:lumMod val="65000"/>
+                      <a:lumOff val="35000"/>
+                    </a:schemeClr>
+                  </a:solidFill>
+                  <a:latin typeface="Segoe UI" panose="020B0502040204020203" pitchFamily="34" charset="0"/>
+                  <a:cs typeface="Segoe UI" panose="020B0502040204020203" pitchFamily="34" charset="0"/>
+                </a:rPr>
+                <a:t>Nsn</a:t>
+              </a:r>
+            </a:p>
+            <a:p>
+              <a:pPr algn="ctr"/>
+              <a:r>
+                <a:rPr lang="en-US" sz="1400" dirty="0" smtClean="0">
+                  <a:solidFill>
+                    <a:schemeClr val="tx1">
+                      <a:lumMod val="65000"/>
+                      <a:lumOff val="35000"/>
+                    </a:schemeClr>
+                  </a:solidFill>
+                  <a:latin typeface="Segoe UI" panose="020B0502040204020203" pitchFamily="34" charset="0"/>
+                  <a:cs typeface="Segoe UI" panose="020B0502040204020203" pitchFamily="34" charset="0"/>
+                </a:rPr>
+                <a:t>Item Type</a:t>
+              </a:r>
+            </a:p>
+            <a:p>
+              <a:pPr algn="ctr"/>
+              <a:r>
+                <a:rPr lang="en-US" sz="1400" dirty="0" smtClean="0">
+                  <a:solidFill>
+                    <a:schemeClr val="tx1">
+                      <a:lumMod val="65000"/>
+                      <a:lumOff val="35000"/>
+                    </a:schemeClr>
+                  </a:solidFill>
+                  <a:latin typeface="Segoe UI" panose="020B0502040204020203" pitchFamily="34" charset="0"/>
+                  <a:cs typeface="Segoe UI" panose="020B0502040204020203" pitchFamily="34" charset="0"/>
+                </a:rPr>
+                <a:t>Service Tag</a:t>
+              </a:r>
+            </a:p>
+            <a:p>
+              <a:pPr algn="ctr"/>
+              <a:r>
+                <a:rPr lang="en-US" sz="1400" dirty="0" smtClean="0">
+                  <a:solidFill>
+                    <a:schemeClr val="tx1">
+                      <a:lumMod val="65000"/>
+                      <a:lumOff val="35000"/>
+                    </a:schemeClr>
+                  </a:solidFill>
+                  <a:latin typeface="Segoe UI" panose="020B0502040204020203" pitchFamily="34" charset="0"/>
+                  <a:cs typeface="Segoe UI" panose="020B0502040204020203" pitchFamily="34" charset="0"/>
+                </a:rPr>
+                <a:t>Mac Address</a:t>
+              </a:r>
+            </a:p>
+            <a:p>
+              <a:pPr algn="ctr"/>
+              <a:r>
+                <a:rPr lang="en-US" sz="1400" dirty="0" smtClean="0">
+                  <a:solidFill>
+                    <a:schemeClr val="tx1">
+                      <a:lumMod val="65000"/>
+                      <a:lumOff val="35000"/>
+                    </a:schemeClr>
+                  </a:solidFill>
+                  <a:latin typeface="Segoe UI" panose="020B0502040204020203" pitchFamily="34" charset="0"/>
+                  <a:cs typeface="Segoe UI" panose="020B0502040204020203" pitchFamily="34" charset="0"/>
+                </a:rPr>
+                <a:t>Location</a:t>
+              </a:r>
+            </a:p>
+          </p:txBody>
+        </p:sp>
+      </p:grpSp>
+      <p:grpSp>
+        <p:nvGrpSpPr>
+          <p:cNvPr id="28" name="Group 27"/>
+          <p:cNvGrpSpPr/>
+          <p:nvPr/>
+        </p:nvGrpSpPr>
+        <p:grpSpPr>
+          <a:xfrm>
+            <a:off x="100579" y="2637172"/>
+            <a:ext cx="2286000" cy="1012984"/>
+            <a:chOff x="100584" y="1614397"/>
+            <a:chExt cx="2286000" cy="1012984"/>
+          </a:xfrm>
+        </p:grpSpPr>
+        <p:sp>
+          <p:nvSpPr>
+            <p:cNvPr id="29" name="Rectangle 28">
+              <a:extLst>
+                <a:ext uri="{FF2B5EF4-FFF2-40B4-BE49-F238E27FC236}">
+                  <a16:creationId xmlns:a16="http://schemas.microsoft.com/office/drawing/2014/main" id="{5626B030-B48B-42C0-9339-F603883EA700}"/>
+                </a:ext>
+              </a:extLst>
+            </p:cNvPr>
+            <p:cNvSpPr/>
+            <p:nvPr/>
+          </p:nvSpPr>
+          <p:spPr>
+            <a:xfrm>
+              <a:off x="100584" y="1614397"/>
+              <a:ext cx="2286000" cy="274320"/>
+            </a:xfrm>
+            <a:prstGeom prst="rect">
+              <a:avLst/>
+            </a:prstGeom>
+            <a:solidFill>
+              <a:schemeClr val="tx1">
+                <a:lumMod val="75000"/>
+                <a:lumOff val="25000"/>
+              </a:schemeClr>
+            </a:solidFill>
+            <a:ln>
+              <a:noFill/>
+            </a:ln>
+          </p:spPr>
+          <p:style>
+            <a:lnRef idx="2">
+              <a:schemeClr val="accent1">
+                <a:shade val="50000"/>
+              </a:schemeClr>
+            </a:lnRef>
+            <a:fillRef idx="1">
+              <a:schemeClr val="accent1"/>
+            </a:fillRef>
+            <a:effectRef idx="0">
+              <a:schemeClr val="accent1"/>
+            </a:effectRef>
+            <a:fontRef idx="minor">
+              <a:schemeClr val="lt1"/>
+            </a:fontRef>
+          </p:style>
+          <p:txBody>
+            <a:bodyPr rtlCol="0" anchor="ctr"/>
+            <a:lstStyle/>
+            <a:p>
+              <a:pPr algn="ctr"/>
+              <a:r>
+                <a:rPr lang="en-US" sz="1600" dirty="0" smtClean="0">
+                  <a:latin typeface="Segoe UI" panose="020B0502040204020203" pitchFamily="34" charset="0"/>
+                  <a:cs typeface="Segoe UI" panose="020B0502040204020203" pitchFamily="34" charset="0"/>
+                </a:rPr>
+                <a:t>Inventory Item</a:t>
+              </a:r>
+              <a:endParaRPr lang="en-US" sz="1600" dirty="0">
+                <a:latin typeface="Segoe UI" panose="020B0502040204020203" pitchFamily="34" charset="0"/>
+                <a:cs typeface="Segoe UI" panose="020B0502040204020203" pitchFamily="34" charset="0"/>
+              </a:endParaRPr>
+            </a:p>
+          </p:txBody>
+        </p:sp>
+        <p:sp>
+          <p:nvSpPr>
+            <p:cNvPr id="30" name="Rectangle 29">
+              <a:extLst>
+                <a:ext uri="{FF2B5EF4-FFF2-40B4-BE49-F238E27FC236}">
+                  <a16:creationId xmlns:a16="http://schemas.microsoft.com/office/drawing/2014/main" id="{92F3C2D4-DE2E-4B48-93DA-8F055147368D}"/>
+                </a:ext>
+              </a:extLst>
+            </p:cNvPr>
+            <p:cNvSpPr/>
+            <p:nvPr/>
+          </p:nvSpPr>
+          <p:spPr>
+            <a:xfrm>
+              <a:off x="100584" y="1888717"/>
+              <a:ext cx="2286000" cy="738664"/>
+            </a:xfrm>
+            <a:prstGeom prst="rect">
+              <a:avLst/>
+            </a:prstGeom>
+            <a:solidFill>
+              <a:schemeClr val="bg1">
+                <a:lumMod val="85000"/>
+              </a:schemeClr>
+            </a:solidFill>
+            <a:ln>
+              <a:noFill/>
+            </a:ln>
+          </p:spPr>
+          <p:style>
+            <a:lnRef idx="2">
+              <a:schemeClr val="accent1">
+                <a:shade val="50000"/>
+              </a:schemeClr>
+            </a:lnRef>
+            <a:fillRef idx="1">
+              <a:schemeClr val="accent1"/>
+            </a:fillRef>
+            <a:effectRef idx="0">
+              <a:schemeClr val="accent1"/>
+            </a:effectRef>
+            <a:fontRef idx="minor">
+              <a:schemeClr val="lt1"/>
+            </a:fontRef>
+          </p:style>
+          <p:txBody>
+            <a:bodyPr rtlCol="0" anchor="ctr" anchorCtr="0">
+              <a:spAutoFit/>
+            </a:bodyPr>
+            <a:lstStyle/>
+            <a:p>
+              <a:pPr algn="ctr"/>
+              <a:r>
+                <a:rPr lang="en-US" sz="1400" dirty="0" smtClean="0">
+                  <a:solidFill>
+                    <a:schemeClr val="tx1">
+                      <a:lumMod val="65000"/>
+                      <a:lumOff val="35000"/>
+                    </a:schemeClr>
+                  </a:solidFill>
+                  <a:latin typeface="Segoe UI" panose="020B0502040204020203" pitchFamily="34" charset="0"/>
+                  <a:cs typeface="Segoe UI" panose="020B0502040204020203" pitchFamily="34" charset="0"/>
+                </a:rPr>
+                <a:t>Is Accounted</a:t>
+              </a:r>
+            </a:p>
+            <a:p>
+              <a:pPr algn="ctr"/>
+              <a:r>
+                <a:rPr lang="en-US" sz="1400" dirty="0" smtClean="0">
+                  <a:solidFill>
+                    <a:schemeClr val="tx1">
+                      <a:lumMod val="65000"/>
+                      <a:lumOff val="35000"/>
+                    </a:schemeClr>
+                  </a:solidFill>
+                  <a:latin typeface="Segoe UI" panose="020B0502040204020203" pitchFamily="34" charset="0"/>
+                  <a:cs typeface="Segoe UI" panose="020B0502040204020203" pitchFamily="34" charset="0"/>
+                </a:rPr>
+                <a:t>Is Missing</a:t>
+              </a:r>
+            </a:p>
+            <a:p>
+              <a:pPr algn="ctr"/>
+              <a:r>
+                <a:rPr lang="en-US" sz="1400" dirty="0" smtClean="0">
+                  <a:solidFill>
+                    <a:schemeClr val="tx1">
+                      <a:lumMod val="65000"/>
+                      <a:lumOff val="35000"/>
+                    </a:schemeClr>
+                  </a:solidFill>
+                  <a:latin typeface="Segoe UI" panose="020B0502040204020203" pitchFamily="34" charset="0"/>
+                  <a:cs typeface="Segoe UI" panose="020B0502040204020203" pitchFamily="34" charset="0"/>
+                </a:rPr>
+                <a:t>Remarks</a:t>
+              </a:r>
+              <a:endParaRPr lang="en-US" sz="1400" dirty="0">
+                <a:solidFill>
+                  <a:schemeClr val="tx1">
+                    <a:lumMod val="65000"/>
+                    <a:lumOff val="35000"/>
+                  </a:schemeClr>
+                </a:solidFill>
+                <a:latin typeface="Segoe UI" panose="020B0502040204020203" pitchFamily="34" charset="0"/>
+                <a:cs typeface="Segoe UI" panose="020B0502040204020203" pitchFamily="34" charset="0"/>
+              </a:endParaRPr>
+            </a:p>
+          </p:txBody>
+        </p:sp>
+      </p:grpSp>
+      <p:grpSp>
+        <p:nvGrpSpPr>
+          <p:cNvPr id="31" name="Group 30"/>
+          <p:cNvGrpSpPr/>
+          <p:nvPr/>
+        </p:nvGrpSpPr>
+        <p:grpSpPr>
+          <a:xfrm>
+            <a:off x="5673815" y="2637172"/>
+            <a:ext cx="2286000" cy="1012984"/>
+            <a:chOff x="100584" y="1614397"/>
+            <a:chExt cx="2286000" cy="1012984"/>
+          </a:xfrm>
+        </p:grpSpPr>
+        <p:sp>
+          <p:nvSpPr>
+            <p:cNvPr id="32" name="Rectangle 31">
+              <a:extLst>
+                <a:ext uri="{FF2B5EF4-FFF2-40B4-BE49-F238E27FC236}">
+                  <a16:creationId xmlns:a16="http://schemas.microsoft.com/office/drawing/2014/main" id="{5626B030-B48B-42C0-9339-F603883EA700}"/>
+                </a:ext>
+              </a:extLst>
+            </p:cNvPr>
+            <p:cNvSpPr/>
+            <p:nvPr/>
+          </p:nvSpPr>
+          <p:spPr>
+            <a:xfrm>
+              <a:off x="100584" y="1614397"/>
+              <a:ext cx="2286000" cy="274320"/>
+            </a:xfrm>
+            <a:prstGeom prst="rect">
+              <a:avLst/>
+            </a:prstGeom>
+            <a:solidFill>
+              <a:schemeClr val="tx1">
+                <a:lumMod val="75000"/>
+                <a:lumOff val="25000"/>
+              </a:schemeClr>
+            </a:solidFill>
+            <a:ln>
+              <a:noFill/>
+            </a:ln>
+          </p:spPr>
+          <p:style>
+            <a:lnRef idx="2">
+              <a:schemeClr val="accent1">
+                <a:shade val="50000"/>
+              </a:schemeClr>
+            </a:lnRef>
+            <a:fillRef idx="1">
+              <a:schemeClr val="accent1"/>
+            </a:fillRef>
+            <a:effectRef idx="0">
+              <a:schemeClr val="accent1"/>
+            </a:effectRef>
+            <a:fontRef idx="minor">
+              <a:schemeClr val="lt1"/>
+            </a:fontRef>
+          </p:style>
+          <p:txBody>
+            <a:bodyPr rtlCol="0" anchor="ctr"/>
+            <a:lstStyle/>
+            <a:p>
+              <a:pPr algn="ctr"/>
+              <a:r>
+                <a:rPr lang="en-US" sz="1600" dirty="0" smtClean="0">
+                  <a:latin typeface="Segoe UI" panose="020B0502040204020203" pitchFamily="34" charset="0"/>
+                  <a:cs typeface="Segoe UI" panose="020B0502040204020203" pitchFamily="34" charset="0"/>
+                </a:rPr>
+                <a:t>Inventory Item</a:t>
+              </a:r>
+              <a:endParaRPr lang="en-US" sz="1600" dirty="0">
+                <a:latin typeface="Segoe UI" panose="020B0502040204020203" pitchFamily="34" charset="0"/>
+                <a:cs typeface="Segoe UI" panose="020B0502040204020203" pitchFamily="34" charset="0"/>
+              </a:endParaRPr>
+            </a:p>
+          </p:txBody>
+        </p:sp>
+        <p:sp>
+          <p:nvSpPr>
+            <p:cNvPr id="33" name="Rectangle 32">
+              <a:extLst>
+                <a:ext uri="{FF2B5EF4-FFF2-40B4-BE49-F238E27FC236}">
+                  <a16:creationId xmlns:a16="http://schemas.microsoft.com/office/drawing/2014/main" id="{92F3C2D4-DE2E-4B48-93DA-8F055147368D}"/>
+                </a:ext>
+              </a:extLst>
+            </p:cNvPr>
+            <p:cNvSpPr/>
+            <p:nvPr/>
+          </p:nvSpPr>
+          <p:spPr>
+            <a:xfrm>
+              <a:off x="100584" y="1888717"/>
+              <a:ext cx="2286000" cy="738664"/>
+            </a:xfrm>
+            <a:prstGeom prst="rect">
+              <a:avLst/>
+            </a:prstGeom>
+            <a:solidFill>
+              <a:schemeClr val="bg1">
+                <a:lumMod val="85000"/>
+              </a:schemeClr>
+            </a:solidFill>
+            <a:ln>
+              <a:noFill/>
+            </a:ln>
+          </p:spPr>
+          <p:style>
+            <a:lnRef idx="2">
+              <a:schemeClr val="accent1">
+                <a:shade val="50000"/>
+              </a:schemeClr>
+            </a:lnRef>
+            <a:fillRef idx="1">
+              <a:schemeClr val="accent1"/>
+            </a:fillRef>
+            <a:effectRef idx="0">
+              <a:schemeClr val="accent1"/>
+            </a:effectRef>
+            <a:fontRef idx="minor">
+              <a:schemeClr val="lt1"/>
+            </a:fontRef>
+          </p:style>
+          <p:txBody>
+            <a:bodyPr rtlCol="0" anchor="ctr" anchorCtr="0">
+              <a:spAutoFit/>
+            </a:bodyPr>
+            <a:lstStyle/>
+            <a:p>
+              <a:pPr algn="ctr"/>
+              <a:r>
+                <a:rPr lang="en-US" sz="1400" dirty="0" smtClean="0">
+                  <a:solidFill>
+                    <a:schemeClr val="tx1">
+                      <a:lumMod val="65000"/>
+                      <a:lumOff val="35000"/>
+                    </a:schemeClr>
+                  </a:solidFill>
+                  <a:latin typeface="Segoe UI" panose="020B0502040204020203" pitchFamily="34" charset="0"/>
+                  <a:cs typeface="Segoe UI" panose="020B0502040204020203" pitchFamily="34" charset="0"/>
+                </a:rPr>
+                <a:t>Is Accounted</a:t>
+              </a:r>
+            </a:p>
+            <a:p>
+              <a:pPr algn="ctr"/>
+              <a:r>
+                <a:rPr lang="en-US" sz="1400" dirty="0" smtClean="0">
+                  <a:solidFill>
+                    <a:schemeClr val="tx1">
+                      <a:lumMod val="65000"/>
+                      <a:lumOff val="35000"/>
+                    </a:schemeClr>
+                  </a:solidFill>
+                  <a:latin typeface="Segoe UI" panose="020B0502040204020203" pitchFamily="34" charset="0"/>
+                  <a:cs typeface="Segoe UI" panose="020B0502040204020203" pitchFamily="34" charset="0"/>
+                </a:rPr>
+                <a:t>Is Missing</a:t>
+              </a:r>
+            </a:p>
+            <a:p>
+              <a:pPr algn="ctr"/>
+              <a:r>
+                <a:rPr lang="en-US" sz="1400" dirty="0" smtClean="0">
+                  <a:solidFill>
+                    <a:schemeClr val="tx1">
+                      <a:lumMod val="65000"/>
+                      <a:lumOff val="35000"/>
+                    </a:schemeClr>
+                  </a:solidFill>
+                  <a:latin typeface="Segoe UI" panose="020B0502040204020203" pitchFamily="34" charset="0"/>
+                  <a:cs typeface="Segoe UI" panose="020B0502040204020203" pitchFamily="34" charset="0"/>
+                </a:rPr>
+                <a:t>Remarks</a:t>
+              </a:r>
+              <a:endParaRPr lang="en-US" sz="1400" dirty="0">
+                <a:solidFill>
+                  <a:schemeClr val="tx1">
+                    <a:lumMod val="65000"/>
+                    <a:lumOff val="35000"/>
+                  </a:schemeClr>
+                </a:solidFill>
+                <a:latin typeface="Segoe UI" panose="020B0502040204020203" pitchFamily="34" charset="0"/>
+                <a:cs typeface="Segoe UI" panose="020B0502040204020203" pitchFamily="34" charset="0"/>
+              </a:endParaRPr>
+            </a:p>
+          </p:txBody>
+        </p:sp>
+      </p:grpSp>
+      <p:cxnSp>
+        <p:nvCxnSpPr>
+          <p:cNvPr id="11" name="Straight Arrow Connector 10"/>
+          <p:cNvCxnSpPr>
+            <a:stCxn id="30" idx="2"/>
+            <a:endCxn id="39" idx="0"/>
+          </p:cNvCxnSpPr>
+          <p:nvPr/>
+        </p:nvCxnSpPr>
+        <p:spPr>
+          <a:xfrm>
+            <a:off x="1243579" y="3650156"/>
+            <a:ext cx="5" cy="490749"/>
+          </a:xfrm>
+          <a:prstGeom prst="straightConnector1">
+            <a:avLst/>
+          </a:prstGeom>
+          <a:ln w="12700">
+            <a:tailEnd type="triangle"/>
+          </a:ln>
+        </p:spPr>
+        <p:style>
+          <a:lnRef idx="1">
+            <a:schemeClr val="accent6"/>
+          </a:lnRef>
+          <a:fillRef idx="0">
+            <a:schemeClr val="accent6"/>
+          </a:fillRef>
+          <a:effectRef idx="0">
+            <a:schemeClr val="accent6"/>
+          </a:effectRef>
+          <a:fontRef idx="minor">
+            <a:schemeClr val="tx1"/>
+          </a:fontRef>
+        </p:style>
+      </p:cxnSp>
+      <p:cxnSp>
+        <p:nvCxnSpPr>
+          <p:cNvPr id="14" name="Straight Arrow Connector 13"/>
+          <p:cNvCxnSpPr>
+            <a:stCxn id="33" idx="2"/>
+            <a:endCxn id="69" idx="0"/>
+          </p:cNvCxnSpPr>
+          <p:nvPr/>
+        </p:nvCxnSpPr>
+        <p:spPr>
+          <a:xfrm>
+            <a:off x="6816815" y="3650156"/>
+            <a:ext cx="5" cy="490749"/>
+          </a:xfrm>
+          <a:prstGeom prst="straightConnector1">
+            <a:avLst/>
+          </a:prstGeom>
+          <a:ln w="12700">
+            <a:tailEnd type="triangle"/>
+          </a:ln>
+        </p:spPr>
+        <p:style>
+          <a:lnRef idx="1">
+            <a:schemeClr val="accent6"/>
+          </a:lnRef>
+          <a:fillRef idx="0">
+            <a:schemeClr val="accent6"/>
+          </a:fillRef>
+          <a:effectRef idx="0">
+            <a:schemeClr val="accent6"/>
+          </a:effectRef>
+          <a:fontRef idx="minor">
+            <a:schemeClr val="tx1"/>
+          </a:fontRef>
+        </p:style>
+      </p:cxnSp>
+      <p:cxnSp>
+        <p:nvCxnSpPr>
+          <p:cNvPr id="18" name="Elbow Connector 17"/>
+          <p:cNvCxnSpPr>
+            <a:stCxn id="60" idx="2"/>
+            <a:endCxn id="29" idx="0"/>
+          </p:cNvCxnSpPr>
+          <p:nvPr/>
+        </p:nvCxnSpPr>
+        <p:spPr>
+          <a:xfrm rot="5400000">
+            <a:off x="2382640" y="989605"/>
+            <a:ext cx="508506" cy="2786628"/>
+          </a:xfrm>
+          <a:prstGeom prst="bentConnector3">
+            <a:avLst/>
+          </a:prstGeom>
+          <a:ln w="12700">
+            <a:tailEnd type="triangle"/>
+          </a:ln>
+        </p:spPr>
+        <p:style>
+          <a:lnRef idx="1">
+            <a:schemeClr val="accent6"/>
+          </a:lnRef>
+          <a:fillRef idx="0">
+            <a:schemeClr val="accent6"/>
+          </a:fillRef>
+          <a:effectRef idx="0">
+            <a:schemeClr val="accent6"/>
+          </a:effectRef>
+          <a:fontRef idx="minor">
+            <a:schemeClr val="tx1"/>
+          </a:fontRef>
+        </p:style>
+      </p:cxnSp>
+      <p:cxnSp>
+        <p:nvCxnSpPr>
+          <p:cNvPr id="21" name="Elbow Connector 20"/>
+          <p:cNvCxnSpPr>
+            <a:stCxn id="60" idx="2"/>
+            <a:endCxn id="32" idx="0"/>
+          </p:cNvCxnSpPr>
+          <p:nvPr/>
+        </p:nvCxnSpPr>
+        <p:spPr>
+          <a:xfrm rot="16200000" flipH="1">
+            <a:off x="5169258" y="989615"/>
+            <a:ext cx="508506" cy="2786608"/>
+          </a:xfrm>
+          <a:prstGeom prst="bentConnector3">
+            <a:avLst/>
+          </a:prstGeom>
+          <a:ln w="12700">
+            <a:tailEnd type="triangle"/>
+          </a:ln>
+        </p:spPr>
+        <p:style>
+          <a:lnRef idx="1">
+            <a:schemeClr val="accent6"/>
+          </a:lnRef>
+          <a:fillRef idx="0">
+            <a:schemeClr val="accent6"/>
+          </a:fillRef>
+          <a:effectRef idx="0">
+            <a:schemeClr val="accent6"/>
+          </a:effectRef>
+          <a:fontRef idx="minor">
+            <a:schemeClr val="tx1"/>
+          </a:fontRef>
+        </p:style>
+      </p:cxnSp>
+      <p:grpSp>
+        <p:nvGrpSpPr>
+          <p:cNvPr id="25" name="Group 24"/>
+          <p:cNvGrpSpPr/>
+          <p:nvPr/>
+        </p:nvGrpSpPr>
+        <p:grpSpPr>
+          <a:xfrm>
+            <a:off x="2641662" y="5747402"/>
+            <a:ext cx="2777006" cy="1017040"/>
+            <a:chOff x="252984" y="1006158"/>
+            <a:chExt cx="7859261" cy="1017040"/>
+          </a:xfrm>
+        </p:grpSpPr>
+        <p:sp>
+          <p:nvSpPr>
+            <p:cNvPr id="26" name="Rectangle 25">
               <a:extLst>
                 <a:ext uri="{FF2B5EF4-FFF2-40B4-BE49-F238E27FC236}">
                   <a16:creationId xmlns:a16="http://schemas.microsoft.com/office/drawing/2014/main" id="{4808B174-B9CF-4CAD-8A19-1BC9D885D3B3}"/>
@@ -16574,7 +17901,7 @@
           </p:nvSpPr>
           <p:spPr>
             <a:xfrm>
-              <a:off x="100584" y="853758"/>
+              <a:off x="252984" y="1006158"/>
               <a:ext cx="7859261" cy="274320"/>
             </a:xfrm>
             <a:prstGeom prst="rect">
@@ -16616,288 +17943,14 @@
                   <a:latin typeface="Segoe UI" panose="020B0502040204020203" pitchFamily="34" charset="0"/>
                   <a:cs typeface="Segoe UI" panose="020B0502040204020203" pitchFamily="34" charset="0"/>
                 </a:rPr>
-                <a:t>Inventory</a:t>
+                <a:t>Inventory Verification</a:t>
               </a:r>
-              <a:endParaRPr lang="en-US" sz="1600" dirty="0">
-                <a:latin typeface="Segoe UI" panose="020B0502040204020203" pitchFamily="34" charset="0"/>
-                <a:cs typeface="Segoe UI" panose="020B0502040204020203" pitchFamily="34" charset="0"/>
-              </a:endParaRPr>
             </a:p>
           </p:txBody>
         </p:sp>
-        <p:grpSp>
-          <p:nvGrpSpPr>
-            <p:cNvPr id="5" name="Group 4"/>
-            <p:cNvGrpSpPr/>
-            <p:nvPr/>
-          </p:nvGrpSpPr>
-          <p:grpSpPr>
-            <a:xfrm>
-              <a:off x="100579" y="4250610"/>
-              <a:ext cx="2286005" cy="2090202"/>
-              <a:chOff x="100579" y="1614397"/>
-              <a:chExt cx="2286005" cy="2090202"/>
-            </a:xfrm>
-          </p:grpSpPr>
-          <p:sp>
-            <p:nvSpPr>
-              <p:cNvPr id="39" name="Rectangle 38">
-                <a:extLst>
-                  <a:ext uri="{FF2B5EF4-FFF2-40B4-BE49-F238E27FC236}">
-                    <a16:creationId xmlns:a16="http://schemas.microsoft.com/office/drawing/2014/main" id="{5626B030-B48B-42C0-9339-F603883EA700}"/>
-                  </a:ext>
-                </a:extLst>
-              </p:cNvPr>
-              <p:cNvSpPr/>
-              <p:nvPr/>
-            </p:nvSpPr>
-            <p:spPr>
-              <a:xfrm>
-                <a:off x="100584" y="1614397"/>
-                <a:ext cx="2286000" cy="274320"/>
-              </a:xfrm>
-              <a:prstGeom prst="rect">
-                <a:avLst/>
-              </a:prstGeom>
-              <a:solidFill>
-                <a:schemeClr val="tx1">
-                  <a:lumMod val="75000"/>
-                  <a:lumOff val="25000"/>
-                </a:schemeClr>
-              </a:solidFill>
-              <a:ln>
-                <a:noFill/>
-              </a:ln>
-            </p:spPr>
-            <p:style>
-              <a:lnRef idx="2">
-                <a:schemeClr val="accent1">
-                  <a:shade val="50000"/>
-                </a:schemeClr>
-              </a:lnRef>
-              <a:fillRef idx="1">
-                <a:schemeClr val="accent1"/>
-              </a:fillRef>
-              <a:effectRef idx="0">
-                <a:schemeClr val="accent1"/>
-              </a:effectRef>
-              <a:fontRef idx="minor">
-                <a:schemeClr val="lt1"/>
-              </a:fontRef>
-            </p:style>
-            <p:txBody>
-              <a:bodyPr rtlCol="0" anchor="ctr"/>
-              <a:lstStyle/>
-              <a:p>
-                <a:pPr algn="ctr"/>
-                <a:r>
-                  <a:rPr lang="en-US" sz="1600" dirty="0" smtClean="0">
-                    <a:latin typeface="Segoe UI" panose="020B0502040204020203" pitchFamily="34" charset="0"/>
-                    <a:cs typeface="Segoe UI" panose="020B0502040204020203" pitchFamily="34" charset="0"/>
-                  </a:rPr>
-                  <a:t>Item - Serialized</a:t>
-                </a:r>
-                <a:endParaRPr lang="en-US" sz="1600" dirty="0">
-                  <a:latin typeface="Segoe UI" panose="020B0502040204020203" pitchFamily="34" charset="0"/>
-                  <a:cs typeface="Segoe UI" panose="020B0502040204020203" pitchFamily="34" charset="0"/>
-                </a:endParaRPr>
-              </a:p>
-            </p:txBody>
-          </p:sp>
-          <p:sp>
-            <p:nvSpPr>
-              <p:cNvPr id="41" name="Rectangle 40">
-                <a:extLst>
-                  <a:ext uri="{FF2B5EF4-FFF2-40B4-BE49-F238E27FC236}">
-                    <a16:creationId xmlns:a16="http://schemas.microsoft.com/office/drawing/2014/main" id="{92F3C2D4-DE2E-4B48-93DA-8F055147368D}"/>
-                  </a:ext>
-                </a:extLst>
-              </p:cNvPr>
-              <p:cNvSpPr/>
-              <p:nvPr/>
-            </p:nvSpPr>
-            <p:spPr>
-              <a:xfrm>
-                <a:off x="100579" y="1888717"/>
-                <a:ext cx="2286000" cy="1815882"/>
-              </a:xfrm>
-              <a:prstGeom prst="rect">
-                <a:avLst/>
-              </a:prstGeom>
-              <a:solidFill>
-                <a:schemeClr val="bg1">
-                  <a:lumMod val="85000"/>
-                </a:schemeClr>
-              </a:solidFill>
-              <a:ln>
-                <a:noFill/>
-              </a:ln>
-            </p:spPr>
-            <p:style>
-              <a:lnRef idx="2">
-                <a:schemeClr val="accent1">
-                  <a:shade val="50000"/>
-                </a:schemeClr>
-              </a:lnRef>
-              <a:fillRef idx="1">
-                <a:schemeClr val="accent1"/>
-              </a:fillRef>
-              <a:effectRef idx="0">
-                <a:schemeClr val="accent1"/>
-              </a:effectRef>
-              <a:fontRef idx="minor">
-                <a:schemeClr val="lt1"/>
-              </a:fontRef>
-            </p:style>
-            <p:txBody>
-              <a:bodyPr rtlCol="0" anchor="ctr" anchorCtr="0">
-                <a:spAutoFit/>
-              </a:bodyPr>
-              <a:lstStyle/>
-              <a:p>
-                <a:pPr algn="ctr"/>
-                <a:r>
-                  <a:rPr lang="en-US" sz="1400" dirty="0" smtClean="0">
-                    <a:solidFill>
-                      <a:schemeClr val="tx1">
-                        <a:lumMod val="65000"/>
-                        <a:lumOff val="35000"/>
-                      </a:schemeClr>
-                    </a:solidFill>
-                    <a:latin typeface="Segoe UI" panose="020B0502040204020203" pitchFamily="34" charset="0"/>
-                    <a:cs typeface="Segoe UI" panose="020B0502040204020203" pitchFamily="34" charset="0"/>
-                  </a:rPr>
-                  <a:t>Category</a:t>
-                </a:r>
-              </a:p>
-              <a:p>
-                <a:pPr algn="ctr"/>
-                <a:r>
-                  <a:rPr lang="en-US" sz="1400" dirty="0" smtClean="0">
-                    <a:solidFill>
-                      <a:schemeClr val="tx1">
-                        <a:lumMod val="65000"/>
-                        <a:lumOff val="35000"/>
-                      </a:schemeClr>
-                    </a:solidFill>
-                    <a:latin typeface="Segoe UI" panose="020B0502040204020203" pitchFamily="34" charset="0"/>
-                    <a:cs typeface="Segoe UI" panose="020B0502040204020203" pitchFamily="34" charset="0"/>
-                  </a:rPr>
-                  <a:t>Order – If Exists</a:t>
-                </a:r>
-              </a:p>
-              <a:p>
-                <a:pPr algn="ctr"/>
-                <a:r>
-                  <a:rPr lang="en-US" sz="1400" dirty="0" smtClean="0">
-                    <a:solidFill>
-                      <a:schemeClr val="tx1">
-                        <a:lumMod val="65000"/>
-                        <a:lumOff val="35000"/>
-                      </a:schemeClr>
-                    </a:solidFill>
-                    <a:latin typeface="Segoe UI" panose="020B0502040204020203" pitchFamily="34" charset="0"/>
-                    <a:cs typeface="Segoe UI" panose="020B0502040204020203" pitchFamily="34" charset="0"/>
-                  </a:rPr>
-                  <a:t>Manufacturer</a:t>
-                </a:r>
-              </a:p>
-              <a:p>
-                <a:pPr algn="ctr"/>
-                <a:r>
-                  <a:rPr lang="en-US" sz="1400" dirty="0" smtClean="0">
-                    <a:solidFill>
-                      <a:schemeClr val="tx1">
-                        <a:lumMod val="65000"/>
-                        <a:lumOff val="35000"/>
-                      </a:schemeClr>
-                    </a:solidFill>
-                    <a:latin typeface="Segoe UI" panose="020B0502040204020203" pitchFamily="34" charset="0"/>
-                    <a:cs typeface="Segoe UI" panose="020B0502040204020203" pitchFamily="34" charset="0"/>
-                  </a:rPr>
-                  <a:t>Model</a:t>
-                </a:r>
-              </a:p>
-              <a:p>
-                <a:pPr algn="ctr"/>
-                <a:r>
-                  <a:rPr lang="en-US" sz="1400" dirty="0" smtClean="0">
-                    <a:solidFill>
-                      <a:schemeClr val="tx1">
-                        <a:lumMod val="65000"/>
-                        <a:lumOff val="35000"/>
-                      </a:schemeClr>
-                    </a:solidFill>
-                    <a:latin typeface="Segoe UI" panose="020B0502040204020203" pitchFamily="34" charset="0"/>
-                    <a:cs typeface="Segoe UI" panose="020B0502040204020203" pitchFamily="34" charset="0"/>
-                  </a:rPr>
-                  <a:t>Nsn</a:t>
-                </a:r>
-              </a:p>
-              <a:p>
-                <a:pPr algn="ctr"/>
-                <a:r>
-                  <a:rPr lang="en-US" sz="1400" dirty="0" smtClean="0">
-                    <a:solidFill>
-                      <a:schemeClr val="tx1">
-                        <a:lumMod val="65000"/>
-                        <a:lumOff val="35000"/>
-                      </a:schemeClr>
-                    </a:solidFill>
-                    <a:latin typeface="Segoe UI" panose="020B0502040204020203" pitchFamily="34" charset="0"/>
-                    <a:cs typeface="Segoe UI" panose="020B0502040204020203" pitchFamily="34" charset="0"/>
-                  </a:rPr>
-                  <a:t>Item Type</a:t>
-                </a:r>
-              </a:p>
-              <a:p>
-                <a:pPr algn="ctr"/>
-                <a:r>
-                  <a:rPr lang="en-US" sz="1400" dirty="0" smtClean="0">
-                    <a:solidFill>
-                      <a:schemeClr val="tx1">
-                        <a:lumMod val="65000"/>
-                        <a:lumOff val="35000"/>
-                      </a:schemeClr>
-                    </a:solidFill>
-                    <a:latin typeface="Segoe UI" panose="020B0502040204020203" pitchFamily="34" charset="0"/>
-                    <a:cs typeface="Segoe UI" panose="020B0502040204020203" pitchFamily="34" charset="0"/>
-                  </a:rPr>
-                  <a:t>Serial Number</a:t>
-                </a:r>
-              </a:p>
-              <a:p>
-                <a:pPr algn="ctr"/>
-                <a:r>
-                  <a:rPr lang="en-US" sz="1400" dirty="0" smtClean="0">
-                    <a:solidFill>
-                      <a:schemeClr val="tx1">
-                        <a:lumMod val="65000"/>
-                        <a:lumOff val="35000"/>
-                      </a:schemeClr>
-                    </a:solidFill>
-                    <a:latin typeface="Segoe UI" panose="020B0502040204020203" pitchFamily="34" charset="0"/>
-                    <a:cs typeface="Segoe UI" panose="020B0502040204020203" pitchFamily="34" charset="0"/>
-                  </a:rPr>
-                  <a:t>Location</a:t>
-                </a:r>
-                <a:endParaRPr lang="en-US" sz="1400" dirty="0">
-                  <a:solidFill>
-                    <a:schemeClr val="tx1">
-                      <a:lumMod val="65000"/>
-                      <a:lumOff val="35000"/>
-                    </a:schemeClr>
-                  </a:solidFill>
-                  <a:latin typeface="Segoe UI" panose="020B0502040204020203" pitchFamily="34" charset="0"/>
-                  <a:cs typeface="Segoe UI" panose="020B0502040204020203" pitchFamily="34" charset="0"/>
-                </a:endParaRPr>
-              </a:p>
-            </p:txBody>
-          </p:sp>
-        </p:grpSp>
         <p:sp>
           <p:nvSpPr>
-            <p:cNvPr id="60" name="Rectangle 59">
+            <p:cNvPr id="27" name="Rectangle 26">
               <a:extLst>
                 <a:ext uri="{FF2B5EF4-FFF2-40B4-BE49-F238E27FC236}">
                   <a16:creationId xmlns:a16="http://schemas.microsoft.com/office/drawing/2014/main" id="{34EF0660-717C-40BE-8EF0-14F53806A4C8}"/>
@@ -16909,8 +17962,8 @@
           </p:nvSpPr>
           <p:spPr>
             <a:xfrm>
-              <a:off x="100559" y="1128078"/>
-              <a:ext cx="7859256" cy="1384995"/>
+              <a:off x="252986" y="1284534"/>
+              <a:ext cx="7859256" cy="738664"/>
             </a:xfrm>
             <a:prstGeom prst="rect">
               <a:avLst/>
@@ -16958,71 +18011,7 @@
                   <a:latin typeface="Segoe UI" panose="020B0502040204020203" pitchFamily="34" charset="0"/>
                   <a:cs typeface="Segoe UI" panose="020B0502040204020203" pitchFamily="34" charset="0"/>
                 </a:rPr>
-                <a:t>Property Record</a:t>
-              </a:r>
-            </a:p>
-            <a:p>
-              <a:pPr algn="ctr"/>
-              <a:r>
-                <a:rPr lang="en-US" sz="1400" dirty="0" smtClean="0">
-                  <a:solidFill>
-                    <a:schemeClr val="tx1">
-                      <a:lumMod val="65000"/>
-                      <a:lumOff val="35000"/>
-                    </a:schemeClr>
-                  </a:solidFill>
-                  <a:latin typeface="Segoe UI" panose="020B0502040204020203" pitchFamily="34" charset="0"/>
-                  <a:cs typeface="Segoe UI" panose="020B0502040204020203" pitchFamily="34" charset="0"/>
-                </a:rPr>
-                <a:t>Record User</a:t>
-              </a:r>
-            </a:p>
-            <a:p>
-              <a:pPr algn="ctr"/>
-              <a:r>
-                <a:rPr lang="en-US" sz="1400" dirty="0" smtClean="0">
-                  <a:solidFill>
-                    <a:schemeClr val="tx1">
-                      <a:lumMod val="65000"/>
-                      <a:lumOff val="35000"/>
-                    </a:schemeClr>
-                  </a:solidFill>
-                  <a:latin typeface="Segoe UI" panose="020B0502040204020203" pitchFamily="34" charset="0"/>
-                  <a:cs typeface="Segoe UI" panose="020B0502040204020203" pitchFamily="34" charset="0"/>
-                </a:rPr>
-                <a:t>Log User</a:t>
-              </a:r>
-            </a:p>
-            <a:p>
-              <a:pPr algn="ctr"/>
-              <a:r>
-                <a:rPr lang="en-US" sz="1400" dirty="0" smtClean="0">
-                  <a:solidFill>
-                    <a:schemeClr val="tx1">
-                      <a:lumMod val="65000"/>
-                      <a:lumOff val="35000"/>
-                    </a:schemeClr>
-                  </a:solidFill>
-                  <a:latin typeface="Segoe UI" panose="020B0502040204020203" pitchFamily="34" charset="0"/>
-                  <a:cs typeface="Segoe UI" panose="020B0502040204020203" pitchFamily="34" charset="0"/>
-                </a:rPr>
-                <a:t>Date Started</a:t>
-              </a:r>
-            </a:p>
-            <a:p>
-              <a:pPr algn="ctr"/>
-              <a:r>
-                <a:rPr lang="en-US" sz="1400" dirty="0" smtClean="0">
-                  <a:solidFill>
-                    <a:schemeClr val="tx1">
-                      <a:lumMod val="65000"/>
-                      <a:lumOff val="35000"/>
-                    </a:schemeClr>
-                  </a:solidFill>
-                  <a:latin typeface="Segoe UI" panose="020B0502040204020203" pitchFamily="34" charset="0"/>
-                  <a:cs typeface="Segoe UI" panose="020B0502040204020203" pitchFamily="34" charset="0"/>
-                </a:rPr>
-                <a:t>Date Completed</a:t>
+                <a:t>User</a:t>
               </a:r>
             </a:p>
             <a:p>
@@ -17040,6 +18029,22 @@
                 </a:rPr>
                 <a:t>Remarks</a:t>
               </a:r>
+            </a:p>
+            <a:p>
+              <a:pPr algn="ctr"/>
+              <a:r>
+                <a:rPr lang="en-US" sz="1400" dirty="0" smtClean="0">
+                  <a:solidFill>
+                    <a:schemeClr val="tx1">
+                      <a:lumMod val="65000"/>
+                      <a:lumOff val="35000"/>
+                    </a:schemeClr>
+                  </a:solidFill>
+                  <a:latin typeface="Segoe UI" panose="020B0502040204020203" pitchFamily="34" charset="0"/>
+                  <a:cs typeface="Segoe UI" panose="020B0502040204020203" pitchFamily="34" charset="0"/>
+                </a:rPr>
+                <a:t>Verification Date</a:t>
+              </a:r>
               <a:endParaRPr lang="en-US" sz="1400" dirty="0">
                 <a:solidFill>
                   <a:schemeClr val="tx1">
@@ -17053,807 +18058,43 @@
             </a:p>
           </p:txBody>
         </p:sp>
-        <p:grpSp>
-          <p:nvGrpSpPr>
-            <p:cNvPr id="4" name="Group 3"/>
-            <p:cNvGrpSpPr/>
-            <p:nvPr/>
-          </p:nvGrpSpPr>
-          <p:grpSpPr>
-            <a:xfrm>
-              <a:off x="5673815" y="4250610"/>
-              <a:ext cx="2286005" cy="2305645"/>
-              <a:chOff x="100579" y="3943341"/>
-              <a:chExt cx="2286005" cy="2305645"/>
-            </a:xfrm>
-          </p:grpSpPr>
-          <p:sp>
-            <p:nvSpPr>
-              <p:cNvPr id="69" name="Rectangle 68">
-                <a:extLst>
-                  <a:ext uri="{FF2B5EF4-FFF2-40B4-BE49-F238E27FC236}">
-                    <a16:creationId xmlns:a16="http://schemas.microsoft.com/office/drawing/2014/main" id="{5626B030-B48B-42C0-9339-F603883EA700}"/>
-                  </a:ext>
-                </a:extLst>
-              </p:cNvPr>
-              <p:cNvSpPr/>
-              <p:nvPr/>
-            </p:nvSpPr>
-            <p:spPr>
-              <a:xfrm>
-                <a:off x="100584" y="3943341"/>
-                <a:ext cx="2286000" cy="274320"/>
-              </a:xfrm>
-              <a:prstGeom prst="rect">
-                <a:avLst/>
-              </a:prstGeom>
-              <a:solidFill>
-                <a:schemeClr val="tx1">
-                  <a:lumMod val="75000"/>
-                  <a:lumOff val="25000"/>
-                </a:schemeClr>
-              </a:solidFill>
-              <a:ln>
-                <a:noFill/>
-              </a:ln>
-            </p:spPr>
-            <p:style>
-              <a:lnRef idx="2">
-                <a:schemeClr val="accent1">
-                  <a:shade val="50000"/>
-                </a:schemeClr>
-              </a:lnRef>
-              <a:fillRef idx="1">
-                <a:schemeClr val="accent1"/>
-              </a:fillRef>
-              <a:effectRef idx="0">
-                <a:schemeClr val="accent1"/>
-              </a:effectRef>
-              <a:fontRef idx="minor">
-                <a:schemeClr val="lt1"/>
-              </a:fontRef>
-            </p:style>
-            <p:txBody>
-              <a:bodyPr rtlCol="0" anchor="ctr"/>
-              <a:lstStyle/>
-              <a:p>
-                <a:pPr algn="ctr"/>
-                <a:r>
-                  <a:rPr lang="en-US" sz="1600" dirty="0" smtClean="0">
-                    <a:latin typeface="Segoe UI" panose="020B0502040204020203" pitchFamily="34" charset="0"/>
-                    <a:cs typeface="Segoe UI" panose="020B0502040204020203" pitchFamily="34" charset="0"/>
-                  </a:rPr>
-                  <a:t>Item - Hardware</a:t>
-                </a:r>
-                <a:endParaRPr lang="en-US" sz="1600" dirty="0">
-                  <a:latin typeface="Segoe UI" panose="020B0502040204020203" pitchFamily="34" charset="0"/>
-                  <a:cs typeface="Segoe UI" panose="020B0502040204020203" pitchFamily="34" charset="0"/>
-                </a:endParaRPr>
-              </a:p>
-            </p:txBody>
-          </p:sp>
-          <p:sp>
-            <p:nvSpPr>
-              <p:cNvPr id="70" name="Rectangle 69">
-                <a:extLst>
-                  <a:ext uri="{FF2B5EF4-FFF2-40B4-BE49-F238E27FC236}">
-                    <a16:creationId xmlns:a16="http://schemas.microsoft.com/office/drawing/2014/main" id="{92F3C2D4-DE2E-4B48-93DA-8F055147368D}"/>
-                  </a:ext>
-                </a:extLst>
-              </p:cNvPr>
-              <p:cNvSpPr/>
-              <p:nvPr/>
-            </p:nvSpPr>
-            <p:spPr>
-              <a:xfrm>
-                <a:off x="100579" y="4217661"/>
-                <a:ext cx="2286000" cy="2031325"/>
-              </a:xfrm>
-              <a:prstGeom prst="rect">
-                <a:avLst/>
-              </a:prstGeom>
-              <a:solidFill>
-                <a:schemeClr val="bg1">
-                  <a:lumMod val="85000"/>
-                </a:schemeClr>
-              </a:solidFill>
-              <a:ln>
-                <a:noFill/>
-              </a:ln>
-            </p:spPr>
-            <p:style>
-              <a:lnRef idx="2">
-                <a:schemeClr val="accent1">
-                  <a:shade val="50000"/>
-                </a:schemeClr>
-              </a:lnRef>
-              <a:fillRef idx="1">
-                <a:schemeClr val="accent1"/>
-              </a:fillRef>
-              <a:effectRef idx="0">
-                <a:schemeClr val="accent1"/>
-              </a:effectRef>
-              <a:fontRef idx="minor">
-                <a:schemeClr val="lt1"/>
-              </a:fontRef>
-            </p:style>
-            <p:txBody>
-              <a:bodyPr rtlCol="0" anchor="ctr" anchorCtr="0">
-                <a:spAutoFit/>
-              </a:bodyPr>
-              <a:lstStyle/>
-              <a:p>
-                <a:pPr algn="ctr"/>
-                <a:r>
-                  <a:rPr lang="en-US" sz="1400" dirty="0" smtClean="0">
-                    <a:solidFill>
-                      <a:schemeClr val="tx1">
-                        <a:lumMod val="65000"/>
-                        <a:lumOff val="35000"/>
-                      </a:schemeClr>
-                    </a:solidFill>
-                    <a:latin typeface="Segoe UI" panose="020B0502040204020203" pitchFamily="34" charset="0"/>
-                    <a:cs typeface="Segoe UI" panose="020B0502040204020203" pitchFamily="34" charset="0"/>
-                  </a:rPr>
-                  <a:t>Category</a:t>
-                </a:r>
-              </a:p>
-              <a:p>
-                <a:pPr algn="ctr"/>
-                <a:r>
-                  <a:rPr lang="en-US" sz="1400" dirty="0" smtClean="0">
-                    <a:solidFill>
-                      <a:schemeClr val="tx1">
-                        <a:lumMod val="65000"/>
-                        <a:lumOff val="35000"/>
-                      </a:schemeClr>
-                    </a:solidFill>
-                    <a:latin typeface="Segoe UI" panose="020B0502040204020203" pitchFamily="34" charset="0"/>
-                    <a:cs typeface="Segoe UI" panose="020B0502040204020203" pitchFamily="34" charset="0"/>
-                  </a:rPr>
-                  <a:t>Order – If Exists</a:t>
-                </a:r>
-              </a:p>
-              <a:p>
-                <a:pPr algn="ctr"/>
-                <a:r>
-                  <a:rPr lang="en-US" sz="1400" dirty="0" smtClean="0">
-                    <a:solidFill>
-                      <a:schemeClr val="tx1">
-                        <a:lumMod val="65000"/>
-                        <a:lumOff val="35000"/>
-                      </a:schemeClr>
-                    </a:solidFill>
-                    <a:latin typeface="Segoe UI" panose="020B0502040204020203" pitchFamily="34" charset="0"/>
-                    <a:cs typeface="Segoe UI" panose="020B0502040204020203" pitchFamily="34" charset="0"/>
-                  </a:rPr>
-                  <a:t>Manufacturer</a:t>
-                </a:r>
-              </a:p>
-              <a:p>
-                <a:pPr algn="ctr"/>
-                <a:r>
-                  <a:rPr lang="en-US" sz="1400" dirty="0" smtClean="0">
-                    <a:solidFill>
-                      <a:schemeClr val="tx1">
-                        <a:lumMod val="65000"/>
-                        <a:lumOff val="35000"/>
-                      </a:schemeClr>
-                    </a:solidFill>
-                    <a:latin typeface="Segoe UI" panose="020B0502040204020203" pitchFamily="34" charset="0"/>
-                    <a:cs typeface="Segoe UI" panose="020B0502040204020203" pitchFamily="34" charset="0"/>
-                  </a:rPr>
-                  <a:t>Model</a:t>
-                </a:r>
-              </a:p>
-              <a:p>
-                <a:pPr algn="ctr"/>
-                <a:r>
-                  <a:rPr lang="en-US" sz="1400" dirty="0" smtClean="0">
-                    <a:solidFill>
-                      <a:schemeClr val="tx1">
-                        <a:lumMod val="65000"/>
-                        <a:lumOff val="35000"/>
-                      </a:schemeClr>
-                    </a:solidFill>
-                    <a:latin typeface="Segoe UI" panose="020B0502040204020203" pitchFamily="34" charset="0"/>
-                    <a:cs typeface="Segoe UI" panose="020B0502040204020203" pitchFamily="34" charset="0"/>
-                  </a:rPr>
-                  <a:t>Nsn</a:t>
-                </a:r>
-              </a:p>
-              <a:p>
-                <a:pPr algn="ctr"/>
-                <a:r>
-                  <a:rPr lang="en-US" sz="1400" dirty="0" smtClean="0">
-                    <a:solidFill>
-                      <a:schemeClr val="tx1">
-                        <a:lumMod val="65000"/>
-                        <a:lumOff val="35000"/>
-                      </a:schemeClr>
-                    </a:solidFill>
-                    <a:latin typeface="Segoe UI" panose="020B0502040204020203" pitchFamily="34" charset="0"/>
-                    <a:cs typeface="Segoe UI" panose="020B0502040204020203" pitchFamily="34" charset="0"/>
-                  </a:rPr>
-                  <a:t>Item Type</a:t>
-                </a:r>
-              </a:p>
-              <a:p>
-                <a:pPr algn="ctr"/>
-                <a:r>
-                  <a:rPr lang="en-US" sz="1400" dirty="0" smtClean="0">
-                    <a:solidFill>
-                      <a:schemeClr val="tx1">
-                        <a:lumMod val="65000"/>
-                        <a:lumOff val="35000"/>
-                      </a:schemeClr>
-                    </a:solidFill>
-                    <a:latin typeface="Segoe UI" panose="020B0502040204020203" pitchFamily="34" charset="0"/>
-                    <a:cs typeface="Segoe UI" panose="020B0502040204020203" pitchFamily="34" charset="0"/>
-                  </a:rPr>
-                  <a:t>Service Tag</a:t>
-                </a:r>
-              </a:p>
-              <a:p>
-                <a:pPr algn="ctr"/>
-                <a:r>
-                  <a:rPr lang="en-US" sz="1400" dirty="0" smtClean="0">
-                    <a:solidFill>
-                      <a:schemeClr val="tx1">
-                        <a:lumMod val="65000"/>
-                        <a:lumOff val="35000"/>
-                      </a:schemeClr>
-                    </a:solidFill>
-                    <a:latin typeface="Segoe UI" panose="020B0502040204020203" pitchFamily="34" charset="0"/>
-                    <a:cs typeface="Segoe UI" panose="020B0502040204020203" pitchFamily="34" charset="0"/>
-                  </a:rPr>
-                  <a:t>Mac Address</a:t>
-                </a:r>
-              </a:p>
-              <a:p>
-                <a:pPr algn="ctr"/>
-                <a:r>
-                  <a:rPr lang="en-US" sz="1400" dirty="0" smtClean="0">
-                    <a:solidFill>
-                      <a:schemeClr val="tx1">
-                        <a:lumMod val="65000"/>
-                        <a:lumOff val="35000"/>
-                      </a:schemeClr>
-                    </a:solidFill>
-                    <a:latin typeface="Segoe UI" panose="020B0502040204020203" pitchFamily="34" charset="0"/>
-                    <a:cs typeface="Segoe UI" panose="020B0502040204020203" pitchFamily="34" charset="0"/>
-                  </a:rPr>
-                  <a:t>Location</a:t>
-                </a:r>
-              </a:p>
-            </p:txBody>
-          </p:sp>
-        </p:grpSp>
-        <p:grpSp>
-          <p:nvGrpSpPr>
-            <p:cNvPr id="28" name="Group 27"/>
-            <p:cNvGrpSpPr/>
-            <p:nvPr/>
-          </p:nvGrpSpPr>
-          <p:grpSpPr>
-            <a:xfrm>
-              <a:off x="100579" y="2806135"/>
-              <a:ext cx="2286000" cy="1012984"/>
-              <a:chOff x="100584" y="1614397"/>
-              <a:chExt cx="2286000" cy="1012984"/>
-            </a:xfrm>
-          </p:grpSpPr>
-          <p:sp>
-            <p:nvSpPr>
-              <p:cNvPr id="29" name="Rectangle 28">
-                <a:extLst>
-                  <a:ext uri="{FF2B5EF4-FFF2-40B4-BE49-F238E27FC236}">
-                    <a16:creationId xmlns:a16="http://schemas.microsoft.com/office/drawing/2014/main" id="{5626B030-B48B-42C0-9339-F603883EA700}"/>
-                  </a:ext>
-                </a:extLst>
-              </p:cNvPr>
-              <p:cNvSpPr/>
-              <p:nvPr/>
-            </p:nvSpPr>
-            <p:spPr>
-              <a:xfrm>
-                <a:off x="100584" y="1614397"/>
-                <a:ext cx="2286000" cy="274320"/>
-              </a:xfrm>
-              <a:prstGeom prst="rect">
-                <a:avLst/>
-              </a:prstGeom>
-              <a:solidFill>
-                <a:schemeClr val="tx1">
-                  <a:lumMod val="75000"/>
-                  <a:lumOff val="25000"/>
-                </a:schemeClr>
-              </a:solidFill>
-              <a:ln>
-                <a:noFill/>
-              </a:ln>
-            </p:spPr>
-            <p:style>
-              <a:lnRef idx="2">
-                <a:schemeClr val="accent1">
-                  <a:shade val="50000"/>
-                </a:schemeClr>
-              </a:lnRef>
-              <a:fillRef idx="1">
-                <a:schemeClr val="accent1"/>
-              </a:fillRef>
-              <a:effectRef idx="0">
-                <a:schemeClr val="accent1"/>
-              </a:effectRef>
-              <a:fontRef idx="minor">
-                <a:schemeClr val="lt1"/>
-              </a:fontRef>
-            </p:style>
-            <p:txBody>
-              <a:bodyPr rtlCol="0" anchor="ctr"/>
-              <a:lstStyle/>
-              <a:p>
-                <a:pPr algn="ctr"/>
-                <a:r>
-                  <a:rPr lang="en-US" sz="1600" dirty="0" smtClean="0">
-                    <a:latin typeface="Segoe UI" panose="020B0502040204020203" pitchFamily="34" charset="0"/>
-                    <a:cs typeface="Segoe UI" panose="020B0502040204020203" pitchFamily="34" charset="0"/>
-                  </a:rPr>
-                  <a:t>Inventory Item</a:t>
-                </a:r>
-                <a:endParaRPr lang="en-US" sz="1600" dirty="0">
-                  <a:latin typeface="Segoe UI" panose="020B0502040204020203" pitchFamily="34" charset="0"/>
-                  <a:cs typeface="Segoe UI" panose="020B0502040204020203" pitchFamily="34" charset="0"/>
-                </a:endParaRPr>
-              </a:p>
-            </p:txBody>
-          </p:sp>
-          <p:sp>
-            <p:nvSpPr>
-              <p:cNvPr id="30" name="Rectangle 29">
-                <a:extLst>
-                  <a:ext uri="{FF2B5EF4-FFF2-40B4-BE49-F238E27FC236}">
-                    <a16:creationId xmlns:a16="http://schemas.microsoft.com/office/drawing/2014/main" id="{92F3C2D4-DE2E-4B48-93DA-8F055147368D}"/>
-                  </a:ext>
-                </a:extLst>
-              </p:cNvPr>
-              <p:cNvSpPr/>
-              <p:nvPr/>
-            </p:nvSpPr>
-            <p:spPr>
-              <a:xfrm>
-                <a:off x="100584" y="1888717"/>
-                <a:ext cx="2286000" cy="738664"/>
-              </a:xfrm>
-              <a:prstGeom prst="rect">
-                <a:avLst/>
-              </a:prstGeom>
-              <a:solidFill>
-                <a:schemeClr val="bg1">
-                  <a:lumMod val="85000"/>
-                </a:schemeClr>
-              </a:solidFill>
-              <a:ln>
-                <a:noFill/>
-              </a:ln>
-            </p:spPr>
-            <p:style>
-              <a:lnRef idx="2">
-                <a:schemeClr val="accent1">
-                  <a:shade val="50000"/>
-                </a:schemeClr>
-              </a:lnRef>
-              <a:fillRef idx="1">
-                <a:schemeClr val="accent1"/>
-              </a:fillRef>
-              <a:effectRef idx="0">
-                <a:schemeClr val="accent1"/>
-              </a:effectRef>
-              <a:fontRef idx="minor">
-                <a:schemeClr val="lt1"/>
-              </a:fontRef>
-            </p:style>
-            <p:txBody>
-              <a:bodyPr rtlCol="0" anchor="ctr" anchorCtr="0">
-                <a:spAutoFit/>
-              </a:bodyPr>
-              <a:lstStyle/>
-              <a:p>
-                <a:pPr algn="ctr"/>
-                <a:r>
-                  <a:rPr lang="en-US" sz="1400" dirty="0" smtClean="0">
-                    <a:solidFill>
-                      <a:schemeClr val="tx1">
-                        <a:lumMod val="65000"/>
-                        <a:lumOff val="35000"/>
-                      </a:schemeClr>
-                    </a:solidFill>
-                    <a:latin typeface="Segoe UI" panose="020B0502040204020203" pitchFamily="34" charset="0"/>
-                    <a:cs typeface="Segoe UI" panose="020B0502040204020203" pitchFamily="34" charset="0"/>
-                  </a:rPr>
-                  <a:t>Is Accounted</a:t>
-                </a:r>
-              </a:p>
-              <a:p>
-                <a:pPr algn="ctr"/>
-                <a:r>
-                  <a:rPr lang="en-US" sz="1400" dirty="0" smtClean="0">
-                    <a:solidFill>
-                      <a:schemeClr val="tx1">
-                        <a:lumMod val="65000"/>
-                        <a:lumOff val="35000"/>
-                      </a:schemeClr>
-                    </a:solidFill>
-                    <a:latin typeface="Segoe UI" panose="020B0502040204020203" pitchFamily="34" charset="0"/>
-                    <a:cs typeface="Segoe UI" panose="020B0502040204020203" pitchFamily="34" charset="0"/>
-                  </a:rPr>
-                  <a:t>Is Missing</a:t>
-                </a:r>
-              </a:p>
-              <a:p>
-                <a:pPr algn="ctr"/>
-                <a:r>
-                  <a:rPr lang="en-US" sz="1400" dirty="0" smtClean="0">
-                    <a:solidFill>
-                      <a:schemeClr val="tx1">
-                        <a:lumMod val="65000"/>
-                        <a:lumOff val="35000"/>
-                      </a:schemeClr>
-                    </a:solidFill>
-                    <a:latin typeface="Segoe UI" panose="020B0502040204020203" pitchFamily="34" charset="0"/>
-                    <a:cs typeface="Segoe UI" panose="020B0502040204020203" pitchFamily="34" charset="0"/>
-                  </a:rPr>
-                  <a:t>Remarks</a:t>
-                </a:r>
-                <a:endParaRPr lang="en-US" sz="1400" dirty="0">
-                  <a:solidFill>
-                    <a:schemeClr val="tx1">
-                      <a:lumMod val="65000"/>
-                      <a:lumOff val="35000"/>
-                    </a:schemeClr>
-                  </a:solidFill>
-                  <a:latin typeface="Segoe UI" panose="020B0502040204020203" pitchFamily="34" charset="0"/>
-                  <a:cs typeface="Segoe UI" panose="020B0502040204020203" pitchFamily="34" charset="0"/>
-                </a:endParaRPr>
-              </a:p>
-            </p:txBody>
-          </p:sp>
-        </p:grpSp>
-        <p:grpSp>
-          <p:nvGrpSpPr>
-            <p:cNvPr id="31" name="Group 30"/>
-            <p:cNvGrpSpPr/>
-            <p:nvPr/>
-          </p:nvGrpSpPr>
-          <p:grpSpPr>
-            <a:xfrm>
-              <a:off x="5673815" y="2806135"/>
-              <a:ext cx="2286000" cy="1012984"/>
-              <a:chOff x="100584" y="1614397"/>
-              <a:chExt cx="2286000" cy="1012984"/>
-            </a:xfrm>
-          </p:grpSpPr>
-          <p:sp>
-            <p:nvSpPr>
-              <p:cNvPr id="32" name="Rectangle 31">
-                <a:extLst>
-                  <a:ext uri="{FF2B5EF4-FFF2-40B4-BE49-F238E27FC236}">
-                    <a16:creationId xmlns:a16="http://schemas.microsoft.com/office/drawing/2014/main" id="{5626B030-B48B-42C0-9339-F603883EA700}"/>
-                  </a:ext>
-                </a:extLst>
-              </p:cNvPr>
-              <p:cNvSpPr/>
-              <p:nvPr/>
-            </p:nvSpPr>
-            <p:spPr>
-              <a:xfrm>
-                <a:off x="100584" y="1614397"/>
-                <a:ext cx="2286000" cy="274320"/>
-              </a:xfrm>
-              <a:prstGeom prst="rect">
-                <a:avLst/>
-              </a:prstGeom>
-              <a:solidFill>
-                <a:schemeClr val="tx1">
-                  <a:lumMod val="75000"/>
-                  <a:lumOff val="25000"/>
-                </a:schemeClr>
-              </a:solidFill>
-              <a:ln>
-                <a:noFill/>
-              </a:ln>
-            </p:spPr>
-            <p:style>
-              <a:lnRef idx="2">
-                <a:schemeClr val="accent1">
-                  <a:shade val="50000"/>
-                </a:schemeClr>
-              </a:lnRef>
-              <a:fillRef idx="1">
-                <a:schemeClr val="accent1"/>
-              </a:fillRef>
-              <a:effectRef idx="0">
-                <a:schemeClr val="accent1"/>
-              </a:effectRef>
-              <a:fontRef idx="minor">
-                <a:schemeClr val="lt1"/>
-              </a:fontRef>
-            </p:style>
-            <p:txBody>
-              <a:bodyPr rtlCol="0" anchor="ctr"/>
-              <a:lstStyle/>
-              <a:p>
-                <a:pPr algn="ctr"/>
-                <a:r>
-                  <a:rPr lang="en-US" sz="1600" dirty="0" smtClean="0">
-                    <a:latin typeface="Segoe UI" panose="020B0502040204020203" pitchFamily="34" charset="0"/>
-                    <a:cs typeface="Segoe UI" panose="020B0502040204020203" pitchFamily="34" charset="0"/>
-                  </a:rPr>
-                  <a:t>Inventory Item</a:t>
-                </a:r>
-                <a:endParaRPr lang="en-US" sz="1600" dirty="0">
-                  <a:latin typeface="Segoe UI" panose="020B0502040204020203" pitchFamily="34" charset="0"/>
-                  <a:cs typeface="Segoe UI" panose="020B0502040204020203" pitchFamily="34" charset="0"/>
-                </a:endParaRPr>
-              </a:p>
-            </p:txBody>
-          </p:sp>
-          <p:sp>
-            <p:nvSpPr>
-              <p:cNvPr id="33" name="Rectangle 32">
-                <a:extLst>
-                  <a:ext uri="{FF2B5EF4-FFF2-40B4-BE49-F238E27FC236}">
-                    <a16:creationId xmlns:a16="http://schemas.microsoft.com/office/drawing/2014/main" id="{92F3C2D4-DE2E-4B48-93DA-8F055147368D}"/>
-                  </a:ext>
-                </a:extLst>
-              </p:cNvPr>
-              <p:cNvSpPr/>
-              <p:nvPr/>
-            </p:nvSpPr>
-            <p:spPr>
-              <a:xfrm>
-                <a:off x="100584" y="1888717"/>
-                <a:ext cx="2286000" cy="738664"/>
-              </a:xfrm>
-              <a:prstGeom prst="rect">
-                <a:avLst/>
-              </a:prstGeom>
-              <a:solidFill>
-                <a:schemeClr val="bg1">
-                  <a:lumMod val="85000"/>
-                </a:schemeClr>
-              </a:solidFill>
-              <a:ln>
-                <a:noFill/>
-              </a:ln>
-            </p:spPr>
-            <p:style>
-              <a:lnRef idx="2">
-                <a:schemeClr val="accent1">
-                  <a:shade val="50000"/>
-                </a:schemeClr>
-              </a:lnRef>
-              <a:fillRef idx="1">
-                <a:schemeClr val="accent1"/>
-              </a:fillRef>
-              <a:effectRef idx="0">
-                <a:schemeClr val="accent1"/>
-              </a:effectRef>
-              <a:fontRef idx="minor">
-                <a:schemeClr val="lt1"/>
-              </a:fontRef>
-            </p:style>
-            <p:txBody>
-              <a:bodyPr rtlCol="0" anchor="ctr" anchorCtr="0">
-                <a:spAutoFit/>
-              </a:bodyPr>
-              <a:lstStyle/>
-              <a:p>
-                <a:pPr algn="ctr"/>
-                <a:r>
-                  <a:rPr lang="en-US" sz="1400" dirty="0" smtClean="0">
-                    <a:solidFill>
-                      <a:schemeClr val="tx1">
-                        <a:lumMod val="65000"/>
-                        <a:lumOff val="35000"/>
-                      </a:schemeClr>
-                    </a:solidFill>
-                    <a:latin typeface="Segoe UI" panose="020B0502040204020203" pitchFamily="34" charset="0"/>
-                    <a:cs typeface="Segoe UI" panose="020B0502040204020203" pitchFamily="34" charset="0"/>
-                  </a:rPr>
-                  <a:t>Is Accounted</a:t>
-                </a:r>
-              </a:p>
-              <a:p>
-                <a:pPr algn="ctr"/>
-                <a:r>
-                  <a:rPr lang="en-US" sz="1400" dirty="0" smtClean="0">
-                    <a:solidFill>
-                      <a:schemeClr val="tx1">
-                        <a:lumMod val="65000"/>
-                        <a:lumOff val="35000"/>
-                      </a:schemeClr>
-                    </a:solidFill>
-                    <a:latin typeface="Segoe UI" panose="020B0502040204020203" pitchFamily="34" charset="0"/>
-                    <a:cs typeface="Segoe UI" panose="020B0502040204020203" pitchFamily="34" charset="0"/>
-                  </a:rPr>
-                  <a:t>Is Missing</a:t>
-                </a:r>
-              </a:p>
-              <a:p>
-                <a:pPr algn="ctr"/>
-                <a:r>
-                  <a:rPr lang="en-US" sz="1400" dirty="0" smtClean="0">
-                    <a:solidFill>
-                      <a:schemeClr val="tx1">
-                        <a:lumMod val="65000"/>
-                        <a:lumOff val="35000"/>
-                      </a:schemeClr>
-                    </a:solidFill>
-                    <a:latin typeface="Segoe UI" panose="020B0502040204020203" pitchFamily="34" charset="0"/>
-                    <a:cs typeface="Segoe UI" panose="020B0502040204020203" pitchFamily="34" charset="0"/>
-                  </a:rPr>
-                  <a:t>Remarks</a:t>
-                </a:r>
-                <a:endParaRPr lang="en-US" sz="1400" dirty="0">
-                  <a:solidFill>
-                    <a:schemeClr val="tx1">
-                      <a:lumMod val="65000"/>
-                      <a:lumOff val="35000"/>
-                    </a:schemeClr>
-                  </a:solidFill>
-                  <a:latin typeface="Segoe UI" panose="020B0502040204020203" pitchFamily="34" charset="0"/>
-                  <a:cs typeface="Segoe UI" panose="020B0502040204020203" pitchFamily="34" charset="0"/>
-                </a:endParaRPr>
-              </a:p>
-            </p:txBody>
-          </p:sp>
-        </p:grpSp>
-        <p:cxnSp>
-          <p:nvCxnSpPr>
-            <p:cNvPr id="11" name="Straight Arrow Connector 10"/>
-            <p:cNvCxnSpPr>
-              <a:stCxn id="30" idx="2"/>
-              <a:endCxn id="39" idx="0"/>
-            </p:cNvCxnSpPr>
-            <p:nvPr/>
-          </p:nvCxnSpPr>
-          <p:spPr>
-            <a:xfrm>
-              <a:off x="1243579" y="3819119"/>
-              <a:ext cx="5" cy="431491"/>
-            </a:xfrm>
-            <a:prstGeom prst="straightConnector1">
-              <a:avLst/>
-            </a:prstGeom>
-            <a:ln w="12700">
-              <a:tailEnd type="triangle"/>
-            </a:ln>
-          </p:spPr>
-          <p:style>
-            <a:lnRef idx="1">
-              <a:schemeClr val="accent6"/>
-            </a:lnRef>
-            <a:fillRef idx="0">
-              <a:schemeClr val="accent6"/>
-            </a:fillRef>
-            <a:effectRef idx="0">
-              <a:schemeClr val="accent6"/>
-            </a:effectRef>
-            <a:fontRef idx="minor">
-              <a:schemeClr val="tx1"/>
-            </a:fontRef>
-          </p:style>
-        </p:cxnSp>
-        <p:cxnSp>
-          <p:nvCxnSpPr>
-            <p:cNvPr id="14" name="Straight Arrow Connector 13"/>
-            <p:cNvCxnSpPr>
-              <a:stCxn id="33" idx="2"/>
-              <a:endCxn id="69" idx="0"/>
-            </p:cNvCxnSpPr>
-            <p:nvPr/>
-          </p:nvCxnSpPr>
-          <p:spPr>
-            <a:xfrm>
-              <a:off x="6816815" y="3819119"/>
-              <a:ext cx="5" cy="431491"/>
-            </a:xfrm>
-            <a:prstGeom prst="straightConnector1">
-              <a:avLst/>
-            </a:prstGeom>
-            <a:ln w="12700">
-              <a:tailEnd type="triangle"/>
-            </a:ln>
-          </p:spPr>
-          <p:style>
-            <a:lnRef idx="1">
-              <a:schemeClr val="accent6"/>
-            </a:lnRef>
-            <a:fillRef idx="0">
-              <a:schemeClr val="accent6"/>
-            </a:fillRef>
-            <a:effectRef idx="0">
-              <a:schemeClr val="accent6"/>
-            </a:effectRef>
-            <a:fontRef idx="minor">
-              <a:schemeClr val="tx1"/>
-            </a:fontRef>
-          </p:style>
-        </p:cxnSp>
-        <p:cxnSp>
-          <p:nvCxnSpPr>
-            <p:cNvPr id="18" name="Elbow Connector 17"/>
-            <p:cNvCxnSpPr>
-              <a:stCxn id="60" idx="2"/>
-              <a:endCxn id="29" idx="0"/>
-            </p:cNvCxnSpPr>
-            <p:nvPr/>
-          </p:nvCxnSpPr>
-          <p:spPr>
-            <a:xfrm rot="5400000">
-              <a:off x="2490352" y="1266300"/>
-              <a:ext cx="293062" cy="2786608"/>
-            </a:xfrm>
-            <a:prstGeom prst="bentConnector3">
-              <a:avLst/>
-            </a:prstGeom>
-            <a:ln w="12700">
-              <a:tailEnd type="triangle"/>
-            </a:ln>
-          </p:spPr>
-          <p:style>
-            <a:lnRef idx="1">
-              <a:schemeClr val="accent6"/>
-            </a:lnRef>
-            <a:fillRef idx="0">
-              <a:schemeClr val="accent6"/>
-            </a:fillRef>
-            <a:effectRef idx="0">
-              <a:schemeClr val="accent6"/>
-            </a:effectRef>
-            <a:fontRef idx="minor">
-              <a:schemeClr val="tx1"/>
-            </a:fontRef>
-          </p:style>
-        </p:cxnSp>
-        <p:cxnSp>
-          <p:nvCxnSpPr>
-            <p:cNvPr id="21" name="Elbow Connector 20"/>
-            <p:cNvCxnSpPr>
-              <a:stCxn id="60" idx="2"/>
-              <a:endCxn id="32" idx="0"/>
-            </p:cNvCxnSpPr>
-            <p:nvPr/>
-          </p:nvCxnSpPr>
-          <p:spPr>
-            <a:xfrm rot="16200000" flipH="1">
-              <a:off x="5276970" y="1266290"/>
-              <a:ext cx="293062" cy="2786628"/>
-            </a:xfrm>
-            <a:prstGeom prst="bentConnector3">
-              <a:avLst/>
-            </a:prstGeom>
-            <a:ln w="12700">
-              <a:tailEnd type="triangle"/>
-            </a:ln>
-          </p:spPr>
-          <p:style>
-            <a:lnRef idx="1">
-              <a:schemeClr val="accent6"/>
-            </a:lnRef>
-            <a:fillRef idx="0">
-              <a:schemeClr val="accent6"/>
-            </a:fillRef>
-            <a:effectRef idx="0">
-              <a:schemeClr val="accent6"/>
-            </a:effectRef>
-            <a:fontRef idx="minor">
-              <a:schemeClr val="tx1"/>
-            </a:fontRef>
-          </p:style>
-        </p:cxnSp>
       </p:grpSp>
+      <p:cxnSp>
+        <p:nvCxnSpPr>
+          <p:cNvPr id="3" name="Straight Arrow Connector 2"/>
+          <p:cNvCxnSpPr>
+            <a:stCxn id="60" idx="2"/>
+            <a:endCxn id="26" idx="0"/>
+          </p:cNvCxnSpPr>
+          <p:nvPr/>
+        </p:nvCxnSpPr>
+        <p:spPr>
+          <a:xfrm flipH="1">
+            <a:off x="4030165" y="2128666"/>
+            <a:ext cx="42" cy="3618736"/>
+          </a:xfrm>
+          <a:prstGeom prst="straightConnector1">
+            <a:avLst/>
+          </a:prstGeom>
+          <a:ln w="12700">
+            <a:tailEnd type="triangle"/>
+          </a:ln>
+        </p:spPr>
+        <p:style>
+          <a:lnRef idx="1">
+            <a:schemeClr val="accent6"/>
+          </a:lnRef>
+          <a:fillRef idx="0">
+            <a:schemeClr val="accent6"/>
+          </a:fillRef>
+          <a:effectRef idx="0">
+            <a:schemeClr val="accent6"/>
+          </a:effectRef>
+          <a:fontRef idx="minor">
+            <a:schemeClr val="tx1"/>
+          </a:fontRef>
+        </p:style>
+      </p:cxnSp>
     </p:spTree>
     <p:extLst>
       <p:ext uri="{BB962C8B-B14F-4D97-AF65-F5344CB8AC3E}">
@@ -17953,7 +18194,7 @@
                 <a:blip r:embed="rId2">
                   <a:extLst>
                     <a:ext uri="{96DAC541-7B7A-43D3-8B79-37D633B846F1}">
-                      <asvg:svgBlip xmlns:asvg="http://schemas.microsoft.com/office/drawing/2016/SVG/main" xmlns="" r:embed="rId3"/>
+                      <asvg:svgBlip xmlns="" xmlns:asvg="http://schemas.microsoft.com/office/drawing/2016/SVG/main" r:embed="rId3"/>
                     </a:ext>
                   </a:extLst>
                 </a:blip>
@@ -17979,7 +18220,7 @@
                 <a:blip r:embed="rId2">
                   <a:extLst>
                     <a:ext uri="{96DAC541-7B7A-43D3-8B79-37D633B846F1}">
-                      <asvg:svgBlip xmlns:asvg="http://schemas.microsoft.com/office/drawing/2016/SVG/main" xmlns="" r:embed="rId3"/>
+                      <asvg:svgBlip xmlns="" xmlns:asvg="http://schemas.microsoft.com/office/drawing/2016/SVG/main" r:embed="rId3"/>
                     </a:ext>
                   </a:extLst>
                 </a:blip>
@@ -18002,7 +18243,7 @@
                 <a:blip r:embed="rId2">
                   <a:extLst>
                     <a:ext uri="{96DAC541-7B7A-43D3-8B79-37D633B846F1}">
-                      <asvg:svgBlip xmlns:asvg="http://schemas.microsoft.com/office/drawing/2016/SVG/main" xmlns="" r:embed="rId3"/>
+                      <asvg:svgBlip xmlns="" xmlns:asvg="http://schemas.microsoft.com/office/drawing/2016/SVG/main" r:embed="rId3"/>
                     </a:ext>
                   </a:extLst>
                 </a:blip>
@@ -18028,7 +18269,7 @@
                 <a:blip r:embed="rId2">
                   <a:extLst>
                     <a:ext uri="{96DAC541-7B7A-43D3-8B79-37D633B846F1}">
-                      <asvg:svgBlip xmlns:asvg="http://schemas.microsoft.com/office/drawing/2016/SVG/main" xmlns="" r:embed="rId3"/>
+                      <asvg:svgBlip xmlns="" xmlns:asvg="http://schemas.microsoft.com/office/drawing/2016/SVG/main" r:embed="rId3"/>
                     </a:ext>
                   </a:extLst>
                 </a:blip>
@@ -18051,7 +18292,7 @@
                 <a:blip r:embed="rId2">
                   <a:extLst>
                     <a:ext uri="{96DAC541-7B7A-43D3-8B79-37D633B846F1}">
-                      <asvg:svgBlip xmlns:asvg="http://schemas.microsoft.com/office/drawing/2016/SVG/main" xmlns="" r:embed="rId3"/>
+                      <asvg:svgBlip xmlns="" xmlns:asvg="http://schemas.microsoft.com/office/drawing/2016/SVG/main" r:embed="rId3"/>
                     </a:ext>
                   </a:extLst>
                 </a:blip>
@@ -18567,16 +18808,6 @@
                 </a:rPr>
                 <a:t>Origin Property Record</a:t>
               </a:r>
-              <a:endParaRPr lang="en-US" sz="1400" dirty="0" smtClean="0">
-                <a:solidFill>
-                  <a:schemeClr val="tx1">
-                    <a:lumMod val="65000"/>
-                    <a:lumOff val="35000"/>
-                  </a:schemeClr>
-                </a:solidFill>
-                <a:latin typeface="Segoe UI" panose="020B0502040204020203" pitchFamily="34" charset="0"/>
-                <a:cs typeface="Segoe UI" panose="020B0502040204020203" pitchFamily="34" charset="0"/>
-              </a:endParaRPr>
             </a:p>
             <a:p>
               <a:pPr algn="ctr"/>
@@ -19451,6 +19682,1099 @@
     <p:extLst>
       <p:ext uri="{BB962C8B-B14F-4D97-AF65-F5344CB8AC3E}">
         <p14:creationId xmlns:p14="http://schemas.microsoft.com/office/powerpoint/2010/main" val="4141999800"/>
+      </p:ext>
+    </p:extLst>
+  </p:cSld>
+  <p:clrMapOvr>
+    <a:masterClrMapping/>
+  </p:clrMapOvr>
+  <p:timing>
+    <p:tnLst>
+      <p:par>
+        <p:cTn id="1" dur="indefinite" restart="never" nodeType="tmRoot"/>
+      </p:par>
+    </p:tnLst>
+  </p:timing>
+</p:sld>
+</file>
+
+<file path=ppt/slides/slide9.xml><?xml version="1.0" encoding="utf-8"?>
+<p:sld xmlns:a="http://schemas.openxmlformats.org/drawingml/2006/main" xmlns:r="http://schemas.openxmlformats.org/officeDocument/2006/relationships" xmlns:p="http://schemas.openxmlformats.org/presentationml/2006/main">
+  <p:cSld>
+    <p:bg>
+      <p:bgPr>
+        <a:solidFill>
+          <a:schemeClr val="bg1">
+            <a:lumMod val="95000"/>
+          </a:schemeClr>
+        </a:solidFill>
+        <a:effectLst/>
+      </p:bgPr>
+    </p:bg>
+    <p:spTree>
+      <p:nvGrpSpPr>
+        <p:cNvPr id="1" name=""/>
+        <p:cNvGrpSpPr/>
+        <p:nvPr/>
+      </p:nvGrpSpPr>
+      <p:grpSpPr>
+        <a:xfrm>
+          <a:off x="0" y="0"/>
+          <a:ext cx="0" cy="0"/>
+          <a:chOff x="0" y="0"/>
+          <a:chExt cx="0" cy="0"/>
+        </a:xfrm>
+      </p:grpSpPr>
+      <p:sp>
+        <p:nvSpPr>
+          <p:cNvPr id="120" name="Rectangle 119">
+            <a:extLst>
+              <a:ext uri="{FF2B5EF4-FFF2-40B4-BE49-F238E27FC236}">
+                <a16:creationId xmlns:a16="http://schemas.microsoft.com/office/drawing/2014/main" id="{5B5CFA4C-32E2-456B-8FA7-1EFB1DD90E1C}"/>
+              </a:ext>
+            </a:extLst>
+          </p:cNvPr>
+          <p:cNvSpPr/>
+          <p:nvPr/>
+        </p:nvSpPr>
+        <p:spPr>
+          <a:xfrm>
+            <a:off x="8069592" y="137160"/>
+            <a:ext cx="4021814" cy="6576060"/>
+          </a:xfrm>
+          <a:prstGeom prst="rect">
+            <a:avLst/>
+          </a:prstGeom>
+          <a:solidFill>
+            <a:schemeClr val="bg1"/>
+          </a:solidFill>
+          <a:ln>
+            <a:noFill/>
+          </a:ln>
+        </p:spPr>
+        <p:style>
+          <a:lnRef idx="2">
+            <a:schemeClr val="accent1">
+              <a:shade val="50000"/>
+            </a:schemeClr>
+          </a:lnRef>
+          <a:fillRef idx="1">
+            <a:schemeClr val="accent1"/>
+          </a:fillRef>
+          <a:effectRef idx="0">
+            <a:schemeClr val="accent1"/>
+          </a:effectRef>
+          <a:fontRef idx="minor">
+            <a:schemeClr val="lt1"/>
+          </a:fontRef>
+        </p:style>
+        <p:txBody>
+          <a:bodyPr tIns="91440" bIns="91440" rtlCol="0" anchor="t" anchorCtr="0"/>
+          <a:lstStyle/>
+          <a:p>
+            <a:pPr marL="285750" indent="-285750">
+              <a:buBlip>
+                <a:blip r:embed="rId2">
+                  <a:extLst>
+                    <a:ext uri="{96DAC541-7B7A-43D3-8B79-37D633B846F1}">
+                      <asvg:svgBlip xmlns:asvg="http://schemas.microsoft.com/office/drawing/2016/SVG/main" xmlns="" xmlns:lc="http://schemas.openxmlformats.org/drawingml/2006/lockedCanvas" r:embed="rId3"/>
+                    </a:ext>
+                  </a:extLst>
+                </a:blip>
+              </a:buBlip>
+            </a:pPr>
+            <a:r>
+              <a:rPr lang="en-US" sz="1400" dirty="0" smtClean="0">
+                <a:solidFill>
+                  <a:schemeClr val="tx1">
+                    <a:lumMod val="65000"/>
+                    <a:lumOff val="35000"/>
+                  </a:schemeClr>
+                </a:solidFill>
+                <a:latin typeface="Segoe UI" panose="020B0502040204020203" pitchFamily="34" charset="0"/>
+                <a:cs typeface="Segoe UI" panose="020B0502040204020203" pitchFamily="34" charset="0"/>
+              </a:rPr>
+              <a:t>When items are no longer needed, they are decommissioned (DRMO, destroyed, </a:t>
+            </a:r>
+            <a:r>
+              <a:rPr lang="en-US" sz="1400" dirty="0" err="1" smtClean="0">
+                <a:solidFill>
+                  <a:schemeClr val="tx1">
+                    <a:lumMod val="65000"/>
+                    <a:lumOff val="35000"/>
+                  </a:schemeClr>
+                </a:solidFill>
+                <a:latin typeface="Segoe UI" panose="020B0502040204020203" pitchFamily="34" charset="0"/>
+                <a:cs typeface="Segoe UI" panose="020B0502040204020203" pitchFamily="34" charset="0"/>
+              </a:rPr>
+              <a:t>etc</a:t>
+            </a:r>
+            <a:r>
+              <a:rPr lang="en-US" sz="1400" dirty="0" smtClean="0">
+                <a:solidFill>
+                  <a:schemeClr val="tx1">
+                    <a:lumMod val="65000"/>
+                    <a:lumOff val="35000"/>
+                  </a:schemeClr>
+                </a:solidFill>
+                <a:latin typeface="Segoe UI" panose="020B0502040204020203" pitchFamily="34" charset="0"/>
+                <a:cs typeface="Segoe UI" panose="020B0502040204020203" pitchFamily="34" charset="0"/>
+              </a:rPr>
+              <a:t>) by their owners (property custodians for items in a property record, site logisticians for site record property).</a:t>
+            </a:r>
+          </a:p>
+          <a:p>
+            <a:pPr marL="285750" indent="-285750">
+              <a:buBlip>
+                <a:blip r:embed="rId2">
+                  <a:extLst>
+                    <a:ext uri="{96DAC541-7B7A-43D3-8B79-37D633B846F1}">
+                      <asvg:svgBlip xmlns:asvg="http://schemas.microsoft.com/office/drawing/2016/SVG/main" xmlns="" xmlns:lc="http://schemas.openxmlformats.org/drawingml/2006/lockedCanvas" r:embed="rId3"/>
+                    </a:ext>
+                  </a:extLst>
+                </a:blip>
+              </a:buBlip>
+            </a:pPr>
+            <a:endParaRPr lang="en-US" sz="1400" dirty="0">
+              <a:solidFill>
+                <a:schemeClr val="tx1">
+                  <a:lumMod val="65000"/>
+                  <a:lumOff val="35000"/>
+                </a:schemeClr>
+              </a:solidFill>
+              <a:latin typeface="Segoe UI" panose="020B0502040204020203" pitchFamily="34" charset="0"/>
+              <a:cs typeface="Segoe UI" panose="020B0502040204020203" pitchFamily="34" charset="0"/>
+            </a:endParaRPr>
+          </a:p>
+          <a:p>
+            <a:pPr marL="285750" indent="-285750">
+              <a:buBlip>
+                <a:blip r:embed="rId2">
+                  <a:extLst>
+                    <a:ext uri="{96DAC541-7B7A-43D3-8B79-37D633B846F1}">
+                      <asvg:svgBlip xmlns:asvg="http://schemas.microsoft.com/office/drawing/2016/SVG/main" xmlns="" xmlns:lc="http://schemas.openxmlformats.org/drawingml/2006/lockedCanvas" r:embed="rId3"/>
+                    </a:ext>
+                  </a:extLst>
+                </a:blip>
+              </a:buBlip>
+            </a:pPr>
+            <a:r>
+              <a:rPr lang="en-US" sz="1400" dirty="0" smtClean="0">
+                <a:solidFill>
+                  <a:schemeClr val="tx1">
+                    <a:lumMod val="65000"/>
+                    <a:lumOff val="35000"/>
+                  </a:schemeClr>
+                </a:solidFill>
+                <a:latin typeface="Segoe UI" panose="020B0502040204020203" pitchFamily="34" charset="0"/>
+                <a:cs typeface="Segoe UI" panose="020B0502040204020203" pitchFamily="34" charset="0"/>
+              </a:rPr>
+              <a:t>Once an item is decommissioned, it must be verified as follows:</a:t>
+            </a:r>
+          </a:p>
+          <a:p>
+            <a:pPr marL="742950" lvl="1" indent="-285750">
+              <a:buBlip>
+                <a:blip r:embed="rId2">
+                  <a:extLst>
+                    <a:ext uri="{96DAC541-7B7A-43D3-8B79-37D633B846F1}">
+                      <asvg:svgBlip xmlns:asvg="http://schemas.microsoft.com/office/drawing/2016/SVG/main" xmlns="" xmlns:lc="http://schemas.openxmlformats.org/drawingml/2006/lockedCanvas" r:embed="rId3"/>
+                    </a:ext>
+                  </a:extLst>
+                </a:blip>
+              </a:buBlip>
+            </a:pPr>
+            <a:endParaRPr lang="en-US" sz="1400" dirty="0">
+              <a:solidFill>
+                <a:schemeClr val="tx1">
+                  <a:lumMod val="65000"/>
+                  <a:lumOff val="35000"/>
+                </a:schemeClr>
+              </a:solidFill>
+              <a:latin typeface="Segoe UI" panose="020B0502040204020203" pitchFamily="34" charset="0"/>
+              <a:cs typeface="Segoe UI" panose="020B0502040204020203" pitchFamily="34" charset="0"/>
+            </a:endParaRPr>
+          </a:p>
+          <a:p>
+            <a:pPr marL="742950" lvl="1" indent="-285750">
+              <a:buBlip>
+                <a:blip r:embed="rId2">
+                  <a:extLst>
+                    <a:ext uri="{96DAC541-7B7A-43D3-8B79-37D633B846F1}">
+                      <asvg:svgBlip xmlns:asvg="http://schemas.microsoft.com/office/drawing/2016/SVG/main" xmlns="" xmlns:lc="http://schemas.openxmlformats.org/drawingml/2006/lockedCanvas" r:embed="rId3"/>
+                    </a:ext>
+                  </a:extLst>
+                </a:blip>
+              </a:buBlip>
+            </a:pPr>
+            <a:r>
+              <a:rPr lang="en-US" sz="1400" dirty="0" smtClean="0">
+                <a:solidFill>
+                  <a:schemeClr val="tx1">
+                    <a:lumMod val="65000"/>
+                    <a:lumOff val="35000"/>
+                  </a:schemeClr>
+                </a:solidFill>
+                <a:latin typeface="Segoe UI" panose="020B0502040204020203" pitchFamily="34" charset="0"/>
+                <a:cs typeface="Segoe UI" panose="020B0502040204020203" pitchFamily="34" charset="0"/>
+              </a:rPr>
+              <a:t>Site logistician for property record items</a:t>
+            </a:r>
+          </a:p>
+          <a:p>
+            <a:pPr marL="742950" lvl="1" indent="-285750">
+              <a:buBlip>
+                <a:blip r:embed="rId2">
+                  <a:extLst>
+                    <a:ext uri="{96DAC541-7B7A-43D3-8B79-37D633B846F1}">
+                      <asvg:svgBlip xmlns:asvg="http://schemas.microsoft.com/office/drawing/2016/SVG/main" xmlns="" xmlns:lc="http://schemas.openxmlformats.org/drawingml/2006/lockedCanvas" r:embed="rId3"/>
+                    </a:ext>
+                  </a:extLst>
+                </a:blip>
+              </a:buBlip>
+            </a:pPr>
+            <a:endParaRPr lang="en-US" sz="1400" dirty="0">
+              <a:solidFill>
+                <a:schemeClr val="tx1">
+                  <a:lumMod val="65000"/>
+                  <a:lumOff val="35000"/>
+                </a:schemeClr>
+              </a:solidFill>
+              <a:latin typeface="Segoe UI" panose="020B0502040204020203" pitchFamily="34" charset="0"/>
+              <a:cs typeface="Segoe UI" panose="020B0502040204020203" pitchFamily="34" charset="0"/>
+            </a:endParaRPr>
+          </a:p>
+          <a:p>
+            <a:pPr marL="742950" lvl="1" indent="-285750">
+              <a:buBlip>
+                <a:blip r:embed="rId2">
+                  <a:extLst>
+                    <a:ext uri="{96DAC541-7B7A-43D3-8B79-37D633B846F1}">
+                      <asvg:svgBlip xmlns:asvg="http://schemas.microsoft.com/office/drawing/2016/SVG/main" xmlns="" xmlns:lc="http://schemas.openxmlformats.org/drawingml/2006/lockedCanvas" r:embed="rId3"/>
+                    </a:ext>
+                  </a:extLst>
+                </a:blip>
+              </a:buBlip>
+            </a:pPr>
+            <a:r>
+              <a:rPr lang="en-US" sz="1400" dirty="0" smtClean="0">
+                <a:solidFill>
+                  <a:schemeClr val="tx1">
+                    <a:lumMod val="65000"/>
+                    <a:lumOff val="35000"/>
+                  </a:schemeClr>
+                </a:solidFill>
+                <a:latin typeface="Segoe UI" panose="020B0502040204020203" pitchFamily="34" charset="0"/>
+                <a:cs typeface="Segoe UI" panose="020B0502040204020203" pitchFamily="34" charset="0"/>
+              </a:rPr>
+              <a:t>Site logistician or organization logistician separate from the user who initiated the item to be decommissioned.</a:t>
+            </a:r>
+          </a:p>
+        </p:txBody>
+      </p:sp>
+      <p:sp>
+        <p:nvSpPr>
+          <p:cNvPr id="122" name="TextBox 121">
+            <a:extLst>
+              <a:ext uri="{FF2B5EF4-FFF2-40B4-BE49-F238E27FC236}">
+                <a16:creationId xmlns:a16="http://schemas.microsoft.com/office/drawing/2014/main" id="{00AEB9A2-B192-429C-A1AA-E469E891430E}"/>
+              </a:ext>
+            </a:extLst>
+          </p:cNvPr>
+          <p:cNvSpPr txBox="1"/>
+          <p:nvPr/>
+        </p:nvSpPr>
+        <p:spPr>
+          <a:xfrm>
+            <a:off x="100585" y="140315"/>
+            <a:ext cx="7859260" cy="461665"/>
+          </a:xfrm>
+          <a:prstGeom prst="rect">
+            <a:avLst/>
+          </a:prstGeom>
+          <a:noFill/>
+        </p:spPr>
+        <p:txBody>
+          <a:bodyPr wrap="square" rtlCol="0">
+            <a:spAutoFit/>
+          </a:bodyPr>
+          <a:lstStyle/>
+          <a:p>
+            <a:r>
+              <a:rPr lang="en-US" sz="2400" dirty="0" smtClean="0">
+                <a:latin typeface="Segoe UI" panose="020B0502040204020203" pitchFamily="34" charset="0"/>
+                <a:cs typeface="Segoe UI" panose="020B0502040204020203" pitchFamily="34" charset="0"/>
+              </a:rPr>
+              <a:t>Item Decommission</a:t>
+            </a:r>
+            <a:endParaRPr lang="en-US" sz="2400" dirty="0">
+              <a:latin typeface="Segoe UI" panose="020B0502040204020203" pitchFamily="34" charset="0"/>
+              <a:cs typeface="Segoe UI" panose="020B0502040204020203" pitchFamily="34" charset="0"/>
+            </a:endParaRPr>
+          </a:p>
+        </p:txBody>
+      </p:sp>
+      <p:sp>
+        <p:nvSpPr>
+          <p:cNvPr id="91" name="Title 90" hidden="1">
+            <a:extLst>
+              <a:ext uri="{FF2B5EF4-FFF2-40B4-BE49-F238E27FC236}">
+                <a16:creationId xmlns:a16="http://schemas.microsoft.com/office/drawing/2014/main" id="{E54F4FD7-2CE1-4EF1-AFD3-49BC5355BE16}"/>
+              </a:ext>
+            </a:extLst>
+          </p:cNvPr>
+          <p:cNvSpPr>
+            <a:spLocks noGrp="1"/>
+          </p:cNvSpPr>
+          <p:nvPr>
+            <p:ph type="ctrTitle"/>
+          </p:nvPr>
+        </p:nvSpPr>
+        <p:spPr/>
+        <p:txBody>
+          <a:bodyPr/>
+          <a:lstStyle/>
+          <a:p>
+            <a:r>
+              <a:rPr lang="en-US" dirty="0"/>
+              <a:t>Funding Accounts</a:t>
+            </a:r>
+          </a:p>
+        </p:txBody>
+      </p:sp>
+      <p:grpSp>
+        <p:nvGrpSpPr>
+          <p:cNvPr id="5" name="Group 4"/>
+          <p:cNvGrpSpPr/>
+          <p:nvPr/>
+        </p:nvGrpSpPr>
+        <p:grpSpPr>
+          <a:xfrm>
+            <a:off x="100528" y="684003"/>
+            <a:ext cx="7859261" cy="1663371"/>
+            <a:chOff x="100537" y="1614397"/>
+            <a:chExt cx="2286047" cy="1663371"/>
+          </a:xfrm>
+        </p:grpSpPr>
+        <p:sp>
+          <p:nvSpPr>
+            <p:cNvPr id="39" name="Rectangle 38">
+              <a:extLst>
+                <a:ext uri="{FF2B5EF4-FFF2-40B4-BE49-F238E27FC236}">
+                  <a16:creationId xmlns:a16="http://schemas.microsoft.com/office/drawing/2014/main" id="{5626B030-B48B-42C0-9339-F603883EA700}"/>
+                </a:ext>
+              </a:extLst>
+            </p:cNvPr>
+            <p:cNvSpPr/>
+            <p:nvPr/>
+          </p:nvSpPr>
+          <p:spPr>
+            <a:xfrm>
+              <a:off x="100584" y="1614397"/>
+              <a:ext cx="2286000" cy="274320"/>
+            </a:xfrm>
+            <a:prstGeom prst="rect">
+              <a:avLst/>
+            </a:prstGeom>
+            <a:solidFill>
+              <a:schemeClr val="tx1">
+                <a:lumMod val="75000"/>
+                <a:lumOff val="25000"/>
+              </a:schemeClr>
+            </a:solidFill>
+            <a:ln>
+              <a:noFill/>
+            </a:ln>
+          </p:spPr>
+          <p:style>
+            <a:lnRef idx="2">
+              <a:schemeClr val="accent1">
+                <a:shade val="50000"/>
+              </a:schemeClr>
+            </a:lnRef>
+            <a:fillRef idx="1">
+              <a:schemeClr val="accent1"/>
+            </a:fillRef>
+            <a:effectRef idx="0">
+              <a:schemeClr val="accent1"/>
+            </a:effectRef>
+            <a:fontRef idx="minor">
+              <a:schemeClr val="lt1"/>
+            </a:fontRef>
+          </p:style>
+          <p:txBody>
+            <a:bodyPr rtlCol="0" anchor="ctr"/>
+            <a:lstStyle/>
+            <a:p>
+              <a:pPr algn="ctr"/>
+              <a:r>
+                <a:rPr lang="en-US" sz="1600" dirty="0" smtClean="0">
+                  <a:latin typeface="Segoe UI" panose="020B0502040204020203" pitchFamily="34" charset="0"/>
+                  <a:cs typeface="Segoe UI" panose="020B0502040204020203" pitchFamily="34" charset="0"/>
+                </a:rPr>
+                <a:t>Item</a:t>
+              </a:r>
+              <a:endParaRPr lang="en-US" sz="1600" dirty="0">
+                <a:latin typeface="Segoe UI" panose="020B0502040204020203" pitchFamily="34" charset="0"/>
+                <a:cs typeface="Segoe UI" panose="020B0502040204020203" pitchFamily="34" charset="0"/>
+              </a:endParaRPr>
+            </a:p>
+          </p:txBody>
+        </p:sp>
+        <p:sp>
+          <p:nvSpPr>
+            <p:cNvPr id="41" name="Rectangle 40">
+              <a:extLst>
+                <a:ext uri="{FF2B5EF4-FFF2-40B4-BE49-F238E27FC236}">
+                  <a16:creationId xmlns:a16="http://schemas.microsoft.com/office/drawing/2014/main" id="{92F3C2D4-DE2E-4B48-93DA-8F055147368D}"/>
+                </a:ext>
+              </a:extLst>
+            </p:cNvPr>
+            <p:cNvSpPr/>
+            <p:nvPr/>
+          </p:nvSpPr>
+          <p:spPr>
+            <a:xfrm>
+              <a:off x="100537" y="1892773"/>
+              <a:ext cx="2286000" cy="1384995"/>
+            </a:xfrm>
+            <a:prstGeom prst="rect">
+              <a:avLst/>
+            </a:prstGeom>
+            <a:solidFill>
+              <a:schemeClr val="bg1">
+                <a:lumMod val="85000"/>
+              </a:schemeClr>
+            </a:solidFill>
+            <a:ln>
+              <a:noFill/>
+            </a:ln>
+          </p:spPr>
+          <p:style>
+            <a:lnRef idx="2">
+              <a:schemeClr val="accent1">
+                <a:shade val="50000"/>
+              </a:schemeClr>
+            </a:lnRef>
+            <a:fillRef idx="1">
+              <a:schemeClr val="accent1"/>
+            </a:fillRef>
+            <a:effectRef idx="0">
+              <a:schemeClr val="accent1"/>
+            </a:effectRef>
+            <a:fontRef idx="minor">
+              <a:schemeClr val="lt1"/>
+            </a:fontRef>
+          </p:style>
+          <p:txBody>
+            <a:bodyPr rtlCol="0" anchor="ctr" anchorCtr="0">
+              <a:spAutoFit/>
+            </a:bodyPr>
+            <a:lstStyle/>
+            <a:p>
+              <a:pPr algn="ctr"/>
+              <a:r>
+                <a:rPr lang="en-US" sz="1400" dirty="0" smtClean="0">
+                  <a:solidFill>
+                    <a:schemeClr val="tx1">
+                      <a:lumMod val="65000"/>
+                      <a:lumOff val="35000"/>
+                    </a:schemeClr>
+                  </a:solidFill>
+                  <a:latin typeface="Segoe UI" panose="020B0502040204020203" pitchFamily="34" charset="0"/>
+                  <a:cs typeface="Segoe UI" panose="020B0502040204020203" pitchFamily="34" charset="0"/>
+                </a:rPr>
+                <a:t>Category</a:t>
+              </a:r>
+            </a:p>
+            <a:p>
+              <a:pPr algn="ctr"/>
+              <a:r>
+                <a:rPr lang="en-US" sz="1400" dirty="0" smtClean="0">
+                  <a:solidFill>
+                    <a:schemeClr val="tx1">
+                      <a:lumMod val="65000"/>
+                      <a:lumOff val="35000"/>
+                    </a:schemeClr>
+                  </a:solidFill>
+                  <a:latin typeface="Segoe UI" panose="020B0502040204020203" pitchFamily="34" charset="0"/>
+                  <a:cs typeface="Segoe UI" panose="020B0502040204020203" pitchFamily="34" charset="0"/>
+                </a:rPr>
+                <a:t>Order – If Exists</a:t>
+              </a:r>
+            </a:p>
+            <a:p>
+              <a:pPr algn="ctr"/>
+              <a:r>
+                <a:rPr lang="en-US" sz="1400" dirty="0" smtClean="0">
+                  <a:solidFill>
+                    <a:schemeClr val="tx1">
+                      <a:lumMod val="65000"/>
+                      <a:lumOff val="35000"/>
+                    </a:schemeClr>
+                  </a:solidFill>
+                  <a:latin typeface="Segoe UI" panose="020B0502040204020203" pitchFamily="34" charset="0"/>
+                  <a:cs typeface="Segoe UI" panose="020B0502040204020203" pitchFamily="34" charset="0"/>
+                </a:rPr>
+                <a:t>Manufacturer</a:t>
+              </a:r>
+            </a:p>
+            <a:p>
+              <a:pPr algn="ctr"/>
+              <a:r>
+                <a:rPr lang="en-US" sz="1400" dirty="0" smtClean="0">
+                  <a:solidFill>
+                    <a:schemeClr val="tx1">
+                      <a:lumMod val="65000"/>
+                      <a:lumOff val="35000"/>
+                    </a:schemeClr>
+                  </a:solidFill>
+                  <a:latin typeface="Segoe UI" panose="020B0502040204020203" pitchFamily="34" charset="0"/>
+                  <a:cs typeface="Segoe UI" panose="020B0502040204020203" pitchFamily="34" charset="0"/>
+                </a:rPr>
+                <a:t>Model</a:t>
+              </a:r>
+            </a:p>
+            <a:p>
+              <a:pPr algn="ctr"/>
+              <a:r>
+                <a:rPr lang="en-US" sz="1400" dirty="0" smtClean="0">
+                  <a:solidFill>
+                    <a:schemeClr val="tx1">
+                      <a:lumMod val="65000"/>
+                      <a:lumOff val="35000"/>
+                    </a:schemeClr>
+                  </a:solidFill>
+                  <a:latin typeface="Segoe UI" panose="020B0502040204020203" pitchFamily="34" charset="0"/>
+                  <a:cs typeface="Segoe UI" panose="020B0502040204020203" pitchFamily="34" charset="0"/>
+                </a:rPr>
+                <a:t>Nsn</a:t>
+              </a:r>
+            </a:p>
+            <a:p>
+              <a:pPr algn="ctr"/>
+              <a:r>
+                <a:rPr lang="en-US" sz="1400" dirty="0" smtClean="0">
+                  <a:solidFill>
+                    <a:schemeClr val="tx1">
+                      <a:lumMod val="65000"/>
+                      <a:lumOff val="35000"/>
+                    </a:schemeClr>
+                  </a:solidFill>
+                  <a:latin typeface="Segoe UI" panose="020B0502040204020203" pitchFamily="34" charset="0"/>
+                  <a:cs typeface="Segoe UI" panose="020B0502040204020203" pitchFamily="34" charset="0"/>
+                </a:rPr>
+                <a:t>Item </a:t>
+              </a:r>
+              <a:r>
+                <a:rPr lang="en-US" sz="1400" dirty="0" smtClean="0">
+                  <a:solidFill>
+                    <a:schemeClr val="tx1">
+                      <a:lumMod val="65000"/>
+                      <a:lumOff val="35000"/>
+                    </a:schemeClr>
+                  </a:solidFill>
+                  <a:latin typeface="Segoe UI" panose="020B0502040204020203" pitchFamily="34" charset="0"/>
+                  <a:cs typeface="Segoe UI" panose="020B0502040204020203" pitchFamily="34" charset="0"/>
+                </a:rPr>
+                <a:t>Type</a:t>
+              </a:r>
+              <a:endParaRPr lang="en-US" sz="1400" dirty="0">
+                <a:solidFill>
+                  <a:schemeClr val="tx1">
+                    <a:lumMod val="65000"/>
+                    <a:lumOff val="35000"/>
+                  </a:schemeClr>
+                </a:solidFill>
+                <a:latin typeface="Segoe UI" panose="020B0502040204020203" pitchFamily="34" charset="0"/>
+                <a:cs typeface="Segoe UI" panose="020B0502040204020203" pitchFamily="34" charset="0"/>
+              </a:endParaRPr>
+            </a:p>
+          </p:txBody>
+        </p:sp>
+      </p:grpSp>
+      <p:grpSp>
+        <p:nvGrpSpPr>
+          <p:cNvPr id="2" name="Group 1"/>
+          <p:cNvGrpSpPr/>
+          <p:nvPr/>
+        </p:nvGrpSpPr>
+        <p:grpSpPr>
+          <a:xfrm>
+            <a:off x="2471677" y="3300535"/>
+            <a:ext cx="3116799" cy="1017040"/>
+            <a:chOff x="252984" y="1006158"/>
+            <a:chExt cx="7859261" cy="1017040"/>
+          </a:xfrm>
+        </p:grpSpPr>
+        <p:sp>
+          <p:nvSpPr>
+            <p:cNvPr id="24" name="Rectangle 23">
+              <a:extLst>
+                <a:ext uri="{FF2B5EF4-FFF2-40B4-BE49-F238E27FC236}">
+                  <a16:creationId xmlns:a16="http://schemas.microsoft.com/office/drawing/2014/main" id="{4808B174-B9CF-4CAD-8A19-1BC9D885D3B3}"/>
+                </a:ext>
+              </a:extLst>
+            </p:cNvPr>
+            <p:cNvSpPr/>
+            <p:nvPr/>
+          </p:nvSpPr>
+          <p:spPr>
+            <a:xfrm>
+              <a:off x="252984" y="1006158"/>
+              <a:ext cx="7859261" cy="274320"/>
+            </a:xfrm>
+            <a:prstGeom prst="rect">
+              <a:avLst/>
+            </a:prstGeom>
+            <a:solidFill>
+              <a:schemeClr val="tx1">
+                <a:lumMod val="75000"/>
+                <a:lumOff val="25000"/>
+              </a:schemeClr>
+            </a:solidFill>
+            <a:ln>
+              <a:noFill/>
+            </a:ln>
+          </p:spPr>
+          <p:style>
+            <a:lnRef idx="2">
+              <a:schemeClr val="accent1">
+                <a:shade val="50000"/>
+              </a:schemeClr>
+            </a:lnRef>
+            <a:fillRef idx="1">
+              <a:schemeClr val="accent1"/>
+            </a:fillRef>
+            <a:effectRef idx="0">
+              <a:schemeClr val="accent1"/>
+            </a:effectRef>
+            <a:fontRef idx="minor">
+              <a:schemeClr val="lt1"/>
+            </a:fontRef>
+          </p:style>
+          <p:txBody>
+            <a:bodyPr rtlCol="0" anchor="ctr"/>
+            <a:lstStyle/>
+            <a:p>
+              <a:pPr algn="ctr"/>
+              <a:r>
+                <a:rPr lang="en-US" sz="1600" dirty="0" smtClean="0">
+                  <a:latin typeface="Segoe UI" panose="020B0502040204020203" pitchFamily="34" charset="0"/>
+                  <a:cs typeface="Segoe UI" panose="020B0502040204020203" pitchFamily="34" charset="0"/>
+                </a:rPr>
+                <a:t>Item Decommission</a:t>
+              </a:r>
+              <a:endParaRPr lang="en-US" sz="1600" dirty="0">
+                <a:latin typeface="Segoe UI" panose="020B0502040204020203" pitchFamily="34" charset="0"/>
+                <a:cs typeface="Segoe UI" panose="020B0502040204020203" pitchFamily="34" charset="0"/>
+              </a:endParaRPr>
+            </a:p>
+          </p:txBody>
+        </p:sp>
+        <p:sp>
+          <p:nvSpPr>
+            <p:cNvPr id="25" name="Rectangle 24">
+              <a:extLst>
+                <a:ext uri="{FF2B5EF4-FFF2-40B4-BE49-F238E27FC236}">
+                  <a16:creationId xmlns:a16="http://schemas.microsoft.com/office/drawing/2014/main" id="{34EF0660-717C-40BE-8EF0-14F53806A4C8}"/>
+                </a:ext>
+              </a:extLst>
+            </p:cNvPr>
+            <p:cNvSpPr/>
+            <p:nvPr/>
+          </p:nvSpPr>
+          <p:spPr>
+            <a:xfrm>
+              <a:off x="252986" y="1284534"/>
+              <a:ext cx="7859256" cy="738664"/>
+            </a:xfrm>
+            <a:prstGeom prst="rect">
+              <a:avLst/>
+            </a:prstGeom>
+            <a:solidFill>
+              <a:schemeClr val="bg1">
+                <a:lumMod val="85000"/>
+              </a:schemeClr>
+            </a:solidFill>
+            <a:ln>
+              <a:noFill/>
+            </a:ln>
+          </p:spPr>
+          <p:style>
+            <a:lnRef idx="2">
+              <a:schemeClr val="accent1">
+                <a:shade val="50000"/>
+              </a:schemeClr>
+            </a:lnRef>
+            <a:fillRef idx="1">
+              <a:schemeClr val="accent1"/>
+            </a:fillRef>
+            <a:effectRef idx="0">
+              <a:schemeClr val="accent1"/>
+            </a:effectRef>
+            <a:fontRef idx="minor">
+              <a:schemeClr val="lt1"/>
+            </a:fontRef>
+          </p:style>
+          <p:txBody>
+            <a:bodyPr wrap="square" rtlCol="0" anchor="ctr" anchorCtr="0">
+              <a:spAutoFit/>
+            </a:bodyPr>
+            <a:lstStyle/>
+            <a:p>
+              <a:pPr algn="ctr"/>
+              <a:r>
+                <a:rPr lang="en-US" sz="1400" dirty="0" smtClean="0">
+                  <a:solidFill>
+                    <a:schemeClr val="tx1">
+                      <a:lumMod val="65000"/>
+                      <a:lumOff val="35000"/>
+                    </a:schemeClr>
+                  </a:solidFill>
+                  <a:latin typeface="Segoe UI" panose="020B0502040204020203" pitchFamily="34" charset="0"/>
+                  <a:cs typeface="Segoe UI" panose="020B0502040204020203" pitchFamily="34" charset="0"/>
+                </a:rPr>
+                <a:t>User</a:t>
+              </a:r>
+            </a:p>
+            <a:p>
+              <a:pPr algn="ctr"/>
+              <a:r>
+                <a:rPr lang="en-US" sz="1400" dirty="0" smtClean="0">
+                  <a:solidFill>
+                    <a:schemeClr val="tx1">
+                      <a:lumMod val="65000"/>
+                      <a:lumOff val="35000"/>
+                    </a:schemeClr>
+                  </a:solidFill>
+                  <a:latin typeface="Segoe UI" panose="020B0502040204020203" pitchFamily="34" charset="0"/>
+                  <a:cs typeface="Segoe UI" panose="020B0502040204020203" pitchFamily="34" charset="0"/>
+                </a:rPr>
+                <a:t>Remarks</a:t>
+              </a:r>
+            </a:p>
+            <a:p>
+              <a:pPr algn="ctr"/>
+              <a:r>
+                <a:rPr lang="en-US" sz="1400" dirty="0" smtClean="0">
+                  <a:solidFill>
+                    <a:schemeClr val="tx1">
+                      <a:lumMod val="65000"/>
+                      <a:lumOff val="35000"/>
+                    </a:schemeClr>
+                  </a:solidFill>
+                  <a:latin typeface="Segoe UI" panose="020B0502040204020203" pitchFamily="34" charset="0"/>
+                  <a:cs typeface="Segoe UI" panose="020B0502040204020203" pitchFamily="34" charset="0"/>
+                </a:rPr>
+                <a:t>Decommission </a:t>
+              </a:r>
+              <a:r>
+                <a:rPr lang="en-US" sz="1400" dirty="0" smtClean="0">
+                  <a:solidFill>
+                    <a:schemeClr val="tx1">
+                      <a:lumMod val="65000"/>
+                      <a:lumOff val="35000"/>
+                    </a:schemeClr>
+                  </a:solidFill>
+                  <a:latin typeface="Segoe UI" panose="020B0502040204020203" pitchFamily="34" charset="0"/>
+                  <a:cs typeface="Segoe UI" panose="020B0502040204020203" pitchFamily="34" charset="0"/>
+                </a:rPr>
+                <a:t>Date</a:t>
+              </a:r>
+              <a:endParaRPr lang="en-US" sz="1400" dirty="0">
+                <a:solidFill>
+                  <a:schemeClr val="tx1">
+                    <a:lumMod val="65000"/>
+                    <a:lumOff val="35000"/>
+                  </a:schemeClr>
+                </a:solidFill>
+                <a:latin typeface="Segoe UI" panose="020B0502040204020203" pitchFamily="34" charset="0"/>
+                <a:cs typeface="Segoe UI" panose="020B0502040204020203" pitchFamily="34" charset="0"/>
+              </a:endParaRPr>
+            </a:p>
+          </p:txBody>
+        </p:sp>
+      </p:grpSp>
+      <p:cxnSp>
+        <p:nvCxnSpPr>
+          <p:cNvPr id="8" name="Straight Arrow Connector 7"/>
+          <p:cNvCxnSpPr>
+            <a:stCxn id="41" idx="2"/>
+            <a:endCxn id="24" idx="0"/>
+          </p:cNvCxnSpPr>
+          <p:nvPr/>
+        </p:nvCxnSpPr>
+        <p:spPr>
+          <a:xfrm flipH="1">
+            <a:off x="4030077" y="2347374"/>
+            <a:ext cx="1" cy="953161"/>
+          </a:xfrm>
+          <a:prstGeom prst="straightConnector1">
+            <a:avLst/>
+          </a:prstGeom>
+          <a:ln w="12700">
+            <a:tailEnd type="triangle"/>
+          </a:ln>
+        </p:spPr>
+        <p:style>
+          <a:lnRef idx="1">
+            <a:schemeClr val="accent6"/>
+          </a:lnRef>
+          <a:fillRef idx="0">
+            <a:schemeClr val="accent6"/>
+          </a:fillRef>
+          <a:effectRef idx="0">
+            <a:schemeClr val="accent6"/>
+          </a:effectRef>
+          <a:fontRef idx="minor">
+            <a:schemeClr val="tx1"/>
+          </a:fontRef>
+        </p:style>
+      </p:cxnSp>
+      <p:grpSp>
+        <p:nvGrpSpPr>
+          <p:cNvPr id="26" name="Group 25"/>
+          <p:cNvGrpSpPr/>
+          <p:nvPr/>
+        </p:nvGrpSpPr>
+        <p:grpSpPr>
+          <a:xfrm>
+            <a:off x="2471677" y="4985401"/>
+            <a:ext cx="3116799" cy="1017040"/>
+            <a:chOff x="252984" y="1006158"/>
+            <a:chExt cx="7859261" cy="1017040"/>
+          </a:xfrm>
+        </p:grpSpPr>
+        <p:sp>
+          <p:nvSpPr>
+            <p:cNvPr id="27" name="Rectangle 26">
+              <a:extLst>
+                <a:ext uri="{FF2B5EF4-FFF2-40B4-BE49-F238E27FC236}">
+                  <a16:creationId xmlns:a16="http://schemas.microsoft.com/office/drawing/2014/main" id="{4808B174-B9CF-4CAD-8A19-1BC9D885D3B3}"/>
+                </a:ext>
+              </a:extLst>
+            </p:cNvPr>
+            <p:cNvSpPr/>
+            <p:nvPr/>
+          </p:nvSpPr>
+          <p:spPr>
+            <a:xfrm>
+              <a:off x="252984" y="1006158"/>
+              <a:ext cx="7859261" cy="274320"/>
+            </a:xfrm>
+            <a:prstGeom prst="rect">
+              <a:avLst/>
+            </a:prstGeom>
+            <a:solidFill>
+              <a:schemeClr val="tx1">
+                <a:lumMod val="75000"/>
+                <a:lumOff val="25000"/>
+              </a:schemeClr>
+            </a:solidFill>
+            <a:ln>
+              <a:noFill/>
+            </a:ln>
+          </p:spPr>
+          <p:style>
+            <a:lnRef idx="2">
+              <a:schemeClr val="accent1">
+                <a:shade val="50000"/>
+              </a:schemeClr>
+            </a:lnRef>
+            <a:fillRef idx="1">
+              <a:schemeClr val="accent1"/>
+            </a:fillRef>
+            <a:effectRef idx="0">
+              <a:schemeClr val="accent1"/>
+            </a:effectRef>
+            <a:fontRef idx="minor">
+              <a:schemeClr val="lt1"/>
+            </a:fontRef>
+          </p:style>
+          <p:txBody>
+            <a:bodyPr rtlCol="0" anchor="ctr"/>
+            <a:lstStyle/>
+            <a:p>
+              <a:pPr algn="ctr"/>
+              <a:r>
+                <a:rPr lang="en-US" sz="1600" dirty="0" smtClean="0">
+                  <a:latin typeface="Segoe UI" panose="020B0502040204020203" pitchFamily="34" charset="0"/>
+                  <a:cs typeface="Segoe UI" panose="020B0502040204020203" pitchFamily="34" charset="0"/>
+                </a:rPr>
+                <a:t>Item Decommission Verification</a:t>
+              </a:r>
+              <a:endParaRPr lang="en-US" sz="1600" dirty="0">
+                <a:latin typeface="Segoe UI" panose="020B0502040204020203" pitchFamily="34" charset="0"/>
+                <a:cs typeface="Segoe UI" panose="020B0502040204020203" pitchFamily="34" charset="0"/>
+              </a:endParaRPr>
+            </a:p>
+          </p:txBody>
+        </p:sp>
+        <p:sp>
+          <p:nvSpPr>
+            <p:cNvPr id="28" name="Rectangle 27">
+              <a:extLst>
+                <a:ext uri="{FF2B5EF4-FFF2-40B4-BE49-F238E27FC236}">
+                  <a16:creationId xmlns:a16="http://schemas.microsoft.com/office/drawing/2014/main" id="{34EF0660-717C-40BE-8EF0-14F53806A4C8}"/>
+                </a:ext>
+              </a:extLst>
+            </p:cNvPr>
+            <p:cNvSpPr/>
+            <p:nvPr/>
+          </p:nvSpPr>
+          <p:spPr>
+            <a:xfrm>
+              <a:off x="252986" y="1284534"/>
+              <a:ext cx="7859256" cy="738664"/>
+            </a:xfrm>
+            <a:prstGeom prst="rect">
+              <a:avLst/>
+            </a:prstGeom>
+            <a:solidFill>
+              <a:schemeClr val="bg1">
+                <a:lumMod val="85000"/>
+              </a:schemeClr>
+            </a:solidFill>
+            <a:ln>
+              <a:noFill/>
+            </a:ln>
+          </p:spPr>
+          <p:style>
+            <a:lnRef idx="2">
+              <a:schemeClr val="accent1">
+                <a:shade val="50000"/>
+              </a:schemeClr>
+            </a:lnRef>
+            <a:fillRef idx="1">
+              <a:schemeClr val="accent1"/>
+            </a:fillRef>
+            <a:effectRef idx="0">
+              <a:schemeClr val="accent1"/>
+            </a:effectRef>
+            <a:fontRef idx="minor">
+              <a:schemeClr val="lt1"/>
+            </a:fontRef>
+          </p:style>
+          <p:txBody>
+            <a:bodyPr wrap="square" rtlCol="0" anchor="ctr" anchorCtr="0">
+              <a:spAutoFit/>
+            </a:bodyPr>
+            <a:lstStyle/>
+            <a:p>
+              <a:pPr algn="ctr"/>
+              <a:r>
+                <a:rPr lang="en-US" sz="1400" dirty="0" smtClean="0">
+                  <a:solidFill>
+                    <a:schemeClr val="tx1">
+                      <a:lumMod val="65000"/>
+                      <a:lumOff val="35000"/>
+                    </a:schemeClr>
+                  </a:solidFill>
+                  <a:latin typeface="Segoe UI" panose="020B0502040204020203" pitchFamily="34" charset="0"/>
+                  <a:cs typeface="Segoe UI" panose="020B0502040204020203" pitchFamily="34" charset="0"/>
+                </a:rPr>
+                <a:t>User</a:t>
+              </a:r>
+            </a:p>
+            <a:p>
+              <a:pPr algn="ctr"/>
+              <a:r>
+                <a:rPr lang="en-US" sz="1400" dirty="0" smtClean="0">
+                  <a:solidFill>
+                    <a:schemeClr val="tx1">
+                      <a:lumMod val="65000"/>
+                      <a:lumOff val="35000"/>
+                    </a:schemeClr>
+                  </a:solidFill>
+                  <a:latin typeface="Segoe UI" panose="020B0502040204020203" pitchFamily="34" charset="0"/>
+                  <a:cs typeface="Segoe UI" panose="020B0502040204020203" pitchFamily="34" charset="0"/>
+                </a:rPr>
+                <a:t>Remarks</a:t>
+              </a:r>
+            </a:p>
+            <a:p>
+              <a:pPr algn="ctr"/>
+              <a:r>
+                <a:rPr lang="en-US" sz="1400" dirty="0" smtClean="0">
+                  <a:solidFill>
+                    <a:schemeClr val="tx1">
+                      <a:lumMod val="65000"/>
+                      <a:lumOff val="35000"/>
+                    </a:schemeClr>
+                  </a:solidFill>
+                  <a:latin typeface="Segoe UI" panose="020B0502040204020203" pitchFamily="34" charset="0"/>
+                  <a:cs typeface="Segoe UI" panose="020B0502040204020203" pitchFamily="34" charset="0"/>
+                </a:rPr>
+                <a:t>Verification </a:t>
+              </a:r>
+              <a:r>
+                <a:rPr lang="en-US" sz="1400" dirty="0" smtClean="0">
+                  <a:solidFill>
+                    <a:schemeClr val="tx1">
+                      <a:lumMod val="65000"/>
+                      <a:lumOff val="35000"/>
+                    </a:schemeClr>
+                  </a:solidFill>
+                  <a:latin typeface="Segoe UI" panose="020B0502040204020203" pitchFamily="34" charset="0"/>
+                  <a:cs typeface="Segoe UI" panose="020B0502040204020203" pitchFamily="34" charset="0"/>
+                </a:rPr>
+                <a:t>Date</a:t>
+              </a:r>
+              <a:endParaRPr lang="en-US" sz="1400" dirty="0">
+                <a:solidFill>
+                  <a:schemeClr val="tx1">
+                    <a:lumMod val="65000"/>
+                    <a:lumOff val="35000"/>
+                  </a:schemeClr>
+                </a:solidFill>
+                <a:latin typeface="Segoe UI" panose="020B0502040204020203" pitchFamily="34" charset="0"/>
+                <a:cs typeface="Segoe UI" panose="020B0502040204020203" pitchFamily="34" charset="0"/>
+              </a:endParaRPr>
+            </a:p>
+          </p:txBody>
+        </p:sp>
+      </p:grpSp>
+      <p:cxnSp>
+        <p:nvCxnSpPr>
+          <p:cNvPr id="11" name="Straight Arrow Connector 10"/>
+          <p:cNvCxnSpPr>
+            <a:stCxn id="25" idx="2"/>
+            <a:endCxn id="27" idx="0"/>
+          </p:cNvCxnSpPr>
+          <p:nvPr/>
+        </p:nvCxnSpPr>
+        <p:spPr>
+          <a:xfrm>
+            <a:off x="4030077" y="4317575"/>
+            <a:ext cx="0" cy="667826"/>
+          </a:xfrm>
+          <a:prstGeom prst="straightConnector1">
+            <a:avLst/>
+          </a:prstGeom>
+          <a:ln w="12700">
+            <a:tailEnd type="triangle"/>
+          </a:ln>
+        </p:spPr>
+        <p:style>
+          <a:lnRef idx="1">
+            <a:schemeClr val="accent6"/>
+          </a:lnRef>
+          <a:fillRef idx="0">
+            <a:schemeClr val="accent6"/>
+          </a:fillRef>
+          <a:effectRef idx="0">
+            <a:schemeClr val="accent6"/>
+          </a:effectRef>
+          <a:fontRef idx="minor">
+            <a:schemeClr val="tx1"/>
+          </a:fontRef>
+        </p:style>
+      </p:cxnSp>
+    </p:spTree>
+    <p:extLst>
+      <p:ext uri="{BB962C8B-B14F-4D97-AF65-F5344CB8AC3E}">
+        <p14:creationId xmlns:p14="http://schemas.microsoft.com/office/powerpoint/2010/main" val="2144913794"/>
       </p:ext>
     </p:extLst>
   </p:cSld>

</xml_diff>